<commit_message>
updates to visuals and updated household estimates after specifiying household survey object
</commit_message>
<xml_diff>
--- a/create_powerpoint/demographic_estimates.pptx
+++ b/create_powerpoint/demographic_estimates.pptx
@@ -1,6 +1,6 @@
 
 <file path=ppt/presentation.xml><?xml version="1.0" encoding="utf-8"?>
-<p:presentation xmlns:a="http://schemas.openxmlformats.org/drawingml/2006/main" xmlns:r="http://schemas.openxmlformats.org/officeDocument/2006/relationships" xmlns:p="http://schemas.openxmlformats.org/presentationml/2006/main" saveSubsetFonts="1" autoCompressPictures="0">
+<p:presentation xmlns:a="http://schemas.openxmlformats.org/drawingml/2006/main" xmlns:r="http://schemas.openxmlformats.org/officeDocument/2006/relationships" xmlns:p="http://schemas.openxmlformats.org/presentationml/2006/main" saveSubsetFonts="1">
   <p:sldMasterIdLst>
     <p:sldMasterId id="2147483648" r:id="rId1"/>
   </p:sldMasterIdLst>
@@ -19,15 +19,14 @@
     <p:sldId id="267" r:id="rId13"/>
     <p:sldId id="268" r:id="rId14"/>
     <p:sldId id="269" r:id="rId15"/>
-    <p:sldId id="270" r:id="rId16"/>
   </p:sldIdLst>
-  <p:sldSz cx="9144000" cy="6858000" type="screen4x3"/>
+  <p:sldSz cx="12192000" cy="6858000"/>
   <p:notesSz cx="6858000" cy="9144000"/>
   <p:defaultTextStyle>
     <a:defPPr>
       <a:defRPr lang="en-US"/>
     </a:defPPr>
-    <a:lvl1pPr marL="0" algn="l" defTabSz="457200" rtl="0" eaLnBrk="1" latinLnBrk="0" hangingPunct="1">
+    <a:lvl1pPr marL="0" algn="l" defTabSz="914400" rtl="0" eaLnBrk="1" latinLnBrk="0" hangingPunct="1">
       <a:defRPr sz="1800" kern="1200">
         <a:solidFill>
           <a:schemeClr val="tx1"/>
@@ -37,7 +36,7 @@
         <a:cs typeface="+mn-cs"/>
       </a:defRPr>
     </a:lvl1pPr>
-    <a:lvl2pPr marL="457200" algn="l" defTabSz="457200" rtl="0" eaLnBrk="1" latinLnBrk="0" hangingPunct="1">
+    <a:lvl2pPr marL="457200" algn="l" defTabSz="914400" rtl="0" eaLnBrk="1" latinLnBrk="0" hangingPunct="1">
       <a:defRPr sz="1800" kern="1200">
         <a:solidFill>
           <a:schemeClr val="tx1"/>
@@ -47,7 +46,7 @@
         <a:cs typeface="+mn-cs"/>
       </a:defRPr>
     </a:lvl2pPr>
-    <a:lvl3pPr marL="914400" algn="l" defTabSz="457200" rtl="0" eaLnBrk="1" latinLnBrk="0" hangingPunct="1">
+    <a:lvl3pPr marL="914400" algn="l" defTabSz="914400" rtl="0" eaLnBrk="1" latinLnBrk="0" hangingPunct="1">
       <a:defRPr sz="1800" kern="1200">
         <a:solidFill>
           <a:schemeClr val="tx1"/>
@@ -57,7 +56,7 @@
         <a:cs typeface="+mn-cs"/>
       </a:defRPr>
     </a:lvl3pPr>
-    <a:lvl4pPr marL="1371600" algn="l" defTabSz="457200" rtl="0" eaLnBrk="1" latinLnBrk="0" hangingPunct="1">
+    <a:lvl4pPr marL="1371600" algn="l" defTabSz="914400" rtl="0" eaLnBrk="1" latinLnBrk="0" hangingPunct="1">
       <a:defRPr sz="1800" kern="1200">
         <a:solidFill>
           <a:schemeClr val="tx1"/>
@@ -67,7 +66,7 @@
         <a:cs typeface="+mn-cs"/>
       </a:defRPr>
     </a:lvl4pPr>
-    <a:lvl5pPr marL="1828800" algn="l" defTabSz="457200" rtl="0" eaLnBrk="1" latinLnBrk="0" hangingPunct="1">
+    <a:lvl5pPr marL="1828800" algn="l" defTabSz="914400" rtl="0" eaLnBrk="1" latinLnBrk="0" hangingPunct="1">
       <a:defRPr sz="1800" kern="1200">
         <a:solidFill>
           <a:schemeClr val="tx1"/>
@@ -77,7 +76,7 @@
         <a:cs typeface="+mn-cs"/>
       </a:defRPr>
     </a:lvl5pPr>
-    <a:lvl6pPr marL="2286000" algn="l" defTabSz="457200" rtl="0" eaLnBrk="1" latinLnBrk="0" hangingPunct="1">
+    <a:lvl6pPr marL="2286000" algn="l" defTabSz="914400" rtl="0" eaLnBrk="1" latinLnBrk="0" hangingPunct="1">
       <a:defRPr sz="1800" kern="1200">
         <a:solidFill>
           <a:schemeClr val="tx1"/>
@@ -87,7 +86,7 @@
         <a:cs typeface="+mn-cs"/>
       </a:defRPr>
     </a:lvl6pPr>
-    <a:lvl7pPr marL="2743200" algn="l" defTabSz="457200" rtl="0" eaLnBrk="1" latinLnBrk="0" hangingPunct="1">
+    <a:lvl7pPr marL="2743200" algn="l" defTabSz="914400" rtl="0" eaLnBrk="1" latinLnBrk="0" hangingPunct="1">
       <a:defRPr sz="1800" kern="1200">
         <a:solidFill>
           <a:schemeClr val="tx1"/>
@@ -97,7 +96,7 @@
         <a:cs typeface="+mn-cs"/>
       </a:defRPr>
     </a:lvl7pPr>
-    <a:lvl8pPr marL="3200400" algn="l" defTabSz="457200" rtl="0" eaLnBrk="1" latinLnBrk="0" hangingPunct="1">
+    <a:lvl8pPr marL="3200400" algn="l" defTabSz="914400" rtl="0" eaLnBrk="1" latinLnBrk="0" hangingPunct="1">
       <a:defRPr sz="1800" kern="1200">
         <a:solidFill>
           <a:schemeClr val="tx1"/>
@@ -107,7 +106,7 @@
         <a:cs typeface="+mn-cs"/>
       </a:defRPr>
     </a:lvl8pPr>
-    <a:lvl9pPr marL="3657600" algn="l" defTabSz="457200" rtl="0" eaLnBrk="1" latinLnBrk="0" hangingPunct="1">
+    <a:lvl9pPr marL="3657600" algn="l" defTabSz="914400" rtl="0" eaLnBrk="1" latinLnBrk="0" hangingPunct="1">
       <a:defRPr sz="1800" kern="1200">
         <a:solidFill>
           <a:schemeClr val="tx1"/>
@@ -120,18 +119,7 @@
   </p:defaultTextStyle>
   <p:extLst>
     <p:ext uri="{EFAFB233-063F-42B5-8137-9DF3F51BA10A}">
-      <p15:sldGuideLst xmlns:p15="http://schemas.microsoft.com/office/powerpoint/2012/main">
-        <p15:guide id="1" orient="horz" pos="2160">
-          <p15:clr>
-            <a:srgbClr val="A4A3A4"/>
-          </p15:clr>
-        </p15:guide>
-        <p15:guide id="2" pos="2880">
-          <p15:clr>
-            <a:srgbClr val="A4A3A4"/>
-          </p15:clr>
-        </p15:guide>
-      </p15:sldGuideLst>
+      <p15:sldGuideLst xmlns:p15="http://schemas.microsoft.com/office/powerpoint/2012/main"/>
     </p:ext>
   </p:extLst>
 </p:presentation>
@@ -140,6 +128,14 @@
 <file path=ppt/slideLayouts/slideLayout1.xml><?xml version="1.0" encoding="utf-8"?>
 <p:sldLayout xmlns:a="http://schemas.openxmlformats.org/drawingml/2006/main" xmlns:r="http://schemas.openxmlformats.org/officeDocument/2006/relationships" xmlns:p="http://schemas.openxmlformats.org/presentationml/2006/main" type="title" preserve="1">
   <p:cSld name="Title Slide">
+    <p:bg>
+      <p:bgPr>
+        <a:solidFill>
+          <a:srgbClr val="D5802B"/>
+        </a:solidFill>
+        <a:effectLst/>
+      </p:bgPr>
+    </p:bg>
     <p:spTree>
       <p:nvGrpSpPr>
         <p:cNvPr id="1" name=""/>
@@ -156,7 +152,13 @@
       </p:grpSpPr>
       <p:sp>
         <p:nvSpPr>
-          <p:cNvPr id="2" name="Title 1"/>
+          <p:cNvPr id="2" name="Title 1">
+            <a:extLst>
+              <a:ext uri="{FF2B5EF4-FFF2-40B4-BE49-F238E27FC236}">
+                <a16:creationId xmlns:a16="http://schemas.microsoft.com/office/drawing/2014/main" id="{ADF8BC5D-79F0-4134-BAB8-9CDB86E9C819}"/>
+              </a:ext>
+            </a:extLst>
+          </p:cNvPr>
           <p:cNvSpPr>
             <a:spLocks noGrp="1"/>
           </p:cNvSpPr>
@@ -166,25 +168,40 @@
         </p:nvSpPr>
         <p:spPr>
           <a:xfrm>
-            <a:off x="685800" y="2130425"/>
-            <a:ext cx="7772400" cy="1470025"/>
+            <a:off x="261257" y="1041400"/>
+            <a:ext cx="11495314" cy="2387600"/>
           </a:xfrm>
         </p:spPr>
         <p:txBody>
-          <a:bodyPr/>
-          <a:lstStyle/>
-          <a:p>
-            <a:r>
-              <a:rPr lang="en-US" smtClean="0"/>
+          <a:bodyPr anchor="t">
+            <a:normAutofit/>
+          </a:bodyPr>
+          <a:lstStyle>
+            <a:lvl1pPr algn="l">
+              <a:defRPr sz="6600" b="1">
+                <a:solidFill>
+                  <a:schemeClr val="bg1"/>
+                </a:solidFill>
+              </a:defRPr>
+            </a:lvl1pPr>
+          </a:lstStyle>
+          <a:p>
+            <a:r>
+              <a:rPr lang="en-US" dirty="0"/>
               <a:t>Click to edit Master title style</a:t>
             </a:r>
-            <a:endParaRPr lang="en-US"/>
-          </a:p>
-        </p:txBody>
-      </p:sp>
-      <p:sp>
-        <p:nvSpPr>
-          <p:cNvPr id="3" name="Subtitle 2"/>
+          </a:p>
+        </p:txBody>
+      </p:sp>
+      <p:sp>
+        <p:nvSpPr>
+          <p:cNvPr id="3" name="Subtitle 2">
+            <a:extLst>
+              <a:ext uri="{FF2B5EF4-FFF2-40B4-BE49-F238E27FC236}">
+                <a16:creationId xmlns:a16="http://schemas.microsoft.com/office/drawing/2014/main" id="{DEC5BA95-BEC6-453C-950E-BB68DDC672AE}"/>
+              </a:ext>
+            </a:extLst>
+          </p:cNvPr>
           <p:cNvSpPr>
             <a:spLocks noGrp="1"/>
           </p:cNvSpPr>
@@ -194,121 +211,122 @@
         </p:nvSpPr>
         <p:spPr>
           <a:xfrm>
-            <a:off x="1371600" y="3886200"/>
-            <a:ext cx="6400800" cy="1752600"/>
+            <a:off x="261257" y="3645581"/>
+            <a:ext cx="9144000" cy="1655762"/>
           </a:xfrm>
         </p:spPr>
         <p:txBody>
-          <a:bodyPr/>
+          <a:bodyPr>
+            <a:normAutofit/>
+          </a:bodyPr>
           <a:lstStyle>
-            <a:lvl1pPr marL="0" indent="0" algn="ctr">
-              <a:buNone/>
-              <a:defRPr>
+            <a:lvl1pPr marL="0" indent="0" algn="l">
+              <a:buNone/>
+              <a:defRPr sz="3200" b="1">
                 <a:solidFill>
-                  <a:schemeClr val="tx1">
-                    <a:tint val="75000"/>
-                  </a:schemeClr>
+                  <a:schemeClr val="bg1"/>
                 </a:solidFill>
               </a:defRPr>
             </a:lvl1pPr>
             <a:lvl2pPr marL="457200" indent="0" algn="ctr">
               <a:buNone/>
-              <a:defRPr>
-                <a:solidFill>
-                  <a:schemeClr val="tx1">
-                    <a:tint val="75000"/>
-                  </a:schemeClr>
-                </a:solidFill>
-              </a:defRPr>
+              <a:defRPr sz="2000"/>
             </a:lvl2pPr>
             <a:lvl3pPr marL="914400" indent="0" algn="ctr">
               <a:buNone/>
-              <a:defRPr>
-                <a:solidFill>
-                  <a:schemeClr val="tx1">
-                    <a:tint val="75000"/>
-                  </a:schemeClr>
-                </a:solidFill>
-              </a:defRPr>
+              <a:defRPr sz="1800"/>
             </a:lvl3pPr>
             <a:lvl4pPr marL="1371600" indent="0" algn="ctr">
               <a:buNone/>
-              <a:defRPr>
-                <a:solidFill>
-                  <a:schemeClr val="tx1">
-                    <a:tint val="75000"/>
-                  </a:schemeClr>
-                </a:solidFill>
-              </a:defRPr>
+              <a:defRPr sz="1600"/>
             </a:lvl4pPr>
             <a:lvl5pPr marL="1828800" indent="0" algn="ctr">
               <a:buNone/>
-              <a:defRPr>
-                <a:solidFill>
-                  <a:schemeClr val="tx1">
-                    <a:tint val="75000"/>
-                  </a:schemeClr>
-                </a:solidFill>
-              </a:defRPr>
+              <a:defRPr sz="1600"/>
             </a:lvl5pPr>
             <a:lvl6pPr marL="2286000" indent="0" algn="ctr">
               <a:buNone/>
-              <a:defRPr>
-                <a:solidFill>
-                  <a:schemeClr val="tx1">
-                    <a:tint val="75000"/>
-                  </a:schemeClr>
-                </a:solidFill>
-              </a:defRPr>
+              <a:defRPr sz="1600"/>
             </a:lvl6pPr>
             <a:lvl7pPr marL="2743200" indent="0" algn="ctr">
               <a:buNone/>
-              <a:defRPr>
-                <a:solidFill>
-                  <a:schemeClr val="tx1">
-                    <a:tint val="75000"/>
-                  </a:schemeClr>
-                </a:solidFill>
-              </a:defRPr>
+              <a:defRPr sz="1600"/>
             </a:lvl7pPr>
             <a:lvl8pPr marL="3200400" indent="0" algn="ctr">
               <a:buNone/>
-              <a:defRPr>
-                <a:solidFill>
-                  <a:schemeClr val="tx1">
-                    <a:tint val="75000"/>
-                  </a:schemeClr>
-                </a:solidFill>
-              </a:defRPr>
+              <a:defRPr sz="1600"/>
             </a:lvl8pPr>
             <a:lvl9pPr marL="3657600" indent="0" algn="ctr">
               <a:buNone/>
-              <a:defRPr>
-                <a:solidFill>
-                  <a:schemeClr val="tx1">
-                    <a:tint val="75000"/>
-                  </a:schemeClr>
-                </a:solidFill>
-              </a:defRPr>
+              <a:defRPr sz="1600"/>
             </a:lvl9pPr>
           </a:lstStyle>
           <a:p>
             <a:r>
+              <a:rPr lang="en-US" dirty="0"/>
+              <a:t>Click to edit Master subtitle style</a:t>
+            </a:r>
+          </a:p>
+        </p:txBody>
+      </p:sp>
+      <p:sp>
+        <p:nvSpPr>
+          <p:cNvPr id="4" name="Date Placeholder 3">
+            <a:extLst>
+              <a:ext uri="{FF2B5EF4-FFF2-40B4-BE49-F238E27FC236}">
+                <a16:creationId xmlns:a16="http://schemas.microsoft.com/office/drawing/2014/main" id="{1179C87F-56DB-40BE-8575-F9B18BF7C38C}"/>
+              </a:ext>
+            </a:extLst>
+          </p:cNvPr>
+          <p:cNvSpPr>
+            <a:spLocks noGrp="1"/>
+          </p:cNvSpPr>
+          <p:nvPr>
+            <p:ph type="dt" sz="half" idx="10"/>
+          </p:nvPr>
+        </p:nvSpPr>
+        <p:spPr>
+          <a:xfrm>
+            <a:off x="261257" y="413543"/>
+            <a:ext cx="2743200" cy="365125"/>
+          </a:xfrm>
+        </p:spPr>
+        <p:txBody>
+          <a:bodyPr/>
+          <a:lstStyle>
+            <a:lvl1pPr>
+              <a:defRPr sz="1870" b="1">
+                <a:solidFill>
+                  <a:schemeClr val="bg1"/>
+                </a:solidFill>
+                <a:latin typeface="+mn-lt"/>
+              </a:defRPr>
+            </a:lvl1pPr>
+          </a:lstStyle>
+          <a:p>
+            <a:fld id="{3EA7974F-46A4-4C38-BBCC-8E262B881B28}" type="datetimeFigureOut">
               <a:rPr lang="en-US" smtClean="0"/>
-              <a:t>Click to edit Master subtitle style</a:t>
-            </a:r>
-            <a:endParaRPr lang="en-US"/>
-          </a:p>
-        </p:txBody>
-      </p:sp>
-      <p:sp>
-        <p:nvSpPr>
-          <p:cNvPr id="4" name="Date Placeholder 3"/>
-          <p:cNvSpPr>
-            <a:spLocks noGrp="1"/>
-          </p:cNvSpPr>
-          <p:nvPr>
-            <p:ph type="dt" sz="half" idx="10"/>
+              <a:pPr/>
+              <a:t>10/18/2020</a:t>
+            </a:fld>
+            <a:endParaRPr lang="en-US" dirty="0"/>
+          </a:p>
+        </p:txBody>
+      </p:sp>
+      <p:sp>
+        <p:nvSpPr>
+          <p:cNvPr id="5" name="Footer Placeholder 4">
+            <a:extLst>
+              <a:ext uri="{FF2B5EF4-FFF2-40B4-BE49-F238E27FC236}">
+                <a16:creationId xmlns:a16="http://schemas.microsoft.com/office/drawing/2014/main" id="{D059CA93-D43D-4DEB-B1F3-374BE033AC61}"/>
+              </a:ext>
+            </a:extLst>
+          </p:cNvPr>
+          <p:cNvSpPr>
+            <a:spLocks noGrp="1"/>
+          </p:cNvSpPr>
+          <p:nvPr>
+            <p:ph type="ftr" sz="quarter" idx="11"/>
           </p:nvPr>
         </p:nvSpPr>
         <p:spPr/>
@@ -316,22 +334,24 @@
           <a:bodyPr/>
           <a:lstStyle/>
           <a:p>
-            <a:fld id="{241EB5C9-1307-BA42-ABA2-0BC069CD8E7F}" type="datetimeFigureOut">
-              <a:rPr lang="en-US" smtClean="0"/>
-              <a:t>4/5/2019</a:t>
-            </a:fld>
-            <a:endParaRPr lang="en-US"/>
-          </a:p>
-        </p:txBody>
-      </p:sp>
-      <p:sp>
-        <p:nvSpPr>
-          <p:cNvPr id="5" name="Footer Placeholder 4"/>
-          <p:cNvSpPr>
-            <a:spLocks noGrp="1"/>
-          </p:cNvSpPr>
-          <p:nvPr>
-            <p:ph type="ftr" sz="quarter" idx="11"/>
+            <a:endParaRPr lang="en-US" dirty="0"/>
+          </a:p>
+        </p:txBody>
+      </p:sp>
+      <p:sp>
+        <p:nvSpPr>
+          <p:cNvPr id="6" name="Slide Number Placeholder 5">
+            <a:extLst>
+              <a:ext uri="{FF2B5EF4-FFF2-40B4-BE49-F238E27FC236}">
+                <a16:creationId xmlns:a16="http://schemas.microsoft.com/office/drawing/2014/main" id="{22B1AD1D-BD4E-4E54-9FFD-C1433005417B}"/>
+              </a:ext>
+            </a:extLst>
+          </p:cNvPr>
+          <p:cNvSpPr>
+            <a:spLocks noGrp="1"/>
+          </p:cNvSpPr>
+          <p:nvPr>
+            <p:ph type="sldNum" sz="quarter" idx="12"/>
           </p:nvPr>
         </p:nvSpPr>
         <p:spPr/>
@@ -339,26 +359,7 @@
           <a:bodyPr/>
           <a:lstStyle/>
           <a:p>
-            <a:endParaRPr lang="en-US"/>
-          </a:p>
-        </p:txBody>
-      </p:sp>
-      <p:sp>
-        <p:nvSpPr>
-          <p:cNvPr id="6" name="Slide Number Placeholder 5"/>
-          <p:cNvSpPr>
-            <a:spLocks noGrp="1"/>
-          </p:cNvSpPr>
-          <p:nvPr>
-            <p:ph type="sldNum" sz="quarter" idx="12"/>
-          </p:nvPr>
-        </p:nvSpPr>
-        <p:spPr/>
-        <p:txBody>
-          <a:bodyPr/>
-          <a:lstStyle/>
-          <a:p>
-            <a:fld id="{C5EF2332-01BF-834F-8236-50238282D533}" type="slidenum">
+            <a:fld id="{1C3A5439-F9F3-4052-B329-868ECC3EAFBE}" type="slidenum">
               <a:rPr lang="en-US" smtClean="0"/>
               <a:t>‹#›</a:t>
             </a:fld>
@@ -366,10 +367,46 @@
           </a:p>
         </p:txBody>
       </p:sp>
+      <p:pic>
+        <p:nvPicPr>
+          <p:cNvPr id="7" name="Picture 6">
+            <a:extLst>
+              <a:ext uri="{FF2B5EF4-FFF2-40B4-BE49-F238E27FC236}">
+                <a16:creationId xmlns:a16="http://schemas.microsoft.com/office/drawing/2014/main" id="{B58D46E3-AE9F-4B5E-B5E6-5B1ACE921B09}"/>
+              </a:ext>
+            </a:extLst>
+          </p:cNvPr>
+          <p:cNvPicPr>
+            <a:picLocks noChangeAspect="1"/>
+          </p:cNvPicPr>
+          <p:nvPr userDrawn="1"/>
+        </p:nvPicPr>
+        <p:blipFill>
+          <a:blip r:embed="rId2" cstate="screen">
+            <a:extLst>
+              <a:ext uri="{28A0092B-C50C-407E-A947-70E740481C1C}">
+                <a14:useLocalDpi xmlns:a14="http://schemas.microsoft.com/office/drawing/2010/main"/>
+              </a:ext>
+            </a:extLst>
+          </a:blip>
+          <a:stretch>
+            <a:fillRect/>
+          </a:stretch>
+        </p:blipFill>
+        <p:spPr>
+          <a:xfrm>
+            <a:off x="413009" y="6125052"/>
+            <a:ext cx="2800092" cy="386349"/>
+          </a:xfrm>
+          <a:prstGeom prst="rect">
+            <a:avLst/>
+          </a:prstGeom>
+        </p:spPr>
+      </p:pic>
     </p:spTree>
     <p:extLst>
       <p:ext uri="{BB962C8B-B14F-4D97-AF65-F5344CB8AC3E}">
-        <p14:creationId xmlns:p14="http://schemas.microsoft.com/office/powerpoint/2010/main" val="1444357513"/>
+        <p14:creationId xmlns:p14="http://schemas.microsoft.com/office/powerpoint/2010/main" val="2260108755"/>
       </p:ext>
     </p:extLst>
   </p:cSld>
@@ -398,7 +435,13 @@
       </p:grpSpPr>
       <p:sp>
         <p:nvSpPr>
-          <p:cNvPr id="2" name="Title 1"/>
+          <p:cNvPr id="2" name="Title 1">
+            <a:extLst>
+              <a:ext uri="{FF2B5EF4-FFF2-40B4-BE49-F238E27FC236}">
+                <a16:creationId xmlns:a16="http://schemas.microsoft.com/office/drawing/2014/main" id="{17C7590E-2BE9-4ABD-921F-96203BBFD905}"/>
+              </a:ext>
+            </a:extLst>
+          </p:cNvPr>
           <p:cNvSpPr>
             <a:spLocks noGrp="1"/>
           </p:cNvSpPr>
@@ -412,83 +455,93 @@
           <a:lstStyle/>
           <a:p>
             <a:r>
+              <a:rPr lang="en-US"/>
+              <a:t>Click to edit Master title style</a:t>
+            </a:r>
+          </a:p>
+        </p:txBody>
+      </p:sp>
+      <p:sp>
+        <p:nvSpPr>
+          <p:cNvPr id="3" name="Vertical Text Placeholder 2">
+            <a:extLst>
+              <a:ext uri="{FF2B5EF4-FFF2-40B4-BE49-F238E27FC236}">
+                <a16:creationId xmlns:a16="http://schemas.microsoft.com/office/drawing/2014/main" id="{FA6FD25B-EB1E-40B3-8451-9CE88D9802FB}"/>
+              </a:ext>
+            </a:extLst>
+          </p:cNvPr>
+          <p:cNvSpPr>
+            <a:spLocks noGrp="1"/>
+          </p:cNvSpPr>
+          <p:nvPr>
+            <p:ph type="body" orient="vert" idx="1"/>
+          </p:nvPr>
+        </p:nvSpPr>
+        <p:spPr/>
+        <p:txBody>
+          <a:bodyPr vert="eaVert"/>
+          <a:lstStyle/>
+          <a:p>
+            <a:pPr lvl="0"/>
+            <a:r>
+              <a:rPr lang="en-US"/>
+              <a:t>Click to edit Master text styles</a:t>
+            </a:r>
+          </a:p>
+          <a:p>
+            <a:pPr lvl="1"/>
+            <a:r>
+              <a:rPr lang="en-US"/>
+              <a:t>Second level</a:t>
+            </a:r>
+          </a:p>
+          <a:p>
+            <a:pPr lvl="2"/>
+            <a:r>
+              <a:rPr lang="en-US"/>
+              <a:t>Third level</a:t>
+            </a:r>
+          </a:p>
+          <a:p>
+            <a:pPr lvl="3"/>
+            <a:r>
+              <a:rPr lang="en-US"/>
+              <a:t>Fourth level</a:t>
+            </a:r>
+          </a:p>
+          <a:p>
+            <a:pPr lvl="4"/>
+            <a:r>
+              <a:rPr lang="en-US"/>
+              <a:t>Fifth level</a:t>
+            </a:r>
+          </a:p>
+        </p:txBody>
+      </p:sp>
+      <p:sp>
+        <p:nvSpPr>
+          <p:cNvPr id="4" name="Date Placeholder 3">
+            <a:extLst>
+              <a:ext uri="{FF2B5EF4-FFF2-40B4-BE49-F238E27FC236}">
+                <a16:creationId xmlns:a16="http://schemas.microsoft.com/office/drawing/2014/main" id="{1AF20F51-AEE7-4B68-AA2A-CFCDE71FDC77}"/>
+              </a:ext>
+            </a:extLst>
+          </p:cNvPr>
+          <p:cNvSpPr>
+            <a:spLocks noGrp="1"/>
+          </p:cNvSpPr>
+          <p:nvPr>
+            <p:ph type="dt" sz="half" idx="10"/>
+          </p:nvPr>
+        </p:nvSpPr>
+        <p:spPr/>
+        <p:txBody>
+          <a:bodyPr/>
+          <a:lstStyle/>
+          <a:p>
+            <a:fld id="{3EA7974F-46A4-4C38-BBCC-8E262B881B28}" type="datetimeFigureOut">
               <a:rPr lang="en-US" smtClean="0"/>
-              <a:t>Click to edit Master title style</a:t>
-            </a:r>
-            <a:endParaRPr lang="en-US"/>
-          </a:p>
-        </p:txBody>
-      </p:sp>
-      <p:sp>
-        <p:nvSpPr>
-          <p:cNvPr id="3" name="Vertical Text Placeholder 2"/>
-          <p:cNvSpPr>
-            <a:spLocks noGrp="1"/>
-          </p:cNvSpPr>
-          <p:nvPr>
-            <p:ph type="body" orient="vert" idx="1"/>
-          </p:nvPr>
-        </p:nvSpPr>
-        <p:spPr/>
-        <p:txBody>
-          <a:bodyPr vert="eaVert"/>
-          <a:lstStyle/>
-          <a:p>
-            <a:pPr lvl="0"/>
-            <a:r>
-              <a:rPr lang="en-US" smtClean="0"/>
-              <a:t>Click to edit Master text styles</a:t>
-            </a:r>
-          </a:p>
-          <a:p>
-            <a:pPr lvl="1"/>
-            <a:r>
-              <a:rPr lang="en-US" smtClean="0"/>
-              <a:t>Second level</a:t>
-            </a:r>
-          </a:p>
-          <a:p>
-            <a:pPr lvl="2"/>
-            <a:r>
-              <a:rPr lang="en-US" smtClean="0"/>
-              <a:t>Third level</a:t>
-            </a:r>
-          </a:p>
-          <a:p>
-            <a:pPr lvl="3"/>
-            <a:r>
-              <a:rPr lang="en-US" smtClean="0"/>
-              <a:t>Fourth level</a:t>
-            </a:r>
-          </a:p>
-          <a:p>
-            <a:pPr lvl="4"/>
-            <a:r>
-              <a:rPr lang="en-US" smtClean="0"/>
-              <a:t>Fifth level</a:t>
-            </a:r>
-            <a:endParaRPr lang="en-US"/>
-          </a:p>
-        </p:txBody>
-      </p:sp>
-      <p:sp>
-        <p:nvSpPr>
-          <p:cNvPr id="4" name="Date Placeholder 3"/>
-          <p:cNvSpPr>
-            <a:spLocks noGrp="1"/>
-          </p:cNvSpPr>
-          <p:nvPr>
-            <p:ph type="dt" sz="half" idx="10"/>
-          </p:nvPr>
-        </p:nvSpPr>
-        <p:spPr/>
-        <p:txBody>
-          <a:bodyPr/>
-          <a:lstStyle/>
-          <a:p>
-            <a:fld id="{241EB5C9-1307-BA42-ABA2-0BC069CD8E7F}" type="datetimeFigureOut">
-              <a:rPr lang="en-US" smtClean="0"/>
-              <a:t>4/5/2019</a:t>
+              <a:t>10/18/2020</a:t>
             </a:fld>
             <a:endParaRPr lang="en-US"/>
           </a:p>
@@ -496,7 +549,13 @@
       </p:sp>
       <p:sp>
         <p:nvSpPr>
-          <p:cNvPr id="5" name="Footer Placeholder 4"/>
+          <p:cNvPr id="5" name="Footer Placeholder 4">
+            <a:extLst>
+              <a:ext uri="{FF2B5EF4-FFF2-40B4-BE49-F238E27FC236}">
+                <a16:creationId xmlns:a16="http://schemas.microsoft.com/office/drawing/2014/main" id="{D0E67565-3261-428A-A4F1-46339A44AC84}"/>
+              </a:ext>
+            </a:extLst>
+          </p:cNvPr>
           <p:cNvSpPr>
             <a:spLocks noGrp="1"/>
           </p:cNvSpPr>
@@ -515,7 +574,13 @@
       </p:sp>
       <p:sp>
         <p:nvSpPr>
-          <p:cNvPr id="6" name="Slide Number Placeholder 5"/>
+          <p:cNvPr id="6" name="Slide Number Placeholder 5">
+            <a:extLst>
+              <a:ext uri="{FF2B5EF4-FFF2-40B4-BE49-F238E27FC236}">
+                <a16:creationId xmlns:a16="http://schemas.microsoft.com/office/drawing/2014/main" id="{36D90C68-CFD2-4740-9872-EDF5794D09C0}"/>
+              </a:ext>
+            </a:extLst>
+          </p:cNvPr>
           <p:cNvSpPr>
             <a:spLocks noGrp="1"/>
           </p:cNvSpPr>
@@ -528,7 +593,7 @@
           <a:bodyPr/>
           <a:lstStyle/>
           <a:p>
-            <a:fld id="{C5EF2332-01BF-834F-8236-50238282D533}" type="slidenum">
+            <a:fld id="{1C3A5439-F9F3-4052-B329-868ECC3EAFBE}" type="slidenum">
               <a:rPr lang="en-US" smtClean="0"/>
               <a:t>‹#›</a:t>
             </a:fld>
@@ -539,7 +604,7 @@
     </p:spTree>
     <p:extLst>
       <p:ext uri="{BB962C8B-B14F-4D97-AF65-F5344CB8AC3E}">
-        <p14:creationId xmlns:p14="http://schemas.microsoft.com/office/powerpoint/2010/main" val="313914798"/>
+        <p14:creationId xmlns:p14="http://schemas.microsoft.com/office/powerpoint/2010/main" val="1893944316"/>
       </p:ext>
     </p:extLst>
   </p:cSld>
@@ -568,7 +633,13 @@
       </p:grpSpPr>
       <p:sp>
         <p:nvSpPr>
-          <p:cNvPr id="2" name="Vertical Title 1"/>
+          <p:cNvPr id="2" name="Vertical Title 1">
+            <a:extLst>
+              <a:ext uri="{FF2B5EF4-FFF2-40B4-BE49-F238E27FC236}">
+                <a16:creationId xmlns:a16="http://schemas.microsoft.com/office/drawing/2014/main" id="{C6DEFB6D-D995-442D-94D4-38CFFDCE8949}"/>
+              </a:ext>
+            </a:extLst>
+          </p:cNvPr>
           <p:cNvSpPr>
             <a:spLocks noGrp="1"/>
           </p:cNvSpPr>
@@ -578,8 +649,8 @@
         </p:nvSpPr>
         <p:spPr>
           <a:xfrm>
-            <a:off x="6629400" y="274638"/>
-            <a:ext cx="2057400" cy="5851525"/>
+            <a:off x="8724900" y="365125"/>
+            <a:ext cx="2628900" cy="5811838"/>
           </a:xfrm>
         </p:spPr>
         <p:txBody>
@@ -587,16 +658,21 @@
           <a:lstStyle/>
           <a:p>
             <a:r>
-              <a:rPr lang="en-US" smtClean="0"/>
+              <a:rPr lang="en-US"/>
               <a:t>Click to edit Master title style</a:t>
             </a:r>
-            <a:endParaRPr lang="en-US"/>
-          </a:p>
-        </p:txBody>
-      </p:sp>
-      <p:sp>
-        <p:nvSpPr>
-          <p:cNvPr id="3" name="Vertical Text Placeholder 2"/>
+          </a:p>
+        </p:txBody>
+      </p:sp>
+      <p:sp>
+        <p:nvSpPr>
+          <p:cNvPr id="3" name="Vertical Text Placeholder 2">
+            <a:extLst>
+              <a:ext uri="{FF2B5EF4-FFF2-40B4-BE49-F238E27FC236}">
+                <a16:creationId xmlns:a16="http://schemas.microsoft.com/office/drawing/2014/main" id="{9054263D-27EE-4C4F-BC98-252909956447}"/>
+              </a:ext>
+            </a:extLst>
+          </p:cNvPr>
           <p:cNvSpPr>
             <a:spLocks noGrp="1"/>
           </p:cNvSpPr>
@@ -606,8 +682,8 @@
         </p:nvSpPr>
         <p:spPr>
           <a:xfrm>
-            <a:off x="457200" y="274638"/>
-            <a:ext cx="6019800" cy="5851525"/>
+            <a:off x="838200" y="365125"/>
+            <a:ext cx="7734300" cy="5811838"/>
           </a:xfrm>
         </p:spPr>
         <p:txBody>
@@ -616,59 +692,64 @@
           <a:p>
             <a:pPr lvl="0"/>
             <a:r>
+              <a:rPr lang="en-US"/>
+              <a:t>Click to edit Master text styles</a:t>
+            </a:r>
+          </a:p>
+          <a:p>
+            <a:pPr lvl="1"/>
+            <a:r>
+              <a:rPr lang="en-US"/>
+              <a:t>Second level</a:t>
+            </a:r>
+          </a:p>
+          <a:p>
+            <a:pPr lvl="2"/>
+            <a:r>
+              <a:rPr lang="en-US"/>
+              <a:t>Third level</a:t>
+            </a:r>
+          </a:p>
+          <a:p>
+            <a:pPr lvl="3"/>
+            <a:r>
+              <a:rPr lang="en-US"/>
+              <a:t>Fourth level</a:t>
+            </a:r>
+          </a:p>
+          <a:p>
+            <a:pPr lvl="4"/>
+            <a:r>
+              <a:rPr lang="en-US"/>
+              <a:t>Fifth level</a:t>
+            </a:r>
+          </a:p>
+        </p:txBody>
+      </p:sp>
+      <p:sp>
+        <p:nvSpPr>
+          <p:cNvPr id="4" name="Date Placeholder 3">
+            <a:extLst>
+              <a:ext uri="{FF2B5EF4-FFF2-40B4-BE49-F238E27FC236}">
+                <a16:creationId xmlns:a16="http://schemas.microsoft.com/office/drawing/2014/main" id="{ADC86EF2-C790-4655-80EA-4A68F53B8966}"/>
+              </a:ext>
+            </a:extLst>
+          </p:cNvPr>
+          <p:cNvSpPr>
+            <a:spLocks noGrp="1"/>
+          </p:cNvSpPr>
+          <p:nvPr>
+            <p:ph type="dt" sz="half" idx="10"/>
+          </p:nvPr>
+        </p:nvSpPr>
+        <p:spPr/>
+        <p:txBody>
+          <a:bodyPr/>
+          <a:lstStyle/>
+          <a:p>
+            <a:fld id="{3EA7974F-46A4-4C38-BBCC-8E262B881B28}" type="datetimeFigureOut">
               <a:rPr lang="en-US" smtClean="0"/>
-              <a:t>Click to edit Master text styles</a:t>
-            </a:r>
-          </a:p>
-          <a:p>
-            <a:pPr lvl="1"/>
-            <a:r>
-              <a:rPr lang="en-US" smtClean="0"/>
-              <a:t>Second level</a:t>
-            </a:r>
-          </a:p>
-          <a:p>
-            <a:pPr lvl="2"/>
-            <a:r>
-              <a:rPr lang="en-US" smtClean="0"/>
-              <a:t>Third level</a:t>
-            </a:r>
-          </a:p>
-          <a:p>
-            <a:pPr lvl="3"/>
-            <a:r>
-              <a:rPr lang="en-US" smtClean="0"/>
-              <a:t>Fourth level</a:t>
-            </a:r>
-          </a:p>
-          <a:p>
-            <a:pPr lvl="4"/>
-            <a:r>
-              <a:rPr lang="en-US" smtClean="0"/>
-              <a:t>Fifth level</a:t>
-            </a:r>
-            <a:endParaRPr lang="en-US"/>
-          </a:p>
-        </p:txBody>
-      </p:sp>
-      <p:sp>
-        <p:nvSpPr>
-          <p:cNvPr id="4" name="Date Placeholder 3"/>
-          <p:cNvSpPr>
-            <a:spLocks noGrp="1"/>
-          </p:cNvSpPr>
-          <p:nvPr>
-            <p:ph type="dt" sz="half" idx="10"/>
-          </p:nvPr>
-        </p:nvSpPr>
-        <p:spPr/>
-        <p:txBody>
-          <a:bodyPr/>
-          <a:lstStyle/>
-          <a:p>
-            <a:fld id="{241EB5C9-1307-BA42-ABA2-0BC069CD8E7F}" type="datetimeFigureOut">
-              <a:rPr lang="en-US" smtClean="0"/>
-              <a:t>4/5/2019</a:t>
+              <a:t>10/18/2020</a:t>
             </a:fld>
             <a:endParaRPr lang="en-US"/>
           </a:p>
@@ -676,7 +757,13 @@
       </p:sp>
       <p:sp>
         <p:nvSpPr>
-          <p:cNvPr id="5" name="Footer Placeholder 4"/>
+          <p:cNvPr id="5" name="Footer Placeholder 4">
+            <a:extLst>
+              <a:ext uri="{FF2B5EF4-FFF2-40B4-BE49-F238E27FC236}">
+                <a16:creationId xmlns:a16="http://schemas.microsoft.com/office/drawing/2014/main" id="{D7936259-9DC1-44B6-A6C3-8B9C547F0038}"/>
+              </a:ext>
+            </a:extLst>
+          </p:cNvPr>
           <p:cNvSpPr>
             <a:spLocks noGrp="1"/>
           </p:cNvSpPr>
@@ -695,7 +782,13 @@
       </p:sp>
       <p:sp>
         <p:nvSpPr>
-          <p:cNvPr id="6" name="Slide Number Placeholder 5"/>
+          <p:cNvPr id="6" name="Slide Number Placeholder 5">
+            <a:extLst>
+              <a:ext uri="{FF2B5EF4-FFF2-40B4-BE49-F238E27FC236}">
+                <a16:creationId xmlns:a16="http://schemas.microsoft.com/office/drawing/2014/main" id="{30672A6F-4B5A-4754-BC55-DFB660FF56DE}"/>
+              </a:ext>
+            </a:extLst>
+          </p:cNvPr>
           <p:cNvSpPr>
             <a:spLocks noGrp="1"/>
           </p:cNvSpPr>
@@ -708,7 +801,7 @@
           <a:bodyPr/>
           <a:lstStyle/>
           <a:p>
-            <a:fld id="{C5EF2332-01BF-834F-8236-50238282D533}" type="slidenum">
+            <a:fld id="{1C3A5439-F9F3-4052-B329-868ECC3EAFBE}" type="slidenum">
               <a:rPr lang="en-US" smtClean="0"/>
               <a:t>‹#›</a:t>
             </a:fld>
@@ -719,7 +812,7 @@
     </p:spTree>
     <p:extLst>
       <p:ext uri="{BB962C8B-B14F-4D97-AF65-F5344CB8AC3E}">
-        <p14:creationId xmlns:p14="http://schemas.microsoft.com/office/powerpoint/2010/main" val="2581529045"/>
+        <p14:creationId xmlns:p14="http://schemas.microsoft.com/office/powerpoint/2010/main" val="383000729"/>
       </p:ext>
     </p:extLst>
   </p:cSld>
@@ -748,7 +841,13 @@
       </p:grpSpPr>
       <p:sp>
         <p:nvSpPr>
-          <p:cNvPr id="2" name="Title 1"/>
+          <p:cNvPr id="2" name="Title 1">
+            <a:extLst>
+              <a:ext uri="{FF2B5EF4-FFF2-40B4-BE49-F238E27FC236}">
+                <a16:creationId xmlns:a16="http://schemas.microsoft.com/office/drawing/2014/main" id="{0D064A50-2A97-421C-813D-6449089693A0}"/>
+              </a:ext>
+            </a:extLst>
+          </p:cNvPr>
           <p:cNvSpPr>
             <a:spLocks noGrp="1"/>
           </p:cNvSpPr>
@@ -759,24 +858,115 @@
         <p:spPr/>
         <p:txBody>
           <a:bodyPr/>
-          <a:lstStyle/>
-          <a:p>
-            <a:r>
-              <a:rPr lang="en-US" smtClean="0"/>
+          <a:lstStyle>
+            <a:lvl1pPr>
+              <a:defRPr b="1"/>
+            </a:lvl1pPr>
+          </a:lstStyle>
+          <a:p>
+            <a:r>
+              <a:rPr lang="en-US" dirty="0"/>
               <a:t>Click to edit Master title style</a:t>
             </a:r>
+          </a:p>
+        </p:txBody>
+      </p:sp>
+      <p:sp>
+        <p:nvSpPr>
+          <p:cNvPr id="3" name="Content Placeholder 2">
+            <a:extLst>
+              <a:ext uri="{FF2B5EF4-FFF2-40B4-BE49-F238E27FC236}">
+                <a16:creationId xmlns:a16="http://schemas.microsoft.com/office/drawing/2014/main" id="{C0E34547-063B-468C-B841-DB8C0206424E}"/>
+              </a:ext>
+            </a:extLst>
+          </p:cNvPr>
+          <p:cNvSpPr>
+            <a:spLocks noGrp="1"/>
+          </p:cNvSpPr>
+          <p:nvPr>
+            <p:ph idx="1"/>
+          </p:nvPr>
+        </p:nvSpPr>
+        <p:spPr/>
+        <p:txBody>
+          <a:bodyPr/>
+          <a:lstStyle/>
+          <a:p>
+            <a:pPr lvl="0"/>
+            <a:r>
+              <a:rPr lang="en-US" dirty="0"/>
+              <a:t>Click to edit Master text styles</a:t>
+            </a:r>
+          </a:p>
+          <a:p>
+            <a:pPr lvl="1"/>
+            <a:r>
+              <a:rPr lang="en-US" dirty="0"/>
+              <a:t>Second level</a:t>
+            </a:r>
+          </a:p>
+          <a:p>
+            <a:pPr lvl="2"/>
+            <a:r>
+              <a:rPr lang="en-US" dirty="0"/>
+              <a:t>Third level</a:t>
+            </a:r>
+          </a:p>
+          <a:p>
+            <a:pPr lvl="3"/>
+            <a:r>
+              <a:rPr lang="en-US" dirty="0"/>
+              <a:t>Fourth level</a:t>
+            </a:r>
+          </a:p>
+          <a:p>
+            <a:pPr lvl="4"/>
+            <a:r>
+              <a:rPr lang="en-US" dirty="0"/>
+              <a:t>Fifth level</a:t>
+            </a:r>
+          </a:p>
+        </p:txBody>
+      </p:sp>
+      <p:sp>
+        <p:nvSpPr>
+          <p:cNvPr id="5" name="Footer Placeholder 4">
+            <a:extLst>
+              <a:ext uri="{FF2B5EF4-FFF2-40B4-BE49-F238E27FC236}">
+                <a16:creationId xmlns:a16="http://schemas.microsoft.com/office/drawing/2014/main" id="{55C3A83D-9A07-4FF4-8272-C2ED73DC95CD}"/>
+              </a:ext>
+            </a:extLst>
+          </p:cNvPr>
+          <p:cNvSpPr>
+            <a:spLocks noGrp="1"/>
+          </p:cNvSpPr>
+          <p:nvPr>
+            <p:ph type="ftr" sz="quarter" idx="11"/>
+          </p:nvPr>
+        </p:nvSpPr>
+        <p:spPr/>
+        <p:txBody>
+          <a:bodyPr/>
+          <a:lstStyle/>
+          <a:p>
             <a:endParaRPr lang="en-US"/>
           </a:p>
         </p:txBody>
       </p:sp>
       <p:sp>
         <p:nvSpPr>
-          <p:cNvPr id="3" name="Content Placeholder 2"/>
-          <p:cNvSpPr>
-            <a:spLocks noGrp="1"/>
-          </p:cNvSpPr>
-          <p:nvPr>
-            <p:ph idx="1"/>
+          <p:cNvPr id="6" name="Slide Number Placeholder 5">
+            <a:extLst>
+              <a:ext uri="{FF2B5EF4-FFF2-40B4-BE49-F238E27FC236}">
+                <a16:creationId xmlns:a16="http://schemas.microsoft.com/office/drawing/2014/main" id="{92181581-37C2-4EF6-9ABF-7C70ABED30FC}"/>
+              </a:ext>
+            </a:extLst>
+          </p:cNvPr>
+          <p:cNvSpPr>
+            <a:spLocks noGrp="1"/>
+          </p:cNvSpPr>
+          <p:nvPr>
+            <p:ph type="sldNum" sz="quarter" idx="12"/>
           </p:nvPr>
         </p:nvSpPr>
         <p:spPr/>
@@ -784,101 +974,7 @@
           <a:bodyPr/>
           <a:lstStyle/>
           <a:p>
-            <a:pPr lvl="0"/>
-            <a:r>
-              <a:rPr lang="en-US" smtClean="0"/>
-              <a:t>Click to edit Master text styles</a:t>
-            </a:r>
-          </a:p>
-          <a:p>
-            <a:pPr lvl="1"/>
-            <a:r>
-              <a:rPr lang="en-US" smtClean="0"/>
-              <a:t>Second level</a:t>
-            </a:r>
-          </a:p>
-          <a:p>
-            <a:pPr lvl="2"/>
-            <a:r>
-              <a:rPr lang="en-US" smtClean="0"/>
-              <a:t>Third level</a:t>
-            </a:r>
-          </a:p>
-          <a:p>
-            <a:pPr lvl="3"/>
-            <a:r>
-              <a:rPr lang="en-US" smtClean="0"/>
-              <a:t>Fourth level</a:t>
-            </a:r>
-          </a:p>
-          <a:p>
-            <a:pPr lvl="4"/>
-            <a:r>
-              <a:rPr lang="en-US" smtClean="0"/>
-              <a:t>Fifth level</a:t>
-            </a:r>
-            <a:endParaRPr lang="en-US"/>
-          </a:p>
-        </p:txBody>
-      </p:sp>
-      <p:sp>
-        <p:nvSpPr>
-          <p:cNvPr id="4" name="Date Placeholder 3"/>
-          <p:cNvSpPr>
-            <a:spLocks noGrp="1"/>
-          </p:cNvSpPr>
-          <p:nvPr>
-            <p:ph type="dt" sz="half" idx="10"/>
-          </p:nvPr>
-        </p:nvSpPr>
-        <p:spPr/>
-        <p:txBody>
-          <a:bodyPr/>
-          <a:lstStyle/>
-          <a:p>
-            <a:fld id="{241EB5C9-1307-BA42-ABA2-0BC069CD8E7F}" type="datetimeFigureOut">
-              <a:rPr lang="en-US" smtClean="0"/>
-              <a:t>4/5/2019</a:t>
-            </a:fld>
-            <a:endParaRPr lang="en-US"/>
-          </a:p>
-        </p:txBody>
-      </p:sp>
-      <p:sp>
-        <p:nvSpPr>
-          <p:cNvPr id="5" name="Footer Placeholder 4"/>
-          <p:cNvSpPr>
-            <a:spLocks noGrp="1"/>
-          </p:cNvSpPr>
-          <p:nvPr>
-            <p:ph type="ftr" sz="quarter" idx="11"/>
-          </p:nvPr>
-        </p:nvSpPr>
-        <p:spPr/>
-        <p:txBody>
-          <a:bodyPr/>
-          <a:lstStyle/>
-          <a:p>
-            <a:endParaRPr lang="en-US"/>
-          </a:p>
-        </p:txBody>
-      </p:sp>
-      <p:sp>
-        <p:nvSpPr>
-          <p:cNvPr id="6" name="Slide Number Placeholder 5"/>
-          <p:cNvSpPr>
-            <a:spLocks noGrp="1"/>
-          </p:cNvSpPr>
-          <p:nvPr>
-            <p:ph type="sldNum" sz="quarter" idx="12"/>
-          </p:nvPr>
-        </p:nvSpPr>
-        <p:spPr/>
-        <p:txBody>
-          <a:bodyPr/>
-          <a:lstStyle/>
-          <a:p>
-            <a:fld id="{C5EF2332-01BF-834F-8236-50238282D533}" type="slidenum">
+            <a:fld id="{1C3A5439-F9F3-4052-B329-868ECC3EAFBE}" type="slidenum">
               <a:rPr lang="en-US" smtClean="0"/>
               <a:t>‹#›</a:t>
             </a:fld>
@@ -886,10 +982,46 @@
           </a:p>
         </p:txBody>
       </p:sp>
+      <p:pic>
+        <p:nvPicPr>
+          <p:cNvPr id="8" name="Picture 7">
+            <a:extLst>
+              <a:ext uri="{FF2B5EF4-FFF2-40B4-BE49-F238E27FC236}">
+                <a16:creationId xmlns:a16="http://schemas.microsoft.com/office/drawing/2014/main" id="{2A7F6AE7-A1FE-490F-8E28-27BC5DA9D42E}"/>
+              </a:ext>
+            </a:extLst>
+          </p:cNvPr>
+          <p:cNvPicPr>
+            <a:picLocks noChangeAspect="1"/>
+          </p:cNvPicPr>
+          <p:nvPr userDrawn="1"/>
+        </p:nvPicPr>
+        <p:blipFill>
+          <a:blip r:embed="rId2">
+            <a:extLst>
+              <a:ext uri="{28A0092B-C50C-407E-A947-70E740481C1C}">
+                <a14:useLocalDpi xmlns:a14="http://schemas.microsoft.com/office/drawing/2010/main" val="0"/>
+              </a:ext>
+            </a:extLst>
+          </a:blip>
+          <a:stretch>
+            <a:fillRect/>
+          </a:stretch>
+        </p:blipFill>
+        <p:spPr>
+          <a:xfrm>
+            <a:off x="0" y="5816771"/>
+            <a:ext cx="1496398" cy="926757"/>
+          </a:xfrm>
+          <a:prstGeom prst="rect">
+            <a:avLst/>
+          </a:prstGeom>
+        </p:spPr>
+      </p:pic>
     </p:spTree>
     <p:extLst>
       <p:ext uri="{BB962C8B-B14F-4D97-AF65-F5344CB8AC3E}">
-        <p14:creationId xmlns:p14="http://schemas.microsoft.com/office/powerpoint/2010/main" val="338346009"/>
+        <p14:creationId xmlns:p14="http://schemas.microsoft.com/office/powerpoint/2010/main" val="3076750735"/>
       </p:ext>
     </p:extLst>
   </p:cSld>
@@ -902,6 +1034,16 @@
 <file path=ppt/slideLayouts/slideLayout3.xml><?xml version="1.0" encoding="utf-8"?>
 <p:sldLayout xmlns:a="http://schemas.openxmlformats.org/drawingml/2006/main" xmlns:r="http://schemas.openxmlformats.org/officeDocument/2006/relationships" xmlns:p="http://schemas.openxmlformats.org/presentationml/2006/main" type="secHead" preserve="1">
   <p:cSld name="Section Header">
+    <p:bg>
+      <p:bgPr>
+        <a:solidFill>
+          <a:schemeClr val="bg1">
+            <a:lumMod val="85000"/>
+          </a:schemeClr>
+        </a:solidFill>
+        <a:effectLst/>
+      </p:bgPr>
+    </p:bg>
     <p:spTree>
       <p:nvGrpSpPr>
         <p:cNvPr id="1" name=""/>
@@ -918,7 +1060,13 @@
       </p:grpSpPr>
       <p:sp>
         <p:nvSpPr>
-          <p:cNvPr id="2" name="Title 1"/>
+          <p:cNvPr id="2" name="Title 1">
+            <a:extLst>
+              <a:ext uri="{FF2B5EF4-FFF2-40B4-BE49-F238E27FC236}">
+                <a16:creationId xmlns:a16="http://schemas.microsoft.com/office/drawing/2014/main" id="{1CAF8530-DA25-40F0-835B-ABF68B3EB818}"/>
+              </a:ext>
+            </a:extLst>
+          </p:cNvPr>
           <p:cNvSpPr>
             <a:spLocks noGrp="1"/>
           </p:cNvSpPr>
@@ -928,29 +1076,34 @@
         </p:nvSpPr>
         <p:spPr>
           <a:xfrm>
-            <a:off x="722313" y="4406900"/>
-            <a:ext cx="7772400" cy="1362075"/>
+            <a:off x="831850" y="1123072"/>
+            <a:ext cx="10515600" cy="2852737"/>
           </a:xfrm>
         </p:spPr>
         <p:txBody>
           <a:bodyPr anchor="t"/>
           <a:lstStyle>
-            <a:lvl1pPr algn="l">
-              <a:defRPr sz="4000" b="1" cap="all"/>
+            <a:lvl1pPr>
+              <a:defRPr sz="6000" b="1"/>
             </a:lvl1pPr>
           </a:lstStyle>
           <a:p>
             <a:r>
-              <a:rPr lang="en-US" smtClean="0"/>
+              <a:rPr lang="en-US" dirty="0"/>
               <a:t>Click to edit Master title style</a:t>
             </a:r>
-            <a:endParaRPr lang="en-US"/>
-          </a:p>
-        </p:txBody>
-      </p:sp>
-      <p:sp>
-        <p:nvSpPr>
-          <p:cNvPr id="3" name="Text Placeholder 2"/>
+          </a:p>
+        </p:txBody>
+      </p:sp>
+      <p:sp>
+        <p:nvSpPr>
+          <p:cNvPr id="3" name="Text Placeholder 2">
+            <a:extLst>
+              <a:ext uri="{FF2B5EF4-FFF2-40B4-BE49-F238E27FC236}">
+                <a16:creationId xmlns:a16="http://schemas.microsoft.com/office/drawing/2014/main" id="{0B4E4962-60E4-4796-991D-A9D0F592350D}"/>
+              </a:ext>
+            </a:extLst>
+          </p:cNvPr>
           <p:cNvSpPr>
             <a:spLocks noGrp="1"/>
           </p:cNvSpPr>
@@ -960,16 +1113,16 @@
         </p:nvSpPr>
         <p:spPr>
           <a:xfrm>
-            <a:off x="722313" y="2906713"/>
-            <a:ext cx="7772400" cy="1500187"/>
+            <a:off x="831850" y="4589463"/>
+            <a:ext cx="10515600" cy="1500187"/>
           </a:xfrm>
         </p:spPr>
         <p:txBody>
-          <a:bodyPr anchor="b"/>
+          <a:bodyPr/>
           <a:lstStyle>
             <a:lvl1pPr marL="0" indent="0">
               <a:buNone/>
-              <a:defRPr sz="2000">
+              <a:defRPr sz="2400">
                 <a:solidFill>
                   <a:schemeClr val="tx1">
                     <a:tint val="75000"/>
@@ -979,7 +1132,7 @@
             </a:lvl1pPr>
             <a:lvl2pPr marL="457200" indent="0">
               <a:buNone/>
-              <a:defRPr sz="1800">
+              <a:defRPr sz="2000">
                 <a:solidFill>
                   <a:schemeClr val="tx1">
                     <a:tint val="75000"/>
@@ -989,7 +1142,7 @@
             </a:lvl2pPr>
             <a:lvl3pPr marL="914400" indent="0">
               <a:buNone/>
-              <a:defRPr sz="1600">
+              <a:defRPr sz="1800">
                 <a:solidFill>
                   <a:schemeClr val="tx1">
                     <a:tint val="75000"/>
@@ -999,7 +1152,7 @@
             </a:lvl3pPr>
             <a:lvl4pPr marL="1371600" indent="0">
               <a:buNone/>
-              <a:defRPr sz="1400">
+              <a:defRPr sz="1600">
                 <a:solidFill>
                   <a:schemeClr val="tx1">
                     <a:tint val="75000"/>
@@ -1009,7 +1162,7 @@
             </a:lvl4pPr>
             <a:lvl5pPr marL="1828800" indent="0">
               <a:buNone/>
-              <a:defRPr sz="1400">
+              <a:defRPr sz="1600">
                 <a:solidFill>
                   <a:schemeClr val="tx1">
                     <a:tint val="75000"/>
@@ -1019,7 +1172,7 @@
             </a:lvl5pPr>
             <a:lvl6pPr marL="2286000" indent="0">
               <a:buNone/>
-              <a:defRPr sz="1400">
+              <a:defRPr sz="1600">
                 <a:solidFill>
                   <a:schemeClr val="tx1">
                     <a:tint val="75000"/>
@@ -1029,7 +1182,7 @@
             </a:lvl6pPr>
             <a:lvl7pPr marL="2743200" indent="0">
               <a:buNone/>
-              <a:defRPr sz="1400">
+              <a:defRPr sz="1600">
                 <a:solidFill>
                   <a:schemeClr val="tx1">
                     <a:tint val="75000"/>
@@ -1039,7 +1192,7 @@
             </a:lvl7pPr>
             <a:lvl8pPr marL="3200400" indent="0">
               <a:buNone/>
-              <a:defRPr sz="1400">
+              <a:defRPr sz="1600">
                 <a:solidFill>
                   <a:schemeClr val="tx1">
                     <a:tint val="75000"/>
@@ -1049,7 +1202,7 @@
             </a:lvl8pPr>
             <a:lvl9pPr marL="3657600" indent="0">
               <a:buNone/>
-              <a:defRPr sz="1400">
+              <a:defRPr sz="1600">
                 <a:solidFill>
                   <a:schemeClr val="tx1">
                     <a:tint val="75000"/>
@@ -1061,7 +1214,7 @@
           <a:p>
             <a:pPr lvl="0"/>
             <a:r>
-              <a:rPr lang="en-US" smtClean="0"/>
+              <a:rPr lang="en-US"/>
               <a:t>Click to edit Master text styles</a:t>
             </a:r>
           </a:p>
@@ -1069,12 +1222,18 @@
       </p:sp>
       <p:sp>
         <p:nvSpPr>
-          <p:cNvPr id="4" name="Date Placeholder 3"/>
-          <p:cNvSpPr>
-            <a:spLocks noGrp="1"/>
-          </p:cNvSpPr>
-          <p:nvPr>
-            <p:ph type="dt" sz="half" idx="10"/>
+          <p:cNvPr id="5" name="Footer Placeholder 4">
+            <a:extLst>
+              <a:ext uri="{FF2B5EF4-FFF2-40B4-BE49-F238E27FC236}">
+                <a16:creationId xmlns:a16="http://schemas.microsoft.com/office/drawing/2014/main" id="{6676315B-0BC3-4A6E-9FE8-8A662637DB71}"/>
+              </a:ext>
+            </a:extLst>
+          </p:cNvPr>
+          <p:cNvSpPr>
+            <a:spLocks noGrp="1"/>
+          </p:cNvSpPr>
+          <p:nvPr>
+            <p:ph type="ftr" sz="quarter" idx="11"/>
           </p:nvPr>
         </p:nvSpPr>
         <p:spPr/>
@@ -1082,22 +1241,24 @@
           <a:bodyPr/>
           <a:lstStyle/>
           <a:p>
-            <a:fld id="{241EB5C9-1307-BA42-ABA2-0BC069CD8E7F}" type="datetimeFigureOut">
-              <a:rPr lang="en-US" smtClean="0"/>
-              <a:t>4/5/2019</a:t>
-            </a:fld>
             <a:endParaRPr lang="en-US"/>
           </a:p>
         </p:txBody>
       </p:sp>
       <p:sp>
         <p:nvSpPr>
-          <p:cNvPr id="5" name="Footer Placeholder 4"/>
-          <p:cNvSpPr>
-            <a:spLocks noGrp="1"/>
-          </p:cNvSpPr>
-          <p:nvPr>
-            <p:ph type="ftr" sz="quarter" idx="11"/>
+          <p:cNvPr id="6" name="Slide Number Placeholder 5">
+            <a:extLst>
+              <a:ext uri="{FF2B5EF4-FFF2-40B4-BE49-F238E27FC236}">
+                <a16:creationId xmlns:a16="http://schemas.microsoft.com/office/drawing/2014/main" id="{2B534EE0-371B-4BEC-8D5C-2AEA96A83E1E}"/>
+              </a:ext>
+            </a:extLst>
+          </p:cNvPr>
+          <p:cNvSpPr>
+            <a:spLocks noGrp="1"/>
+          </p:cNvSpPr>
+          <p:nvPr>
+            <p:ph type="sldNum" sz="quarter" idx="12"/>
           </p:nvPr>
         </p:nvSpPr>
         <p:spPr/>
@@ -1105,26 +1266,7 @@
           <a:bodyPr/>
           <a:lstStyle/>
           <a:p>
-            <a:endParaRPr lang="en-US"/>
-          </a:p>
-        </p:txBody>
-      </p:sp>
-      <p:sp>
-        <p:nvSpPr>
-          <p:cNvPr id="6" name="Slide Number Placeholder 5"/>
-          <p:cNvSpPr>
-            <a:spLocks noGrp="1"/>
-          </p:cNvSpPr>
-          <p:nvPr>
-            <p:ph type="sldNum" sz="quarter" idx="12"/>
-          </p:nvPr>
-        </p:nvSpPr>
-        <p:spPr/>
-        <p:txBody>
-          <a:bodyPr/>
-          <a:lstStyle/>
-          <a:p>
-            <a:fld id="{C5EF2332-01BF-834F-8236-50238282D533}" type="slidenum">
+            <a:fld id="{1C3A5439-F9F3-4052-B329-868ECC3EAFBE}" type="slidenum">
               <a:rPr lang="en-US" smtClean="0"/>
               <a:t>‹#›</a:t>
             </a:fld>
@@ -1132,10 +1274,46 @@
           </a:p>
         </p:txBody>
       </p:sp>
+      <p:pic>
+        <p:nvPicPr>
+          <p:cNvPr id="7" name="Picture 6">
+            <a:extLst>
+              <a:ext uri="{FF2B5EF4-FFF2-40B4-BE49-F238E27FC236}">
+                <a16:creationId xmlns:a16="http://schemas.microsoft.com/office/drawing/2014/main" id="{57EBCCE7-6FDE-457A-AA02-09B6872F0FEC}"/>
+              </a:ext>
+            </a:extLst>
+          </p:cNvPr>
+          <p:cNvPicPr>
+            <a:picLocks noChangeAspect="1"/>
+          </p:cNvPicPr>
+          <p:nvPr userDrawn="1"/>
+        </p:nvPicPr>
+        <p:blipFill>
+          <a:blip r:embed="rId2">
+            <a:extLst>
+              <a:ext uri="{28A0092B-C50C-407E-A947-70E740481C1C}">
+                <a14:useLocalDpi xmlns:a14="http://schemas.microsoft.com/office/drawing/2010/main" val="0"/>
+              </a:ext>
+            </a:extLst>
+          </a:blip>
+          <a:stretch>
+            <a:fillRect/>
+          </a:stretch>
+        </p:blipFill>
+        <p:spPr>
+          <a:xfrm>
+            <a:off x="0" y="5816771"/>
+            <a:ext cx="1496398" cy="926757"/>
+          </a:xfrm>
+          <a:prstGeom prst="rect">
+            <a:avLst/>
+          </a:prstGeom>
+        </p:spPr>
+      </p:pic>
     </p:spTree>
     <p:extLst>
       <p:ext uri="{BB962C8B-B14F-4D97-AF65-F5344CB8AC3E}">
-        <p14:creationId xmlns:p14="http://schemas.microsoft.com/office/powerpoint/2010/main" val="1073069076"/>
+        <p14:creationId xmlns:p14="http://schemas.microsoft.com/office/powerpoint/2010/main" val="180487810"/>
       </p:ext>
     </p:extLst>
   </p:cSld>
@@ -1164,7 +1342,13 @@
       </p:grpSpPr>
       <p:sp>
         <p:nvSpPr>
-          <p:cNvPr id="2" name="Title 1"/>
+          <p:cNvPr id="2" name="Title 1">
+            <a:extLst>
+              <a:ext uri="{FF2B5EF4-FFF2-40B4-BE49-F238E27FC236}">
+                <a16:creationId xmlns:a16="http://schemas.microsoft.com/office/drawing/2014/main" id="{B238DE73-5589-4076-9AC2-3DEB41A62A14}"/>
+              </a:ext>
+            </a:extLst>
+          </p:cNvPr>
           <p:cNvSpPr>
             <a:spLocks noGrp="1"/>
           </p:cNvSpPr>
@@ -1175,19 +1359,28 @@
         <p:spPr/>
         <p:txBody>
           <a:bodyPr/>
-          <a:lstStyle/>
-          <a:p>
-            <a:r>
-              <a:rPr lang="en-US" smtClean="0"/>
+          <a:lstStyle>
+            <a:lvl1pPr>
+              <a:defRPr b="1"/>
+            </a:lvl1pPr>
+          </a:lstStyle>
+          <a:p>
+            <a:r>
+              <a:rPr lang="en-US" dirty="0"/>
               <a:t>Click to edit Master title style</a:t>
             </a:r>
-            <a:endParaRPr lang="en-US"/>
-          </a:p>
-        </p:txBody>
-      </p:sp>
-      <p:sp>
-        <p:nvSpPr>
-          <p:cNvPr id="3" name="Content Placeholder 2"/>
+          </a:p>
+        </p:txBody>
+      </p:sp>
+      <p:sp>
+        <p:nvSpPr>
+          <p:cNvPr id="3" name="Content Placeholder 2">
+            <a:extLst>
+              <a:ext uri="{FF2B5EF4-FFF2-40B4-BE49-F238E27FC236}">
+                <a16:creationId xmlns:a16="http://schemas.microsoft.com/office/drawing/2014/main" id="{F8F3EE56-D5AB-4147-9DFD-FA38CA3FA46D}"/>
+              </a:ext>
+            </a:extLst>
+          </p:cNvPr>
           <p:cNvSpPr>
             <a:spLocks noGrp="1"/>
           </p:cNvSpPr>
@@ -1197,82 +1390,59 @@
         </p:nvSpPr>
         <p:spPr>
           <a:xfrm>
-            <a:off x="457200" y="1600200"/>
-            <a:ext cx="4038600" cy="4525963"/>
+            <a:off x="838200" y="1825625"/>
+            <a:ext cx="5181600" cy="4351338"/>
           </a:xfrm>
         </p:spPr>
         <p:txBody>
           <a:bodyPr/>
-          <a:lstStyle>
-            <a:lvl1pPr>
-              <a:defRPr sz="2800"/>
-            </a:lvl1pPr>
-            <a:lvl2pPr>
-              <a:defRPr sz="2400"/>
-            </a:lvl2pPr>
-            <a:lvl3pPr>
-              <a:defRPr sz="2000"/>
-            </a:lvl3pPr>
-            <a:lvl4pPr>
-              <a:defRPr sz="1800"/>
-            </a:lvl4pPr>
-            <a:lvl5pPr>
-              <a:defRPr sz="1800"/>
-            </a:lvl5pPr>
-            <a:lvl6pPr>
-              <a:defRPr sz="1800"/>
-            </a:lvl6pPr>
-            <a:lvl7pPr>
-              <a:defRPr sz="1800"/>
-            </a:lvl7pPr>
-            <a:lvl8pPr>
-              <a:defRPr sz="1800"/>
-            </a:lvl8pPr>
-            <a:lvl9pPr>
-              <a:defRPr sz="1800"/>
-            </a:lvl9pPr>
-          </a:lstStyle>
+          <a:lstStyle/>
           <a:p>
             <a:pPr lvl="0"/>
             <a:r>
-              <a:rPr lang="en-US" smtClean="0"/>
+              <a:rPr lang="en-US" dirty="0"/>
               <a:t>Click to edit Master text styles</a:t>
             </a:r>
           </a:p>
           <a:p>
             <a:pPr lvl="1"/>
             <a:r>
-              <a:rPr lang="en-US" smtClean="0"/>
+              <a:rPr lang="en-US" dirty="0"/>
               <a:t>Second level</a:t>
             </a:r>
           </a:p>
           <a:p>
             <a:pPr lvl="2"/>
             <a:r>
-              <a:rPr lang="en-US" smtClean="0"/>
+              <a:rPr lang="en-US" dirty="0"/>
               <a:t>Third level</a:t>
             </a:r>
           </a:p>
           <a:p>
             <a:pPr lvl="3"/>
             <a:r>
-              <a:rPr lang="en-US" smtClean="0"/>
+              <a:rPr lang="en-US" dirty="0"/>
               <a:t>Fourth level</a:t>
             </a:r>
           </a:p>
           <a:p>
             <a:pPr lvl="4"/>
             <a:r>
-              <a:rPr lang="en-US" smtClean="0"/>
+              <a:rPr lang="en-US" dirty="0"/>
               <a:t>Fifth level</a:t>
             </a:r>
-            <a:endParaRPr lang="en-US"/>
-          </a:p>
-        </p:txBody>
-      </p:sp>
-      <p:sp>
-        <p:nvSpPr>
-          <p:cNvPr id="4" name="Content Placeholder 3"/>
+          </a:p>
+        </p:txBody>
+      </p:sp>
+      <p:sp>
+        <p:nvSpPr>
+          <p:cNvPr id="4" name="Content Placeholder 3">
+            <a:extLst>
+              <a:ext uri="{FF2B5EF4-FFF2-40B4-BE49-F238E27FC236}">
+                <a16:creationId xmlns:a16="http://schemas.microsoft.com/office/drawing/2014/main" id="{B45D18D8-CED2-4572-8D9E-50E2E1C15FA3}"/>
+              </a:ext>
+            </a:extLst>
+          </p:cNvPr>
           <p:cNvSpPr>
             <a:spLocks noGrp="1"/>
           </p:cNvSpPr>
@@ -1282,87 +1452,89 @@
         </p:nvSpPr>
         <p:spPr>
           <a:xfrm>
-            <a:off x="4648200" y="1600200"/>
-            <a:ext cx="4038600" cy="4525963"/>
+            <a:off x="6172200" y="1825625"/>
+            <a:ext cx="5181600" cy="4351338"/>
           </a:xfrm>
         </p:spPr>
         <p:txBody>
           <a:bodyPr/>
-          <a:lstStyle>
-            <a:lvl1pPr>
-              <a:defRPr sz="2800"/>
-            </a:lvl1pPr>
-            <a:lvl2pPr>
-              <a:defRPr sz="2400"/>
-            </a:lvl2pPr>
-            <a:lvl3pPr>
-              <a:defRPr sz="2000"/>
-            </a:lvl3pPr>
-            <a:lvl4pPr>
-              <a:defRPr sz="1800"/>
-            </a:lvl4pPr>
-            <a:lvl5pPr>
-              <a:defRPr sz="1800"/>
-            </a:lvl5pPr>
-            <a:lvl6pPr>
-              <a:defRPr sz="1800"/>
-            </a:lvl6pPr>
-            <a:lvl7pPr>
-              <a:defRPr sz="1800"/>
-            </a:lvl7pPr>
-            <a:lvl8pPr>
-              <a:defRPr sz="1800"/>
-            </a:lvl8pPr>
-            <a:lvl9pPr>
-              <a:defRPr sz="1800"/>
-            </a:lvl9pPr>
-          </a:lstStyle>
+          <a:lstStyle/>
           <a:p>
             <a:pPr lvl="0"/>
             <a:r>
-              <a:rPr lang="en-US" smtClean="0"/>
+              <a:rPr lang="en-US" dirty="0"/>
               <a:t>Click to edit Master text styles</a:t>
             </a:r>
           </a:p>
           <a:p>
             <a:pPr lvl="1"/>
             <a:r>
-              <a:rPr lang="en-US" smtClean="0"/>
+              <a:rPr lang="en-US" dirty="0"/>
               <a:t>Second level</a:t>
             </a:r>
           </a:p>
           <a:p>
             <a:pPr lvl="2"/>
             <a:r>
-              <a:rPr lang="en-US" smtClean="0"/>
+              <a:rPr lang="en-US" dirty="0"/>
               <a:t>Third level</a:t>
             </a:r>
           </a:p>
           <a:p>
             <a:pPr lvl="3"/>
             <a:r>
-              <a:rPr lang="en-US" smtClean="0"/>
+              <a:rPr lang="en-US" dirty="0"/>
               <a:t>Fourth level</a:t>
             </a:r>
           </a:p>
           <a:p>
             <a:pPr lvl="4"/>
             <a:r>
-              <a:rPr lang="en-US" smtClean="0"/>
+              <a:rPr lang="en-US" dirty="0"/>
               <a:t>Fifth level</a:t>
             </a:r>
+          </a:p>
+        </p:txBody>
+      </p:sp>
+      <p:sp>
+        <p:nvSpPr>
+          <p:cNvPr id="6" name="Footer Placeholder 5">
+            <a:extLst>
+              <a:ext uri="{FF2B5EF4-FFF2-40B4-BE49-F238E27FC236}">
+                <a16:creationId xmlns:a16="http://schemas.microsoft.com/office/drawing/2014/main" id="{DA708FCA-6561-45F5-B906-73801FC96ED5}"/>
+              </a:ext>
+            </a:extLst>
+          </p:cNvPr>
+          <p:cNvSpPr>
+            <a:spLocks noGrp="1"/>
+          </p:cNvSpPr>
+          <p:nvPr>
+            <p:ph type="ftr" sz="quarter" idx="11"/>
+          </p:nvPr>
+        </p:nvSpPr>
+        <p:spPr/>
+        <p:txBody>
+          <a:bodyPr/>
+          <a:lstStyle/>
+          <a:p>
             <a:endParaRPr lang="en-US"/>
           </a:p>
         </p:txBody>
       </p:sp>
       <p:sp>
         <p:nvSpPr>
-          <p:cNvPr id="5" name="Date Placeholder 4"/>
-          <p:cNvSpPr>
-            <a:spLocks noGrp="1"/>
-          </p:cNvSpPr>
-          <p:nvPr>
-            <p:ph type="dt" sz="half" idx="10"/>
+          <p:cNvPr id="7" name="Slide Number Placeholder 6">
+            <a:extLst>
+              <a:ext uri="{FF2B5EF4-FFF2-40B4-BE49-F238E27FC236}">
+                <a16:creationId xmlns:a16="http://schemas.microsoft.com/office/drawing/2014/main" id="{AAA2C599-B123-4D0C-867F-D58B53EB000F}"/>
+              </a:ext>
+            </a:extLst>
+          </p:cNvPr>
+          <p:cNvSpPr>
+            <a:spLocks noGrp="1"/>
+          </p:cNvSpPr>
+          <p:nvPr>
+            <p:ph type="sldNum" sz="quarter" idx="12"/>
           </p:nvPr>
         </p:nvSpPr>
         <p:spPr/>
@@ -1370,49 +1542,7 @@
           <a:bodyPr/>
           <a:lstStyle/>
           <a:p>
-            <a:fld id="{241EB5C9-1307-BA42-ABA2-0BC069CD8E7F}" type="datetimeFigureOut">
-              <a:rPr lang="en-US" smtClean="0"/>
-              <a:t>4/5/2019</a:t>
-            </a:fld>
-            <a:endParaRPr lang="en-US"/>
-          </a:p>
-        </p:txBody>
-      </p:sp>
-      <p:sp>
-        <p:nvSpPr>
-          <p:cNvPr id="6" name="Footer Placeholder 5"/>
-          <p:cNvSpPr>
-            <a:spLocks noGrp="1"/>
-          </p:cNvSpPr>
-          <p:nvPr>
-            <p:ph type="ftr" sz="quarter" idx="11"/>
-          </p:nvPr>
-        </p:nvSpPr>
-        <p:spPr/>
-        <p:txBody>
-          <a:bodyPr/>
-          <a:lstStyle/>
-          <a:p>
-            <a:endParaRPr lang="en-US"/>
-          </a:p>
-        </p:txBody>
-      </p:sp>
-      <p:sp>
-        <p:nvSpPr>
-          <p:cNvPr id="7" name="Slide Number Placeholder 6"/>
-          <p:cNvSpPr>
-            <a:spLocks noGrp="1"/>
-          </p:cNvSpPr>
-          <p:nvPr>
-            <p:ph type="sldNum" sz="quarter" idx="12"/>
-          </p:nvPr>
-        </p:nvSpPr>
-        <p:spPr/>
-        <p:txBody>
-          <a:bodyPr/>
-          <a:lstStyle/>
-          <a:p>
-            <a:fld id="{C5EF2332-01BF-834F-8236-50238282D533}" type="slidenum">
+            <a:fld id="{1C3A5439-F9F3-4052-B329-868ECC3EAFBE}" type="slidenum">
               <a:rPr lang="en-US" smtClean="0"/>
               <a:t>‹#›</a:t>
             </a:fld>
@@ -1420,10 +1550,46 @@
           </a:p>
         </p:txBody>
       </p:sp>
+      <p:pic>
+        <p:nvPicPr>
+          <p:cNvPr id="8" name="Picture 7">
+            <a:extLst>
+              <a:ext uri="{FF2B5EF4-FFF2-40B4-BE49-F238E27FC236}">
+                <a16:creationId xmlns:a16="http://schemas.microsoft.com/office/drawing/2014/main" id="{966B09E1-A298-46D0-8F38-B6314F7541F0}"/>
+              </a:ext>
+            </a:extLst>
+          </p:cNvPr>
+          <p:cNvPicPr>
+            <a:picLocks noChangeAspect="1"/>
+          </p:cNvPicPr>
+          <p:nvPr userDrawn="1"/>
+        </p:nvPicPr>
+        <p:blipFill>
+          <a:blip r:embed="rId2">
+            <a:extLst>
+              <a:ext uri="{28A0092B-C50C-407E-A947-70E740481C1C}">
+                <a14:useLocalDpi xmlns:a14="http://schemas.microsoft.com/office/drawing/2010/main" val="0"/>
+              </a:ext>
+            </a:extLst>
+          </a:blip>
+          <a:stretch>
+            <a:fillRect/>
+          </a:stretch>
+        </p:blipFill>
+        <p:spPr>
+          <a:xfrm>
+            <a:off x="0" y="5816771"/>
+            <a:ext cx="1496398" cy="926757"/>
+          </a:xfrm>
+          <a:prstGeom prst="rect">
+            <a:avLst/>
+          </a:prstGeom>
+        </p:spPr>
+      </p:pic>
     </p:spTree>
     <p:extLst>
       <p:ext uri="{BB962C8B-B14F-4D97-AF65-F5344CB8AC3E}">
-        <p14:creationId xmlns:p14="http://schemas.microsoft.com/office/powerpoint/2010/main" val="2619886245"/>
+        <p14:creationId xmlns:p14="http://schemas.microsoft.com/office/powerpoint/2010/main" val="4198154202"/>
       </p:ext>
     </p:extLst>
   </p:cSld>
@@ -1452,45 +1618,57 @@
       </p:grpSpPr>
       <p:sp>
         <p:nvSpPr>
-          <p:cNvPr id="2" name="Title 1"/>
+          <p:cNvPr id="2" name="Title 1">
+            <a:extLst>
+              <a:ext uri="{FF2B5EF4-FFF2-40B4-BE49-F238E27FC236}">
+                <a16:creationId xmlns:a16="http://schemas.microsoft.com/office/drawing/2014/main" id="{42970371-C7D7-4D1C-866A-66B223AFE6E9}"/>
+              </a:ext>
+            </a:extLst>
+          </p:cNvPr>
           <p:cNvSpPr>
             <a:spLocks noGrp="1"/>
           </p:cNvSpPr>
           <p:nvPr>
             <p:ph type="title"/>
-          </p:nvPr>
-        </p:nvSpPr>
-        <p:spPr/>
-        <p:txBody>
-          <a:bodyPr/>
-          <a:lstStyle>
-            <a:lvl1pPr>
-              <a:defRPr/>
-            </a:lvl1pPr>
-          </a:lstStyle>
-          <a:p>
-            <a:r>
-              <a:rPr lang="en-US" smtClean="0"/>
-              <a:t>Click to edit Master title style</a:t>
-            </a:r>
-            <a:endParaRPr lang="en-US"/>
-          </a:p>
-        </p:txBody>
-      </p:sp>
-      <p:sp>
-        <p:nvSpPr>
-          <p:cNvPr id="3" name="Text Placeholder 2"/>
-          <p:cNvSpPr>
-            <a:spLocks noGrp="1"/>
-          </p:cNvSpPr>
-          <p:nvPr>
-            <p:ph type="body" idx="1"/>
           </p:nvPr>
         </p:nvSpPr>
         <p:spPr>
           <a:xfrm>
-            <a:off x="457200" y="1535113"/>
-            <a:ext cx="4040188" cy="639762"/>
+            <a:off x="839788" y="365125"/>
+            <a:ext cx="10515600" cy="1325563"/>
+          </a:xfrm>
+        </p:spPr>
+        <p:txBody>
+          <a:bodyPr/>
+          <a:lstStyle/>
+          <a:p>
+            <a:r>
+              <a:rPr lang="en-US"/>
+              <a:t>Click to edit Master title style</a:t>
+            </a:r>
+          </a:p>
+        </p:txBody>
+      </p:sp>
+      <p:sp>
+        <p:nvSpPr>
+          <p:cNvPr id="3" name="Text Placeholder 2">
+            <a:extLst>
+              <a:ext uri="{FF2B5EF4-FFF2-40B4-BE49-F238E27FC236}">
+                <a16:creationId xmlns:a16="http://schemas.microsoft.com/office/drawing/2014/main" id="{6AB33C5C-1E9B-4A6D-97E8-D55CDDE22DAC}"/>
+              </a:ext>
+            </a:extLst>
+          </p:cNvPr>
+          <p:cNvSpPr>
+            <a:spLocks noGrp="1"/>
+          </p:cNvSpPr>
+          <p:nvPr>
+            <p:ph type="body" idx="1"/>
+          </p:nvPr>
+        </p:nvSpPr>
+        <p:spPr>
+          <a:xfrm>
+            <a:off x="839788" y="1681163"/>
+            <a:ext cx="5157787" cy="823912"/>
           </a:xfrm>
         </p:spPr>
         <p:txBody>
@@ -1536,7 +1714,7 @@
           <a:p>
             <a:pPr lvl="0"/>
             <a:r>
-              <a:rPr lang="en-US" smtClean="0"/>
+              <a:rPr lang="en-US"/>
               <a:t>Click to edit Master text styles</a:t>
             </a:r>
           </a:p>
@@ -1544,7 +1722,13 @@
       </p:sp>
       <p:sp>
         <p:nvSpPr>
-          <p:cNvPr id="4" name="Content Placeholder 3"/>
+          <p:cNvPr id="4" name="Content Placeholder 3">
+            <a:extLst>
+              <a:ext uri="{FF2B5EF4-FFF2-40B4-BE49-F238E27FC236}">
+                <a16:creationId xmlns:a16="http://schemas.microsoft.com/office/drawing/2014/main" id="{80704B72-6D6C-4EC9-AB85-F90539E8AE5A}"/>
+              </a:ext>
+            </a:extLst>
+          </p:cNvPr>
           <p:cNvSpPr>
             <a:spLocks noGrp="1"/>
           </p:cNvSpPr>
@@ -1554,82 +1738,59 @@
         </p:nvSpPr>
         <p:spPr>
           <a:xfrm>
-            <a:off x="457200" y="2174875"/>
-            <a:ext cx="4040188" cy="3951288"/>
+            <a:off x="839788" y="2505075"/>
+            <a:ext cx="5157787" cy="3684588"/>
           </a:xfrm>
         </p:spPr>
         <p:txBody>
           <a:bodyPr/>
-          <a:lstStyle>
-            <a:lvl1pPr>
-              <a:defRPr sz="2400"/>
-            </a:lvl1pPr>
-            <a:lvl2pPr>
-              <a:defRPr sz="2000"/>
-            </a:lvl2pPr>
-            <a:lvl3pPr>
-              <a:defRPr sz="1800"/>
-            </a:lvl3pPr>
-            <a:lvl4pPr>
-              <a:defRPr sz="1600"/>
-            </a:lvl4pPr>
-            <a:lvl5pPr>
-              <a:defRPr sz="1600"/>
-            </a:lvl5pPr>
-            <a:lvl6pPr>
-              <a:defRPr sz="1600"/>
-            </a:lvl6pPr>
-            <a:lvl7pPr>
-              <a:defRPr sz="1600"/>
-            </a:lvl7pPr>
-            <a:lvl8pPr>
-              <a:defRPr sz="1600"/>
-            </a:lvl8pPr>
-            <a:lvl9pPr>
-              <a:defRPr sz="1600"/>
-            </a:lvl9pPr>
-          </a:lstStyle>
+          <a:lstStyle/>
           <a:p>
             <a:pPr lvl="0"/>
             <a:r>
-              <a:rPr lang="en-US" smtClean="0"/>
+              <a:rPr lang="en-US"/>
               <a:t>Click to edit Master text styles</a:t>
             </a:r>
           </a:p>
           <a:p>
             <a:pPr lvl="1"/>
             <a:r>
-              <a:rPr lang="en-US" smtClean="0"/>
+              <a:rPr lang="en-US"/>
               <a:t>Second level</a:t>
             </a:r>
           </a:p>
           <a:p>
             <a:pPr lvl="2"/>
             <a:r>
-              <a:rPr lang="en-US" smtClean="0"/>
+              <a:rPr lang="en-US"/>
               <a:t>Third level</a:t>
             </a:r>
           </a:p>
           <a:p>
             <a:pPr lvl="3"/>
             <a:r>
-              <a:rPr lang="en-US" smtClean="0"/>
+              <a:rPr lang="en-US"/>
               <a:t>Fourth level</a:t>
             </a:r>
           </a:p>
           <a:p>
             <a:pPr lvl="4"/>
             <a:r>
-              <a:rPr lang="en-US" smtClean="0"/>
+              <a:rPr lang="en-US"/>
               <a:t>Fifth level</a:t>
             </a:r>
-            <a:endParaRPr lang="en-US"/>
-          </a:p>
-        </p:txBody>
-      </p:sp>
-      <p:sp>
-        <p:nvSpPr>
-          <p:cNvPr id="5" name="Text Placeholder 4"/>
+          </a:p>
+        </p:txBody>
+      </p:sp>
+      <p:sp>
+        <p:nvSpPr>
+          <p:cNvPr id="5" name="Text Placeholder 4">
+            <a:extLst>
+              <a:ext uri="{FF2B5EF4-FFF2-40B4-BE49-F238E27FC236}">
+                <a16:creationId xmlns:a16="http://schemas.microsoft.com/office/drawing/2014/main" id="{B1A64977-7B36-4160-9E43-45A289A9AE23}"/>
+              </a:ext>
+            </a:extLst>
+          </p:cNvPr>
           <p:cNvSpPr>
             <a:spLocks noGrp="1"/>
           </p:cNvSpPr>
@@ -1639,8 +1800,8 @@
         </p:nvSpPr>
         <p:spPr>
           <a:xfrm>
-            <a:off x="4645025" y="1535113"/>
-            <a:ext cx="4041775" cy="639762"/>
+            <a:off x="6172200" y="1681163"/>
+            <a:ext cx="5183188" cy="823912"/>
           </a:xfrm>
         </p:spPr>
         <p:txBody>
@@ -1686,7 +1847,7 @@
           <a:p>
             <a:pPr lvl="0"/>
             <a:r>
-              <a:rPr lang="en-US" smtClean="0"/>
+              <a:rPr lang="en-US"/>
               <a:t>Click to edit Master text styles</a:t>
             </a:r>
           </a:p>
@@ -1694,7 +1855,13 @@
       </p:sp>
       <p:sp>
         <p:nvSpPr>
-          <p:cNvPr id="6" name="Content Placeholder 5"/>
+          <p:cNvPr id="6" name="Content Placeholder 5">
+            <a:extLst>
+              <a:ext uri="{FF2B5EF4-FFF2-40B4-BE49-F238E27FC236}">
+                <a16:creationId xmlns:a16="http://schemas.microsoft.com/office/drawing/2014/main" id="{5C2ED296-CD0D-4B2D-931A-D961BFD5F175}"/>
+              </a:ext>
+            </a:extLst>
+          </p:cNvPr>
           <p:cNvSpPr>
             <a:spLocks noGrp="1"/>
           </p:cNvSpPr>
@@ -1704,97 +1871,74 @@
         </p:nvSpPr>
         <p:spPr>
           <a:xfrm>
-            <a:off x="4645025" y="2174875"/>
-            <a:ext cx="4041775" cy="3951288"/>
+            <a:off x="6172200" y="2505075"/>
+            <a:ext cx="5183188" cy="3684588"/>
           </a:xfrm>
         </p:spPr>
         <p:txBody>
           <a:bodyPr/>
-          <a:lstStyle>
-            <a:lvl1pPr>
-              <a:defRPr sz="2400"/>
-            </a:lvl1pPr>
-            <a:lvl2pPr>
-              <a:defRPr sz="2000"/>
-            </a:lvl2pPr>
-            <a:lvl3pPr>
-              <a:defRPr sz="1800"/>
-            </a:lvl3pPr>
-            <a:lvl4pPr>
-              <a:defRPr sz="1600"/>
-            </a:lvl4pPr>
-            <a:lvl5pPr>
-              <a:defRPr sz="1600"/>
-            </a:lvl5pPr>
-            <a:lvl6pPr>
-              <a:defRPr sz="1600"/>
-            </a:lvl6pPr>
-            <a:lvl7pPr>
-              <a:defRPr sz="1600"/>
-            </a:lvl7pPr>
-            <a:lvl8pPr>
-              <a:defRPr sz="1600"/>
-            </a:lvl8pPr>
-            <a:lvl9pPr>
-              <a:defRPr sz="1600"/>
-            </a:lvl9pPr>
-          </a:lstStyle>
+          <a:lstStyle/>
           <a:p>
             <a:pPr lvl="0"/>
             <a:r>
+              <a:rPr lang="en-US"/>
+              <a:t>Click to edit Master text styles</a:t>
+            </a:r>
+          </a:p>
+          <a:p>
+            <a:pPr lvl="1"/>
+            <a:r>
+              <a:rPr lang="en-US"/>
+              <a:t>Second level</a:t>
+            </a:r>
+          </a:p>
+          <a:p>
+            <a:pPr lvl="2"/>
+            <a:r>
+              <a:rPr lang="en-US"/>
+              <a:t>Third level</a:t>
+            </a:r>
+          </a:p>
+          <a:p>
+            <a:pPr lvl="3"/>
+            <a:r>
+              <a:rPr lang="en-US"/>
+              <a:t>Fourth level</a:t>
+            </a:r>
+          </a:p>
+          <a:p>
+            <a:pPr lvl="4"/>
+            <a:r>
+              <a:rPr lang="en-US"/>
+              <a:t>Fifth level</a:t>
+            </a:r>
+          </a:p>
+        </p:txBody>
+      </p:sp>
+      <p:sp>
+        <p:nvSpPr>
+          <p:cNvPr id="7" name="Date Placeholder 6">
+            <a:extLst>
+              <a:ext uri="{FF2B5EF4-FFF2-40B4-BE49-F238E27FC236}">
+                <a16:creationId xmlns:a16="http://schemas.microsoft.com/office/drawing/2014/main" id="{158B0D23-4E07-4013-9695-B13A97983701}"/>
+              </a:ext>
+            </a:extLst>
+          </p:cNvPr>
+          <p:cNvSpPr>
+            <a:spLocks noGrp="1"/>
+          </p:cNvSpPr>
+          <p:nvPr>
+            <p:ph type="dt" sz="half" idx="10"/>
+          </p:nvPr>
+        </p:nvSpPr>
+        <p:spPr/>
+        <p:txBody>
+          <a:bodyPr/>
+          <a:lstStyle/>
+          <a:p>
+            <a:fld id="{3EA7974F-46A4-4C38-BBCC-8E262B881B28}" type="datetimeFigureOut">
               <a:rPr lang="en-US" smtClean="0"/>
-              <a:t>Click to edit Master text styles</a:t>
-            </a:r>
-          </a:p>
-          <a:p>
-            <a:pPr lvl="1"/>
-            <a:r>
-              <a:rPr lang="en-US" smtClean="0"/>
-              <a:t>Second level</a:t>
-            </a:r>
-          </a:p>
-          <a:p>
-            <a:pPr lvl="2"/>
-            <a:r>
-              <a:rPr lang="en-US" smtClean="0"/>
-              <a:t>Third level</a:t>
-            </a:r>
-          </a:p>
-          <a:p>
-            <a:pPr lvl="3"/>
-            <a:r>
-              <a:rPr lang="en-US" smtClean="0"/>
-              <a:t>Fourth level</a:t>
-            </a:r>
-          </a:p>
-          <a:p>
-            <a:pPr lvl="4"/>
-            <a:r>
-              <a:rPr lang="en-US" smtClean="0"/>
-              <a:t>Fifth level</a:t>
-            </a:r>
-            <a:endParaRPr lang="en-US"/>
-          </a:p>
-        </p:txBody>
-      </p:sp>
-      <p:sp>
-        <p:nvSpPr>
-          <p:cNvPr id="7" name="Date Placeholder 6"/>
-          <p:cNvSpPr>
-            <a:spLocks noGrp="1"/>
-          </p:cNvSpPr>
-          <p:nvPr>
-            <p:ph type="dt" sz="half" idx="10"/>
-          </p:nvPr>
-        </p:nvSpPr>
-        <p:spPr/>
-        <p:txBody>
-          <a:bodyPr/>
-          <a:lstStyle/>
-          <a:p>
-            <a:fld id="{241EB5C9-1307-BA42-ABA2-0BC069CD8E7F}" type="datetimeFigureOut">
-              <a:rPr lang="en-US" smtClean="0"/>
-              <a:t>4/5/2019</a:t>
+              <a:t>10/18/2020</a:t>
             </a:fld>
             <a:endParaRPr lang="en-US"/>
           </a:p>
@@ -1802,7 +1946,13 @@
       </p:sp>
       <p:sp>
         <p:nvSpPr>
-          <p:cNvPr id="8" name="Footer Placeholder 7"/>
+          <p:cNvPr id="8" name="Footer Placeholder 7">
+            <a:extLst>
+              <a:ext uri="{FF2B5EF4-FFF2-40B4-BE49-F238E27FC236}">
+                <a16:creationId xmlns:a16="http://schemas.microsoft.com/office/drawing/2014/main" id="{E6515FC7-CD41-4823-8317-DE171CFAC0E7}"/>
+              </a:ext>
+            </a:extLst>
+          </p:cNvPr>
           <p:cNvSpPr>
             <a:spLocks noGrp="1"/>
           </p:cNvSpPr>
@@ -1821,7 +1971,13 @@
       </p:sp>
       <p:sp>
         <p:nvSpPr>
-          <p:cNvPr id="9" name="Slide Number Placeholder 8"/>
+          <p:cNvPr id="9" name="Slide Number Placeholder 8">
+            <a:extLst>
+              <a:ext uri="{FF2B5EF4-FFF2-40B4-BE49-F238E27FC236}">
+                <a16:creationId xmlns:a16="http://schemas.microsoft.com/office/drawing/2014/main" id="{418B2BD3-B17A-428B-B885-E6F07CE3933E}"/>
+              </a:ext>
+            </a:extLst>
+          </p:cNvPr>
           <p:cNvSpPr>
             <a:spLocks noGrp="1"/>
           </p:cNvSpPr>
@@ -1834,7 +1990,7 @@
           <a:bodyPr/>
           <a:lstStyle/>
           <a:p>
-            <a:fld id="{C5EF2332-01BF-834F-8236-50238282D533}" type="slidenum">
+            <a:fld id="{1C3A5439-F9F3-4052-B329-868ECC3EAFBE}" type="slidenum">
               <a:rPr lang="en-US" smtClean="0"/>
               <a:t>‹#›</a:t>
             </a:fld>
@@ -1845,7 +2001,7 @@
     </p:spTree>
     <p:extLst>
       <p:ext uri="{BB962C8B-B14F-4D97-AF65-F5344CB8AC3E}">
-        <p14:creationId xmlns:p14="http://schemas.microsoft.com/office/powerpoint/2010/main" val="2535793967"/>
+        <p14:creationId xmlns:p14="http://schemas.microsoft.com/office/powerpoint/2010/main" val="3732678432"/>
       </p:ext>
     </p:extLst>
   </p:cSld>
@@ -1874,7 +2030,13 @@
       </p:grpSpPr>
       <p:sp>
         <p:nvSpPr>
-          <p:cNvPr id="2" name="Title 1"/>
+          <p:cNvPr id="2" name="Title 1">
+            <a:extLst>
+              <a:ext uri="{FF2B5EF4-FFF2-40B4-BE49-F238E27FC236}">
+                <a16:creationId xmlns:a16="http://schemas.microsoft.com/office/drawing/2014/main" id="{323C9013-4138-4C5F-9786-ABA60BB130BB}"/>
+              </a:ext>
+            </a:extLst>
+          </p:cNvPr>
           <p:cNvSpPr>
             <a:spLocks noGrp="1"/>
           </p:cNvSpPr>
@@ -1888,31 +2050,36 @@
           <a:lstStyle/>
           <a:p>
             <a:r>
+              <a:rPr lang="en-US"/>
+              <a:t>Click to edit Master title style</a:t>
+            </a:r>
+          </a:p>
+        </p:txBody>
+      </p:sp>
+      <p:sp>
+        <p:nvSpPr>
+          <p:cNvPr id="3" name="Date Placeholder 2">
+            <a:extLst>
+              <a:ext uri="{FF2B5EF4-FFF2-40B4-BE49-F238E27FC236}">
+                <a16:creationId xmlns:a16="http://schemas.microsoft.com/office/drawing/2014/main" id="{2C645B5B-BFA4-4325-8399-A63A2B515C93}"/>
+              </a:ext>
+            </a:extLst>
+          </p:cNvPr>
+          <p:cNvSpPr>
+            <a:spLocks noGrp="1"/>
+          </p:cNvSpPr>
+          <p:nvPr>
+            <p:ph type="dt" sz="half" idx="10"/>
+          </p:nvPr>
+        </p:nvSpPr>
+        <p:spPr/>
+        <p:txBody>
+          <a:bodyPr/>
+          <a:lstStyle/>
+          <a:p>
+            <a:fld id="{3EA7974F-46A4-4C38-BBCC-8E262B881B28}" type="datetimeFigureOut">
               <a:rPr lang="en-US" smtClean="0"/>
-              <a:t>Click to edit Master title style</a:t>
-            </a:r>
-            <a:endParaRPr lang="en-US"/>
-          </a:p>
-        </p:txBody>
-      </p:sp>
-      <p:sp>
-        <p:nvSpPr>
-          <p:cNvPr id="3" name="Date Placeholder 2"/>
-          <p:cNvSpPr>
-            <a:spLocks noGrp="1"/>
-          </p:cNvSpPr>
-          <p:nvPr>
-            <p:ph type="dt" sz="half" idx="10"/>
-          </p:nvPr>
-        </p:nvSpPr>
-        <p:spPr/>
-        <p:txBody>
-          <a:bodyPr/>
-          <a:lstStyle/>
-          <a:p>
-            <a:fld id="{241EB5C9-1307-BA42-ABA2-0BC069CD8E7F}" type="datetimeFigureOut">
-              <a:rPr lang="en-US" smtClean="0"/>
-              <a:t>4/5/2019</a:t>
+              <a:t>10/18/2020</a:t>
             </a:fld>
             <a:endParaRPr lang="en-US"/>
           </a:p>
@@ -1920,7 +2087,13 @@
       </p:sp>
       <p:sp>
         <p:nvSpPr>
-          <p:cNvPr id="4" name="Footer Placeholder 3"/>
+          <p:cNvPr id="4" name="Footer Placeholder 3">
+            <a:extLst>
+              <a:ext uri="{FF2B5EF4-FFF2-40B4-BE49-F238E27FC236}">
+                <a16:creationId xmlns:a16="http://schemas.microsoft.com/office/drawing/2014/main" id="{41EF37C9-3AD0-457A-AB31-957588176BFC}"/>
+              </a:ext>
+            </a:extLst>
+          </p:cNvPr>
           <p:cNvSpPr>
             <a:spLocks noGrp="1"/>
           </p:cNvSpPr>
@@ -1939,7 +2112,13 @@
       </p:sp>
       <p:sp>
         <p:nvSpPr>
-          <p:cNvPr id="5" name="Slide Number Placeholder 4"/>
+          <p:cNvPr id="5" name="Slide Number Placeholder 4">
+            <a:extLst>
+              <a:ext uri="{FF2B5EF4-FFF2-40B4-BE49-F238E27FC236}">
+                <a16:creationId xmlns:a16="http://schemas.microsoft.com/office/drawing/2014/main" id="{8CDBA16F-2393-4E0E-BF0D-916A4ADEF255}"/>
+              </a:ext>
+            </a:extLst>
+          </p:cNvPr>
           <p:cNvSpPr>
             <a:spLocks noGrp="1"/>
           </p:cNvSpPr>
@@ -1952,7 +2131,7 @@
           <a:bodyPr/>
           <a:lstStyle/>
           <a:p>
-            <a:fld id="{C5EF2332-01BF-834F-8236-50238282D533}" type="slidenum">
+            <a:fld id="{1C3A5439-F9F3-4052-B329-868ECC3EAFBE}" type="slidenum">
               <a:rPr lang="en-US" smtClean="0"/>
               <a:t>‹#›</a:t>
             </a:fld>
@@ -1963,7 +2142,7 @@
     </p:spTree>
     <p:extLst>
       <p:ext uri="{BB962C8B-B14F-4D97-AF65-F5344CB8AC3E}">
-        <p14:creationId xmlns:p14="http://schemas.microsoft.com/office/powerpoint/2010/main" val="3472721253"/>
+        <p14:creationId xmlns:p14="http://schemas.microsoft.com/office/powerpoint/2010/main" val="3519110099"/>
       </p:ext>
     </p:extLst>
   </p:cSld>
@@ -1992,7 +2171,13 @@
       </p:grpSpPr>
       <p:sp>
         <p:nvSpPr>
-          <p:cNvPr id="2" name="Date Placeholder 1"/>
+          <p:cNvPr id="2" name="Date Placeholder 1">
+            <a:extLst>
+              <a:ext uri="{FF2B5EF4-FFF2-40B4-BE49-F238E27FC236}">
+                <a16:creationId xmlns:a16="http://schemas.microsoft.com/office/drawing/2014/main" id="{A1DD0C8B-D53D-47DC-B473-05F0CDE0E89D}"/>
+              </a:ext>
+            </a:extLst>
+          </p:cNvPr>
           <p:cNvSpPr>
             <a:spLocks noGrp="1"/>
           </p:cNvSpPr>
@@ -2005,9 +2190,9 @@
           <a:bodyPr/>
           <a:lstStyle/>
           <a:p>
-            <a:fld id="{241EB5C9-1307-BA42-ABA2-0BC069CD8E7F}" type="datetimeFigureOut">
+            <a:fld id="{3EA7974F-46A4-4C38-BBCC-8E262B881B28}" type="datetimeFigureOut">
               <a:rPr lang="en-US" smtClean="0"/>
-              <a:t>4/5/2019</a:t>
+              <a:t>10/18/2020</a:t>
             </a:fld>
             <a:endParaRPr lang="en-US"/>
           </a:p>
@@ -2015,7 +2200,13 @@
       </p:sp>
       <p:sp>
         <p:nvSpPr>
-          <p:cNvPr id="3" name="Footer Placeholder 2"/>
+          <p:cNvPr id="3" name="Footer Placeholder 2">
+            <a:extLst>
+              <a:ext uri="{FF2B5EF4-FFF2-40B4-BE49-F238E27FC236}">
+                <a16:creationId xmlns:a16="http://schemas.microsoft.com/office/drawing/2014/main" id="{946938CA-2F79-4BC1-B6B0-1D8021F97792}"/>
+              </a:ext>
+            </a:extLst>
+          </p:cNvPr>
           <p:cNvSpPr>
             <a:spLocks noGrp="1"/>
           </p:cNvSpPr>
@@ -2034,7 +2225,13 @@
       </p:sp>
       <p:sp>
         <p:nvSpPr>
-          <p:cNvPr id="4" name="Slide Number Placeholder 3"/>
+          <p:cNvPr id="4" name="Slide Number Placeholder 3">
+            <a:extLst>
+              <a:ext uri="{FF2B5EF4-FFF2-40B4-BE49-F238E27FC236}">
+                <a16:creationId xmlns:a16="http://schemas.microsoft.com/office/drawing/2014/main" id="{7D9281BF-88FE-4C2C-BA24-4C53C1C3B9C5}"/>
+              </a:ext>
+            </a:extLst>
+          </p:cNvPr>
           <p:cNvSpPr>
             <a:spLocks noGrp="1"/>
           </p:cNvSpPr>
@@ -2047,7 +2244,7 @@
           <a:bodyPr/>
           <a:lstStyle/>
           <a:p>
-            <a:fld id="{C5EF2332-01BF-834F-8236-50238282D533}" type="slidenum">
+            <a:fld id="{1C3A5439-F9F3-4052-B329-868ECC3EAFBE}" type="slidenum">
               <a:rPr lang="en-US" smtClean="0"/>
               <a:t>‹#›</a:t>
             </a:fld>
@@ -2058,7 +2255,7 @@
     </p:spTree>
     <p:extLst>
       <p:ext uri="{BB962C8B-B14F-4D97-AF65-F5344CB8AC3E}">
-        <p14:creationId xmlns:p14="http://schemas.microsoft.com/office/powerpoint/2010/main" val="2130901097"/>
+        <p14:creationId xmlns:p14="http://schemas.microsoft.com/office/powerpoint/2010/main" val="1515789882"/>
       </p:ext>
     </p:extLst>
   </p:cSld>
@@ -2087,7 +2284,13 @@
       </p:grpSpPr>
       <p:sp>
         <p:nvSpPr>
-          <p:cNvPr id="2" name="Title 1"/>
+          <p:cNvPr id="2" name="Title 1">
+            <a:extLst>
+              <a:ext uri="{FF2B5EF4-FFF2-40B4-BE49-F238E27FC236}">
+                <a16:creationId xmlns:a16="http://schemas.microsoft.com/office/drawing/2014/main" id="{B4E603C9-967A-493C-A5BE-2E2243A28B76}"/>
+              </a:ext>
+            </a:extLst>
+          </p:cNvPr>
           <p:cNvSpPr>
             <a:spLocks noGrp="1"/>
           </p:cNvSpPr>
@@ -2097,29 +2300,34 @@
         </p:nvSpPr>
         <p:spPr>
           <a:xfrm>
-            <a:off x="457200" y="273050"/>
-            <a:ext cx="3008313" cy="1162050"/>
+            <a:off x="839788" y="457200"/>
+            <a:ext cx="3932237" cy="1600200"/>
           </a:xfrm>
         </p:spPr>
         <p:txBody>
           <a:bodyPr anchor="b"/>
           <a:lstStyle>
-            <a:lvl1pPr algn="l">
-              <a:defRPr sz="2000" b="1"/>
+            <a:lvl1pPr>
+              <a:defRPr sz="3200"/>
             </a:lvl1pPr>
           </a:lstStyle>
           <a:p>
             <a:r>
-              <a:rPr lang="en-US" smtClean="0"/>
+              <a:rPr lang="en-US"/>
               <a:t>Click to edit Master title style</a:t>
             </a:r>
-            <a:endParaRPr lang="en-US"/>
-          </a:p>
-        </p:txBody>
-      </p:sp>
-      <p:sp>
-        <p:nvSpPr>
-          <p:cNvPr id="3" name="Content Placeholder 2"/>
+          </a:p>
+        </p:txBody>
+      </p:sp>
+      <p:sp>
+        <p:nvSpPr>
+          <p:cNvPr id="3" name="Content Placeholder 2">
+            <a:extLst>
+              <a:ext uri="{FF2B5EF4-FFF2-40B4-BE49-F238E27FC236}">
+                <a16:creationId xmlns:a16="http://schemas.microsoft.com/office/drawing/2014/main" id="{AB6BBCF1-F24B-433B-A0B6-3BEA90BA91BA}"/>
+              </a:ext>
+            </a:extLst>
+          </p:cNvPr>
           <p:cNvSpPr>
             <a:spLocks noGrp="1"/>
           </p:cNvSpPr>
@@ -2129,8 +2337,8 @@
         </p:nvSpPr>
         <p:spPr>
           <a:xfrm>
-            <a:off x="3575050" y="273050"/>
-            <a:ext cx="5111750" cy="5853113"/>
+            <a:off x="5183188" y="987425"/>
+            <a:ext cx="6172200" cy="4873625"/>
           </a:xfrm>
         </p:spPr>
         <p:txBody>
@@ -2167,44 +2375,49 @@
           <a:p>
             <a:pPr lvl="0"/>
             <a:r>
-              <a:rPr lang="en-US" smtClean="0"/>
+              <a:rPr lang="en-US"/>
               <a:t>Click to edit Master text styles</a:t>
             </a:r>
           </a:p>
           <a:p>
             <a:pPr lvl="1"/>
             <a:r>
-              <a:rPr lang="en-US" smtClean="0"/>
+              <a:rPr lang="en-US"/>
               <a:t>Second level</a:t>
             </a:r>
           </a:p>
           <a:p>
             <a:pPr lvl="2"/>
             <a:r>
-              <a:rPr lang="en-US" smtClean="0"/>
+              <a:rPr lang="en-US"/>
               <a:t>Third level</a:t>
             </a:r>
           </a:p>
           <a:p>
             <a:pPr lvl="3"/>
             <a:r>
-              <a:rPr lang="en-US" smtClean="0"/>
+              <a:rPr lang="en-US"/>
               <a:t>Fourth level</a:t>
             </a:r>
           </a:p>
           <a:p>
             <a:pPr lvl="4"/>
             <a:r>
-              <a:rPr lang="en-US" smtClean="0"/>
+              <a:rPr lang="en-US"/>
               <a:t>Fifth level</a:t>
             </a:r>
-            <a:endParaRPr lang="en-US"/>
-          </a:p>
-        </p:txBody>
-      </p:sp>
-      <p:sp>
-        <p:nvSpPr>
-          <p:cNvPr id="4" name="Text Placeholder 3"/>
+          </a:p>
+        </p:txBody>
+      </p:sp>
+      <p:sp>
+        <p:nvSpPr>
+          <p:cNvPr id="4" name="Text Placeholder 3">
+            <a:extLst>
+              <a:ext uri="{FF2B5EF4-FFF2-40B4-BE49-F238E27FC236}">
+                <a16:creationId xmlns:a16="http://schemas.microsoft.com/office/drawing/2014/main" id="{8F87066B-A6F2-4FE6-9E6E-B4985594FC68}"/>
+              </a:ext>
+            </a:extLst>
+          </p:cNvPr>
           <p:cNvSpPr>
             <a:spLocks noGrp="1"/>
           </p:cNvSpPr>
@@ -2214,8 +2427,8 @@
         </p:nvSpPr>
         <p:spPr>
           <a:xfrm>
-            <a:off x="457200" y="1435100"/>
-            <a:ext cx="3008313" cy="4691063"/>
+            <a:off x="839788" y="2057400"/>
+            <a:ext cx="3932237" cy="3811588"/>
           </a:xfrm>
         </p:spPr>
         <p:txBody>
@@ -2223,68 +2436,74 @@
           <a:lstStyle>
             <a:lvl1pPr marL="0" indent="0">
               <a:buNone/>
-              <a:defRPr sz="1400"/>
+              <a:defRPr sz="1600"/>
             </a:lvl1pPr>
             <a:lvl2pPr marL="457200" indent="0">
               <a:buNone/>
-              <a:defRPr sz="1200"/>
+              <a:defRPr sz="1400"/>
             </a:lvl2pPr>
             <a:lvl3pPr marL="914400" indent="0">
               <a:buNone/>
-              <a:defRPr sz="1000"/>
+              <a:defRPr sz="1200"/>
             </a:lvl3pPr>
             <a:lvl4pPr marL="1371600" indent="0">
               <a:buNone/>
-              <a:defRPr sz="900"/>
+              <a:defRPr sz="1000"/>
             </a:lvl4pPr>
             <a:lvl5pPr marL="1828800" indent="0">
               <a:buNone/>
-              <a:defRPr sz="900"/>
+              <a:defRPr sz="1000"/>
             </a:lvl5pPr>
             <a:lvl6pPr marL="2286000" indent="0">
               <a:buNone/>
-              <a:defRPr sz="900"/>
+              <a:defRPr sz="1000"/>
             </a:lvl6pPr>
             <a:lvl7pPr marL="2743200" indent="0">
               <a:buNone/>
-              <a:defRPr sz="900"/>
+              <a:defRPr sz="1000"/>
             </a:lvl7pPr>
             <a:lvl8pPr marL="3200400" indent="0">
               <a:buNone/>
-              <a:defRPr sz="900"/>
+              <a:defRPr sz="1000"/>
             </a:lvl8pPr>
             <a:lvl9pPr marL="3657600" indent="0">
               <a:buNone/>
-              <a:defRPr sz="900"/>
+              <a:defRPr sz="1000"/>
             </a:lvl9pPr>
           </a:lstStyle>
           <a:p>
             <a:pPr lvl="0"/>
             <a:r>
+              <a:rPr lang="en-US"/>
+              <a:t>Click to edit Master text styles</a:t>
+            </a:r>
+          </a:p>
+        </p:txBody>
+      </p:sp>
+      <p:sp>
+        <p:nvSpPr>
+          <p:cNvPr id="5" name="Date Placeholder 4">
+            <a:extLst>
+              <a:ext uri="{FF2B5EF4-FFF2-40B4-BE49-F238E27FC236}">
+                <a16:creationId xmlns:a16="http://schemas.microsoft.com/office/drawing/2014/main" id="{30CB9909-94C5-4644-B04C-A87AD7817CC0}"/>
+              </a:ext>
+            </a:extLst>
+          </p:cNvPr>
+          <p:cNvSpPr>
+            <a:spLocks noGrp="1"/>
+          </p:cNvSpPr>
+          <p:nvPr>
+            <p:ph type="dt" sz="half" idx="10"/>
+          </p:nvPr>
+        </p:nvSpPr>
+        <p:spPr/>
+        <p:txBody>
+          <a:bodyPr/>
+          <a:lstStyle/>
+          <a:p>
+            <a:fld id="{3EA7974F-46A4-4C38-BBCC-8E262B881B28}" type="datetimeFigureOut">
               <a:rPr lang="en-US" smtClean="0"/>
-              <a:t>Click to edit Master text styles</a:t>
-            </a:r>
-          </a:p>
-        </p:txBody>
-      </p:sp>
-      <p:sp>
-        <p:nvSpPr>
-          <p:cNvPr id="5" name="Date Placeholder 4"/>
-          <p:cNvSpPr>
-            <a:spLocks noGrp="1"/>
-          </p:cNvSpPr>
-          <p:nvPr>
-            <p:ph type="dt" sz="half" idx="10"/>
-          </p:nvPr>
-        </p:nvSpPr>
-        <p:spPr/>
-        <p:txBody>
-          <a:bodyPr/>
-          <a:lstStyle/>
-          <a:p>
-            <a:fld id="{241EB5C9-1307-BA42-ABA2-0BC069CD8E7F}" type="datetimeFigureOut">
-              <a:rPr lang="en-US" smtClean="0"/>
-              <a:t>4/5/2019</a:t>
+              <a:t>10/18/2020</a:t>
             </a:fld>
             <a:endParaRPr lang="en-US"/>
           </a:p>
@@ -2292,7 +2511,13 @@
       </p:sp>
       <p:sp>
         <p:nvSpPr>
-          <p:cNvPr id="6" name="Footer Placeholder 5"/>
+          <p:cNvPr id="6" name="Footer Placeholder 5">
+            <a:extLst>
+              <a:ext uri="{FF2B5EF4-FFF2-40B4-BE49-F238E27FC236}">
+                <a16:creationId xmlns:a16="http://schemas.microsoft.com/office/drawing/2014/main" id="{D3C33F55-8D59-45F2-B32F-40671B33C955}"/>
+              </a:ext>
+            </a:extLst>
+          </p:cNvPr>
           <p:cNvSpPr>
             <a:spLocks noGrp="1"/>
           </p:cNvSpPr>
@@ -2311,7 +2536,13 @@
       </p:sp>
       <p:sp>
         <p:nvSpPr>
-          <p:cNvPr id="7" name="Slide Number Placeholder 6"/>
+          <p:cNvPr id="7" name="Slide Number Placeholder 6">
+            <a:extLst>
+              <a:ext uri="{FF2B5EF4-FFF2-40B4-BE49-F238E27FC236}">
+                <a16:creationId xmlns:a16="http://schemas.microsoft.com/office/drawing/2014/main" id="{EA0FF544-A6E0-4A89-B03E-03E6CFFA0A33}"/>
+              </a:ext>
+            </a:extLst>
+          </p:cNvPr>
           <p:cNvSpPr>
             <a:spLocks noGrp="1"/>
           </p:cNvSpPr>
@@ -2324,7 +2555,7 @@
           <a:bodyPr/>
           <a:lstStyle/>
           <a:p>
-            <a:fld id="{C5EF2332-01BF-834F-8236-50238282D533}" type="slidenum">
+            <a:fld id="{1C3A5439-F9F3-4052-B329-868ECC3EAFBE}" type="slidenum">
               <a:rPr lang="en-US" smtClean="0"/>
               <a:t>‹#›</a:t>
             </a:fld>
@@ -2335,7 +2566,7 @@
     </p:spTree>
     <p:extLst>
       <p:ext uri="{BB962C8B-B14F-4D97-AF65-F5344CB8AC3E}">
-        <p14:creationId xmlns:p14="http://schemas.microsoft.com/office/powerpoint/2010/main" val="3540895647"/>
+        <p14:creationId xmlns:p14="http://schemas.microsoft.com/office/powerpoint/2010/main" val="212848084"/>
       </p:ext>
     </p:extLst>
   </p:cSld>
@@ -2364,7 +2595,13 @@
       </p:grpSpPr>
       <p:sp>
         <p:nvSpPr>
-          <p:cNvPr id="2" name="Title 1"/>
+          <p:cNvPr id="2" name="Title 1">
+            <a:extLst>
+              <a:ext uri="{FF2B5EF4-FFF2-40B4-BE49-F238E27FC236}">
+                <a16:creationId xmlns:a16="http://schemas.microsoft.com/office/drawing/2014/main" id="{38EFDA9F-7AD2-4082-A889-4D04ACF66F1F}"/>
+              </a:ext>
+            </a:extLst>
+          </p:cNvPr>
           <p:cNvSpPr>
             <a:spLocks noGrp="1"/>
           </p:cNvSpPr>
@@ -2374,29 +2611,34 @@
         </p:nvSpPr>
         <p:spPr>
           <a:xfrm>
-            <a:off x="1792288" y="4800600"/>
-            <a:ext cx="5486400" cy="566738"/>
+            <a:off x="839788" y="457200"/>
+            <a:ext cx="3932237" cy="1600200"/>
           </a:xfrm>
         </p:spPr>
         <p:txBody>
           <a:bodyPr anchor="b"/>
           <a:lstStyle>
-            <a:lvl1pPr algn="l">
-              <a:defRPr sz="2000" b="1"/>
+            <a:lvl1pPr>
+              <a:defRPr sz="3200"/>
             </a:lvl1pPr>
           </a:lstStyle>
           <a:p>
             <a:r>
-              <a:rPr lang="en-US" smtClean="0"/>
+              <a:rPr lang="en-US"/>
               <a:t>Click to edit Master title style</a:t>
             </a:r>
-            <a:endParaRPr lang="en-US"/>
-          </a:p>
-        </p:txBody>
-      </p:sp>
-      <p:sp>
-        <p:nvSpPr>
-          <p:cNvPr id="3" name="Picture Placeholder 2"/>
+          </a:p>
+        </p:txBody>
+      </p:sp>
+      <p:sp>
+        <p:nvSpPr>
+          <p:cNvPr id="3" name="Picture Placeholder 2">
+            <a:extLst>
+              <a:ext uri="{FF2B5EF4-FFF2-40B4-BE49-F238E27FC236}">
+                <a16:creationId xmlns:a16="http://schemas.microsoft.com/office/drawing/2014/main" id="{E18753F3-33F8-4F08-95E6-E1C102AABA43}"/>
+              </a:ext>
+            </a:extLst>
+          </p:cNvPr>
           <p:cNvSpPr>
             <a:spLocks noGrp="1"/>
           </p:cNvSpPr>
@@ -2406,8 +2648,8 @@
         </p:nvSpPr>
         <p:spPr>
           <a:xfrm>
-            <a:off x="1792288" y="612775"/>
-            <a:ext cx="5486400" cy="4114800"/>
+            <a:off x="5183188" y="987425"/>
+            <a:ext cx="6172200" cy="4873625"/>
           </a:xfrm>
         </p:spPr>
         <p:txBody>
@@ -2457,7 +2699,13 @@
       </p:sp>
       <p:sp>
         <p:nvSpPr>
-          <p:cNvPr id="4" name="Text Placeholder 3"/>
+          <p:cNvPr id="4" name="Text Placeholder 3">
+            <a:extLst>
+              <a:ext uri="{FF2B5EF4-FFF2-40B4-BE49-F238E27FC236}">
+                <a16:creationId xmlns:a16="http://schemas.microsoft.com/office/drawing/2014/main" id="{FEF49F72-C5C2-408C-A224-37881DFE5460}"/>
+              </a:ext>
+            </a:extLst>
+          </p:cNvPr>
           <p:cNvSpPr>
             <a:spLocks noGrp="1"/>
           </p:cNvSpPr>
@@ -2467,8 +2715,8 @@
         </p:nvSpPr>
         <p:spPr>
           <a:xfrm>
-            <a:off x="1792288" y="5367338"/>
-            <a:ext cx="5486400" cy="804862"/>
+            <a:off x="839788" y="2057400"/>
+            <a:ext cx="3932237" cy="3811588"/>
           </a:xfrm>
         </p:spPr>
         <p:txBody>
@@ -2476,68 +2724,74 @@
           <a:lstStyle>
             <a:lvl1pPr marL="0" indent="0">
               <a:buNone/>
-              <a:defRPr sz="1400"/>
+              <a:defRPr sz="1600"/>
             </a:lvl1pPr>
             <a:lvl2pPr marL="457200" indent="0">
               <a:buNone/>
-              <a:defRPr sz="1200"/>
+              <a:defRPr sz="1400"/>
             </a:lvl2pPr>
             <a:lvl3pPr marL="914400" indent="0">
               <a:buNone/>
-              <a:defRPr sz="1000"/>
+              <a:defRPr sz="1200"/>
             </a:lvl3pPr>
             <a:lvl4pPr marL="1371600" indent="0">
               <a:buNone/>
-              <a:defRPr sz="900"/>
+              <a:defRPr sz="1000"/>
             </a:lvl4pPr>
             <a:lvl5pPr marL="1828800" indent="0">
               <a:buNone/>
-              <a:defRPr sz="900"/>
+              <a:defRPr sz="1000"/>
             </a:lvl5pPr>
             <a:lvl6pPr marL="2286000" indent="0">
               <a:buNone/>
-              <a:defRPr sz="900"/>
+              <a:defRPr sz="1000"/>
             </a:lvl6pPr>
             <a:lvl7pPr marL="2743200" indent="0">
               <a:buNone/>
-              <a:defRPr sz="900"/>
+              <a:defRPr sz="1000"/>
             </a:lvl7pPr>
             <a:lvl8pPr marL="3200400" indent="0">
               <a:buNone/>
-              <a:defRPr sz="900"/>
+              <a:defRPr sz="1000"/>
             </a:lvl8pPr>
             <a:lvl9pPr marL="3657600" indent="0">
               <a:buNone/>
-              <a:defRPr sz="900"/>
+              <a:defRPr sz="1000"/>
             </a:lvl9pPr>
           </a:lstStyle>
           <a:p>
             <a:pPr lvl="0"/>
             <a:r>
+              <a:rPr lang="en-US"/>
+              <a:t>Click to edit Master text styles</a:t>
+            </a:r>
+          </a:p>
+        </p:txBody>
+      </p:sp>
+      <p:sp>
+        <p:nvSpPr>
+          <p:cNvPr id="5" name="Date Placeholder 4">
+            <a:extLst>
+              <a:ext uri="{FF2B5EF4-FFF2-40B4-BE49-F238E27FC236}">
+                <a16:creationId xmlns:a16="http://schemas.microsoft.com/office/drawing/2014/main" id="{4F19A0A1-66C6-4BBF-BBEC-4EEEC6C08D49}"/>
+              </a:ext>
+            </a:extLst>
+          </p:cNvPr>
+          <p:cNvSpPr>
+            <a:spLocks noGrp="1"/>
+          </p:cNvSpPr>
+          <p:nvPr>
+            <p:ph type="dt" sz="half" idx="10"/>
+          </p:nvPr>
+        </p:nvSpPr>
+        <p:spPr/>
+        <p:txBody>
+          <a:bodyPr/>
+          <a:lstStyle/>
+          <a:p>
+            <a:fld id="{3EA7974F-46A4-4C38-BBCC-8E262B881B28}" type="datetimeFigureOut">
               <a:rPr lang="en-US" smtClean="0"/>
-              <a:t>Click to edit Master text styles</a:t>
-            </a:r>
-          </a:p>
-        </p:txBody>
-      </p:sp>
-      <p:sp>
-        <p:nvSpPr>
-          <p:cNvPr id="5" name="Date Placeholder 4"/>
-          <p:cNvSpPr>
-            <a:spLocks noGrp="1"/>
-          </p:cNvSpPr>
-          <p:nvPr>
-            <p:ph type="dt" sz="half" idx="10"/>
-          </p:nvPr>
-        </p:nvSpPr>
-        <p:spPr/>
-        <p:txBody>
-          <a:bodyPr/>
-          <a:lstStyle/>
-          <a:p>
-            <a:fld id="{241EB5C9-1307-BA42-ABA2-0BC069CD8E7F}" type="datetimeFigureOut">
-              <a:rPr lang="en-US" smtClean="0"/>
-              <a:t>4/5/2019</a:t>
+              <a:t>10/18/2020</a:t>
             </a:fld>
             <a:endParaRPr lang="en-US"/>
           </a:p>
@@ -2545,7 +2799,13 @@
       </p:sp>
       <p:sp>
         <p:nvSpPr>
-          <p:cNvPr id="6" name="Footer Placeholder 5"/>
+          <p:cNvPr id="6" name="Footer Placeholder 5">
+            <a:extLst>
+              <a:ext uri="{FF2B5EF4-FFF2-40B4-BE49-F238E27FC236}">
+                <a16:creationId xmlns:a16="http://schemas.microsoft.com/office/drawing/2014/main" id="{9115FE9A-E537-402C-8474-2067E48BA376}"/>
+              </a:ext>
+            </a:extLst>
+          </p:cNvPr>
           <p:cNvSpPr>
             <a:spLocks noGrp="1"/>
           </p:cNvSpPr>
@@ -2564,7 +2824,13 @@
       </p:sp>
       <p:sp>
         <p:nvSpPr>
-          <p:cNvPr id="7" name="Slide Number Placeholder 6"/>
+          <p:cNvPr id="7" name="Slide Number Placeholder 6">
+            <a:extLst>
+              <a:ext uri="{FF2B5EF4-FFF2-40B4-BE49-F238E27FC236}">
+                <a16:creationId xmlns:a16="http://schemas.microsoft.com/office/drawing/2014/main" id="{1A9567F2-28EE-4FF5-AFD3-81DE5501778A}"/>
+              </a:ext>
+            </a:extLst>
+          </p:cNvPr>
           <p:cNvSpPr>
             <a:spLocks noGrp="1"/>
           </p:cNvSpPr>
@@ -2577,7 +2843,7 @@
           <a:bodyPr/>
           <a:lstStyle/>
           <a:p>
-            <a:fld id="{C5EF2332-01BF-834F-8236-50238282D533}" type="slidenum">
+            <a:fld id="{1C3A5439-F9F3-4052-B329-868ECC3EAFBE}" type="slidenum">
               <a:rPr lang="en-US" smtClean="0"/>
               <a:t>‹#›</a:t>
             </a:fld>
@@ -2588,7 +2854,7 @@
     </p:spTree>
     <p:extLst>
       <p:ext uri="{BB962C8B-B14F-4D97-AF65-F5344CB8AC3E}">
-        <p14:creationId xmlns:p14="http://schemas.microsoft.com/office/powerpoint/2010/main" val="3566899855"/>
+        <p14:creationId xmlns:p14="http://schemas.microsoft.com/office/powerpoint/2010/main" val="831211884"/>
       </p:ext>
     </p:extLst>
   </p:cSld>
@@ -2622,7 +2888,13 @@
       </p:grpSpPr>
       <p:sp>
         <p:nvSpPr>
-          <p:cNvPr id="2" name="Title Placeholder 1"/>
+          <p:cNvPr id="2" name="Title Placeholder 1">
+            <a:extLst>
+              <a:ext uri="{FF2B5EF4-FFF2-40B4-BE49-F238E27FC236}">
+                <a16:creationId xmlns:a16="http://schemas.microsoft.com/office/drawing/2014/main" id="{BFDF229F-074B-42DD-A1A4-B88470F45901}"/>
+              </a:ext>
+            </a:extLst>
+          </p:cNvPr>
           <p:cNvSpPr>
             <a:spLocks noGrp="1"/>
           </p:cNvSpPr>
@@ -2632,8 +2904,8 @@
         </p:nvSpPr>
         <p:spPr>
           <a:xfrm>
-            <a:off x="457200" y="274638"/>
-            <a:ext cx="8229600" cy="1143000"/>
+            <a:off x="838200" y="365125"/>
+            <a:ext cx="10515600" cy="1325563"/>
           </a:xfrm>
           <a:prstGeom prst="rect">
             <a:avLst/>
@@ -2646,16 +2918,21 @@
           <a:lstStyle/>
           <a:p>
             <a:r>
-              <a:rPr lang="en-US" smtClean="0"/>
+              <a:rPr lang="en-US" dirty="0"/>
               <a:t>Click to edit Master title style</a:t>
             </a:r>
-            <a:endParaRPr lang="en-US"/>
-          </a:p>
-        </p:txBody>
-      </p:sp>
-      <p:sp>
-        <p:nvSpPr>
-          <p:cNvPr id="3" name="Text Placeholder 2"/>
+          </a:p>
+        </p:txBody>
+      </p:sp>
+      <p:sp>
+        <p:nvSpPr>
+          <p:cNvPr id="3" name="Text Placeholder 2">
+            <a:extLst>
+              <a:ext uri="{FF2B5EF4-FFF2-40B4-BE49-F238E27FC236}">
+                <a16:creationId xmlns:a16="http://schemas.microsoft.com/office/drawing/2014/main" id="{4A647378-4D5B-4E94-B9DF-A4A8BB124B50}"/>
+              </a:ext>
+            </a:extLst>
+          </p:cNvPr>
           <p:cNvSpPr>
             <a:spLocks noGrp="1"/>
           </p:cNvSpPr>
@@ -2665,8 +2942,8 @@
         </p:nvSpPr>
         <p:spPr>
           <a:xfrm>
-            <a:off x="457200" y="1600200"/>
-            <a:ext cx="8229600" cy="4525963"/>
+            <a:off x="838200" y="1825625"/>
+            <a:ext cx="10515600" cy="4351338"/>
           </a:xfrm>
           <a:prstGeom prst="rect">
             <a:avLst/>
@@ -2680,44 +2957,49 @@
           <a:p>
             <a:pPr lvl="0"/>
             <a:r>
-              <a:rPr lang="en-US" smtClean="0"/>
+              <a:rPr lang="en-US" dirty="0"/>
               <a:t>Click to edit Master text styles</a:t>
             </a:r>
           </a:p>
           <a:p>
             <a:pPr lvl="1"/>
             <a:r>
-              <a:rPr lang="en-US" smtClean="0"/>
+              <a:rPr lang="en-US" dirty="0"/>
               <a:t>Second level</a:t>
             </a:r>
           </a:p>
           <a:p>
             <a:pPr lvl="2"/>
             <a:r>
-              <a:rPr lang="en-US" smtClean="0"/>
+              <a:rPr lang="en-US" dirty="0"/>
               <a:t>Third level</a:t>
             </a:r>
           </a:p>
           <a:p>
             <a:pPr lvl="3"/>
             <a:r>
-              <a:rPr lang="en-US" smtClean="0"/>
+              <a:rPr lang="en-US" dirty="0"/>
               <a:t>Fourth level</a:t>
             </a:r>
           </a:p>
           <a:p>
             <a:pPr lvl="4"/>
             <a:r>
-              <a:rPr lang="en-US" smtClean="0"/>
+              <a:rPr lang="en-US" dirty="0"/>
               <a:t>Fifth level</a:t>
             </a:r>
-            <a:endParaRPr lang="en-US"/>
-          </a:p>
-        </p:txBody>
-      </p:sp>
-      <p:sp>
-        <p:nvSpPr>
-          <p:cNvPr id="4" name="Date Placeholder 3"/>
+          </a:p>
+        </p:txBody>
+      </p:sp>
+      <p:sp>
+        <p:nvSpPr>
+          <p:cNvPr id="4" name="Date Placeholder 3">
+            <a:extLst>
+              <a:ext uri="{FF2B5EF4-FFF2-40B4-BE49-F238E27FC236}">
+                <a16:creationId xmlns:a16="http://schemas.microsoft.com/office/drawing/2014/main" id="{3B18CBD0-28DD-4219-9F01-BE04E486666E}"/>
+              </a:ext>
+            </a:extLst>
+          </p:cNvPr>
           <p:cNvSpPr>
             <a:spLocks noGrp="1"/>
           </p:cNvSpPr>
@@ -2727,8 +3009,8 @@
         </p:nvSpPr>
         <p:spPr>
           <a:xfrm>
-            <a:off x="457200" y="6356350"/>
-            <a:ext cx="2133600" cy="365125"/>
+            <a:off x="838200" y="6356350"/>
+            <a:ext cx="2743200" cy="365125"/>
           </a:xfrm>
           <a:prstGeom prst="rect">
             <a:avLst/>
@@ -2748,9 +3030,9 @@
             </a:lvl1pPr>
           </a:lstStyle>
           <a:p>
-            <a:fld id="{241EB5C9-1307-BA42-ABA2-0BC069CD8E7F}" type="datetimeFigureOut">
+            <a:fld id="{3EA7974F-46A4-4C38-BBCC-8E262B881B28}" type="datetimeFigureOut">
               <a:rPr lang="en-US" smtClean="0"/>
-              <a:t>4/5/2019</a:t>
+              <a:t>10/18/2020</a:t>
             </a:fld>
             <a:endParaRPr lang="en-US"/>
           </a:p>
@@ -2758,7 +3040,13 @@
       </p:sp>
       <p:sp>
         <p:nvSpPr>
-          <p:cNvPr id="5" name="Footer Placeholder 4"/>
+          <p:cNvPr id="5" name="Footer Placeholder 4">
+            <a:extLst>
+              <a:ext uri="{FF2B5EF4-FFF2-40B4-BE49-F238E27FC236}">
+                <a16:creationId xmlns:a16="http://schemas.microsoft.com/office/drawing/2014/main" id="{E42A8DA8-6257-4856-A223-F9EC6C543FAD}"/>
+              </a:ext>
+            </a:extLst>
+          </p:cNvPr>
           <p:cNvSpPr>
             <a:spLocks noGrp="1"/>
           </p:cNvSpPr>
@@ -2768,8 +3056,8 @@
         </p:nvSpPr>
         <p:spPr>
           <a:xfrm>
-            <a:off x="3124200" y="6356350"/>
-            <a:ext cx="2895600" cy="365125"/>
+            <a:off x="4038600" y="6356350"/>
+            <a:ext cx="4114800" cy="365125"/>
           </a:xfrm>
           <a:prstGeom prst="rect">
             <a:avLst/>
@@ -2795,7 +3083,13 @@
       </p:sp>
       <p:sp>
         <p:nvSpPr>
-          <p:cNvPr id="6" name="Slide Number Placeholder 5"/>
+          <p:cNvPr id="6" name="Slide Number Placeholder 5">
+            <a:extLst>
+              <a:ext uri="{FF2B5EF4-FFF2-40B4-BE49-F238E27FC236}">
+                <a16:creationId xmlns:a16="http://schemas.microsoft.com/office/drawing/2014/main" id="{F2F964A1-6988-48EC-9553-5C03CC35076A}"/>
+              </a:ext>
+            </a:extLst>
+          </p:cNvPr>
           <p:cNvSpPr>
             <a:spLocks noGrp="1"/>
           </p:cNvSpPr>
@@ -2805,8 +3099,8 @@
         </p:nvSpPr>
         <p:spPr>
           <a:xfrm>
-            <a:off x="6553200" y="6356350"/>
-            <a:ext cx="2133600" cy="365125"/>
+            <a:off x="8610600" y="6356350"/>
+            <a:ext cx="2743200" cy="365125"/>
           </a:xfrm>
           <a:prstGeom prst="rect">
             <a:avLst/>
@@ -2826,7 +3120,7 @@
             </a:lvl1pPr>
           </a:lstStyle>
           <a:p>
-            <a:fld id="{C5EF2332-01BF-834F-8236-50238282D533}" type="slidenum">
+            <a:fld id="{1C3A5439-F9F3-4052-B329-868ECC3EAFBE}" type="slidenum">
               <a:rPr lang="en-US" smtClean="0"/>
               <a:t>‹#›</a:t>
             </a:fld>
@@ -2837,7 +3131,7 @@
     </p:spTree>
     <p:extLst>
       <p:ext uri="{BB962C8B-B14F-4D97-AF65-F5344CB8AC3E}">
-        <p14:creationId xmlns:p14="http://schemas.microsoft.com/office/powerpoint/2010/main" val="3676200875"/>
+        <p14:creationId xmlns:p14="http://schemas.microsoft.com/office/powerpoint/2010/main" val="1518421066"/>
       </p:ext>
     </p:extLst>
   </p:cSld>
@@ -2857,7 +3151,10 @@
   </p:sldLayoutIdLst>
   <p:txStyles>
     <p:titleStyle>
-      <a:lvl1pPr algn="ctr" defTabSz="457200" rtl="0" eaLnBrk="1" latinLnBrk="0" hangingPunct="1">
+      <a:lvl1pPr algn="l" defTabSz="914400" rtl="0" eaLnBrk="1" latinLnBrk="0" hangingPunct="1">
+        <a:lnSpc>
+          <a:spcPct val="90000"/>
+        </a:lnSpc>
         <a:spcBef>
           <a:spcPct val="0"/>
         </a:spcBef>
@@ -2873,13 +3170,16 @@
       </a:lvl1pPr>
     </p:titleStyle>
     <p:bodyStyle>
-      <a:lvl1pPr marL="342900" indent="-342900" algn="l" defTabSz="457200" rtl="0" eaLnBrk="1" latinLnBrk="0" hangingPunct="1">
+      <a:lvl1pPr marL="228600" indent="-228600" algn="l" defTabSz="914400" rtl="0" eaLnBrk="1" latinLnBrk="0" hangingPunct="1">
+        <a:lnSpc>
+          <a:spcPct val="90000"/>
+        </a:lnSpc>
         <a:spcBef>
-          <a:spcPct val="20000"/>
+          <a:spcPts val="1000"/>
         </a:spcBef>
-        <a:buFont typeface="Arial"/>
+        <a:buFont typeface="Arial" panose="020B0604020202020204" pitchFamily="34" charset="0"/>
         <a:buChar char="•"/>
-        <a:defRPr sz="3200" kern="1200">
+        <a:defRPr sz="2800" kern="1200">
           <a:solidFill>
             <a:schemeClr val="tx1"/>
           </a:solidFill>
@@ -2888,26 +3188,14 @@
           <a:cs typeface="+mn-cs"/>
         </a:defRPr>
       </a:lvl1pPr>
-      <a:lvl2pPr marL="742950" indent="-285750" algn="l" defTabSz="457200" rtl="0" eaLnBrk="1" latinLnBrk="0" hangingPunct="1">
+      <a:lvl2pPr marL="685800" indent="-228600" algn="l" defTabSz="914400" rtl="0" eaLnBrk="1" latinLnBrk="0" hangingPunct="1">
+        <a:lnSpc>
+          <a:spcPct val="90000"/>
+        </a:lnSpc>
         <a:spcBef>
-          <a:spcPct val="20000"/>
+          <a:spcPts val="500"/>
         </a:spcBef>
-        <a:buFont typeface="Arial"/>
-        <a:buChar char="–"/>
-        <a:defRPr sz="2800" kern="1200">
-          <a:solidFill>
-            <a:schemeClr val="tx1"/>
-          </a:solidFill>
-          <a:latin typeface="+mn-lt"/>
-          <a:ea typeface="+mn-ea"/>
-          <a:cs typeface="+mn-cs"/>
-        </a:defRPr>
-      </a:lvl2pPr>
-      <a:lvl3pPr marL="1143000" indent="-228600" algn="l" defTabSz="457200" rtl="0" eaLnBrk="1" latinLnBrk="0" hangingPunct="1">
-        <a:spcBef>
-          <a:spcPct val="20000"/>
-        </a:spcBef>
-        <a:buFont typeface="Arial"/>
+        <a:buFont typeface="Arial" panose="020B0604020202020204" pitchFamily="34" charset="0"/>
         <a:buChar char="•"/>
         <a:defRPr sz="2400" kern="1200">
           <a:solidFill>
@@ -2917,42 +3205,15 @@
           <a:ea typeface="+mn-ea"/>
           <a:cs typeface="+mn-cs"/>
         </a:defRPr>
-      </a:lvl3pPr>
-      <a:lvl4pPr marL="1600200" indent="-228600" algn="l" defTabSz="457200" rtl="0" eaLnBrk="1" latinLnBrk="0" hangingPunct="1">
+      </a:lvl2pPr>
+      <a:lvl3pPr marL="1143000" indent="-228600" algn="l" defTabSz="914400" rtl="0" eaLnBrk="1" latinLnBrk="0" hangingPunct="1">
+        <a:lnSpc>
+          <a:spcPct val="90000"/>
+        </a:lnSpc>
         <a:spcBef>
-          <a:spcPct val="20000"/>
+          <a:spcPts val="500"/>
         </a:spcBef>
-        <a:buFont typeface="Arial"/>
-        <a:buChar char="–"/>
-        <a:defRPr sz="2000" kern="1200">
-          <a:solidFill>
-            <a:schemeClr val="tx1"/>
-          </a:solidFill>
-          <a:latin typeface="+mn-lt"/>
-          <a:ea typeface="+mn-ea"/>
-          <a:cs typeface="+mn-cs"/>
-        </a:defRPr>
-      </a:lvl4pPr>
-      <a:lvl5pPr marL="2057400" indent="-228600" algn="l" defTabSz="457200" rtl="0" eaLnBrk="1" latinLnBrk="0" hangingPunct="1">
-        <a:spcBef>
-          <a:spcPct val="20000"/>
-        </a:spcBef>
-        <a:buFont typeface="Arial"/>
-        <a:buChar char="»"/>
-        <a:defRPr sz="2000" kern="1200">
-          <a:solidFill>
-            <a:schemeClr val="tx1"/>
-          </a:solidFill>
-          <a:latin typeface="+mn-lt"/>
-          <a:ea typeface="+mn-ea"/>
-          <a:cs typeface="+mn-cs"/>
-        </a:defRPr>
-      </a:lvl5pPr>
-      <a:lvl6pPr marL="2514600" indent="-228600" algn="l" defTabSz="457200" rtl="0" eaLnBrk="1" latinLnBrk="0" hangingPunct="1">
-        <a:spcBef>
-          <a:spcPct val="20000"/>
-        </a:spcBef>
-        <a:buFont typeface="Arial"/>
+        <a:buFont typeface="Arial" panose="020B0604020202020204" pitchFamily="34" charset="0"/>
         <a:buChar char="•"/>
         <a:defRPr sz="2000" kern="1200">
           <a:solidFill>
@@ -2962,14 +3223,71 @@
           <a:ea typeface="+mn-ea"/>
           <a:cs typeface="+mn-cs"/>
         </a:defRPr>
+      </a:lvl3pPr>
+      <a:lvl4pPr marL="1600200" indent="-228600" algn="l" defTabSz="914400" rtl="0" eaLnBrk="1" latinLnBrk="0" hangingPunct="1">
+        <a:lnSpc>
+          <a:spcPct val="90000"/>
+        </a:lnSpc>
+        <a:spcBef>
+          <a:spcPts val="500"/>
+        </a:spcBef>
+        <a:buFont typeface="Arial" panose="020B0604020202020204" pitchFamily="34" charset="0"/>
+        <a:buChar char="•"/>
+        <a:defRPr sz="1800" kern="1200">
+          <a:solidFill>
+            <a:schemeClr val="tx1"/>
+          </a:solidFill>
+          <a:latin typeface="+mn-lt"/>
+          <a:ea typeface="+mn-ea"/>
+          <a:cs typeface="+mn-cs"/>
+        </a:defRPr>
+      </a:lvl4pPr>
+      <a:lvl5pPr marL="2057400" indent="-228600" algn="l" defTabSz="914400" rtl="0" eaLnBrk="1" latinLnBrk="0" hangingPunct="1">
+        <a:lnSpc>
+          <a:spcPct val="90000"/>
+        </a:lnSpc>
+        <a:spcBef>
+          <a:spcPts val="500"/>
+        </a:spcBef>
+        <a:buFont typeface="Arial" panose="020B0604020202020204" pitchFamily="34" charset="0"/>
+        <a:buChar char="•"/>
+        <a:defRPr sz="1800" kern="1200">
+          <a:solidFill>
+            <a:schemeClr val="tx1"/>
+          </a:solidFill>
+          <a:latin typeface="+mn-lt"/>
+          <a:ea typeface="+mn-ea"/>
+          <a:cs typeface="+mn-cs"/>
+        </a:defRPr>
+      </a:lvl5pPr>
+      <a:lvl6pPr marL="2514600" indent="-228600" algn="l" defTabSz="914400" rtl="0" eaLnBrk="1" latinLnBrk="0" hangingPunct="1">
+        <a:lnSpc>
+          <a:spcPct val="90000"/>
+        </a:lnSpc>
+        <a:spcBef>
+          <a:spcPts val="500"/>
+        </a:spcBef>
+        <a:buFont typeface="Arial" panose="020B0604020202020204" pitchFamily="34" charset="0"/>
+        <a:buChar char="•"/>
+        <a:defRPr sz="1800" kern="1200">
+          <a:solidFill>
+            <a:schemeClr val="tx1"/>
+          </a:solidFill>
+          <a:latin typeface="+mn-lt"/>
+          <a:ea typeface="+mn-ea"/>
+          <a:cs typeface="+mn-cs"/>
+        </a:defRPr>
       </a:lvl6pPr>
-      <a:lvl7pPr marL="2971800" indent="-228600" algn="l" defTabSz="457200" rtl="0" eaLnBrk="1" latinLnBrk="0" hangingPunct="1">
+      <a:lvl7pPr marL="2971800" indent="-228600" algn="l" defTabSz="914400" rtl="0" eaLnBrk="1" latinLnBrk="0" hangingPunct="1">
+        <a:lnSpc>
+          <a:spcPct val="90000"/>
+        </a:lnSpc>
         <a:spcBef>
-          <a:spcPct val="20000"/>
+          <a:spcPts val="500"/>
         </a:spcBef>
-        <a:buFont typeface="Arial"/>
+        <a:buFont typeface="Arial" panose="020B0604020202020204" pitchFamily="34" charset="0"/>
         <a:buChar char="•"/>
-        <a:defRPr sz="2000" kern="1200">
+        <a:defRPr sz="1800" kern="1200">
           <a:solidFill>
             <a:schemeClr val="tx1"/>
           </a:solidFill>
@@ -2978,13 +3296,16 @@
           <a:cs typeface="+mn-cs"/>
         </a:defRPr>
       </a:lvl7pPr>
-      <a:lvl8pPr marL="3429000" indent="-228600" algn="l" defTabSz="457200" rtl="0" eaLnBrk="1" latinLnBrk="0" hangingPunct="1">
+      <a:lvl8pPr marL="3429000" indent="-228600" algn="l" defTabSz="914400" rtl="0" eaLnBrk="1" latinLnBrk="0" hangingPunct="1">
+        <a:lnSpc>
+          <a:spcPct val="90000"/>
+        </a:lnSpc>
         <a:spcBef>
-          <a:spcPct val="20000"/>
+          <a:spcPts val="500"/>
         </a:spcBef>
-        <a:buFont typeface="Arial"/>
+        <a:buFont typeface="Arial" panose="020B0604020202020204" pitchFamily="34" charset="0"/>
         <a:buChar char="•"/>
-        <a:defRPr sz="2000" kern="1200">
+        <a:defRPr sz="1800" kern="1200">
           <a:solidFill>
             <a:schemeClr val="tx1"/>
           </a:solidFill>
@@ -2993,13 +3314,16 @@
           <a:cs typeface="+mn-cs"/>
         </a:defRPr>
       </a:lvl8pPr>
-      <a:lvl9pPr marL="3886200" indent="-228600" algn="l" defTabSz="457200" rtl="0" eaLnBrk="1" latinLnBrk="0" hangingPunct="1">
+      <a:lvl9pPr marL="3886200" indent="-228600" algn="l" defTabSz="914400" rtl="0" eaLnBrk="1" latinLnBrk="0" hangingPunct="1">
+        <a:lnSpc>
+          <a:spcPct val="90000"/>
+        </a:lnSpc>
         <a:spcBef>
-          <a:spcPct val="20000"/>
+          <a:spcPts val="500"/>
         </a:spcBef>
-        <a:buFont typeface="Arial"/>
+        <a:buFont typeface="Arial" panose="020B0604020202020204" pitchFamily="34" charset="0"/>
         <a:buChar char="•"/>
-        <a:defRPr sz="2000" kern="1200">
+        <a:defRPr sz="1800" kern="1200">
           <a:solidFill>
             <a:schemeClr val="tx1"/>
           </a:solidFill>
@@ -3013,7 +3337,7 @@
       <a:defPPr>
         <a:defRPr lang="en-US"/>
       </a:defPPr>
-      <a:lvl1pPr marL="0" algn="l" defTabSz="457200" rtl="0" eaLnBrk="1" latinLnBrk="0" hangingPunct="1">
+      <a:lvl1pPr marL="0" algn="l" defTabSz="914400" rtl="0" eaLnBrk="1" latinLnBrk="0" hangingPunct="1">
         <a:defRPr sz="1800" kern="1200">
           <a:solidFill>
             <a:schemeClr val="tx1"/>
@@ -3023,7 +3347,7 @@
           <a:cs typeface="+mn-cs"/>
         </a:defRPr>
       </a:lvl1pPr>
-      <a:lvl2pPr marL="457200" algn="l" defTabSz="457200" rtl="0" eaLnBrk="1" latinLnBrk="0" hangingPunct="1">
+      <a:lvl2pPr marL="457200" algn="l" defTabSz="914400" rtl="0" eaLnBrk="1" latinLnBrk="0" hangingPunct="1">
         <a:defRPr sz="1800" kern="1200">
           <a:solidFill>
             <a:schemeClr val="tx1"/>
@@ -3033,7 +3357,7 @@
           <a:cs typeface="+mn-cs"/>
         </a:defRPr>
       </a:lvl2pPr>
-      <a:lvl3pPr marL="914400" algn="l" defTabSz="457200" rtl="0" eaLnBrk="1" latinLnBrk="0" hangingPunct="1">
+      <a:lvl3pPr marL="914400" algn="l" defTabSz="914400" rtl="0" eaLnBrk="1" latinLnBrk="0" hangingPunct="1">
         <a:defRPr sz="1800" kern="1200">
           <a:solidFill>
             <a:schemeClr val="tx1"/>
@@ -3043,7 +3367,7 @@
           <a:cs typeface="+mn-cs"/>
         </a:defRPr>
       </a:lvl3pPr>
-      <a:lvl4pPr marL="1371600" algn="l" defTabSz="457200" rtl="0" eaLnBrk="1" latinLnBrk="0" hangingPunct="1">
+      <a:lvl4pPr marL="1371600" algn="l" defTabSz="914400" rtl="0" eaLnBrk="1" latinLnBrk="0" hangingPunct="1">
         <a:defRPr sz="1800" kern="1200">
           <a:solidFill>
             <a:schemeClr val="tx1"/>
@@ -3053,7 +3377,7 @@
           <a:cs typeface="+mn-cs"/>
         </a:defRPr>
       </a:lvl4pPr>
-      <a:lvl5pPr marL="1828800" algn="l" defTabSz="457200" rtl="0" eaLnBrk="1" latinLnBrk="0" hangingPunct="1">
+      <a:lvl5pPr marL="1828800" algn="l" defTabSz="914400" rtl="0" eaLnBrk="1" latinLnBrk="0" hangingPunct="1">
         <a:defRPr sz="1800" kern="1200">
           <a:solidFill>
             <a:schemeClr val="tx1"/>
@@ -3063,7 +3387,7 @@
           <a:cs typeface="+mn-cs"/>
         </a:defRPr>
       </a:lvl5pPr>
-      <a:lvl6pPr marL="2286000" algn="l" defTabSz="457200" rtl="0" eaLnBrk="1" latinLnBrk="0" hangingPunct="1">
+      <a:lvl6pPr marL="2286000" algn="l" defTabSz="914400" rtl="0" eaLnBrk="1" latinLnBrk="0" hangingPunct="1">
         <a:defRPr sz="1800" kern="1200">
           <a:solidFill>
             <a:schemeClr val="tx1"/>
@@ -3073,7 +3397,7 @@
           <a:cs typeface="+mn-cs"/>
         </a:defRPr>
       </a:lvl6pPr>
-      <a:lvl7pPr marL="2743200" algn="l" defTabSz="457200" rtl="0" eaLnBrk="1" latinLnBrk="0" hangingPunct="1">
+      <a:lvl7pPr marL="2743200" algn="l" defTabSz="914400" rtl="0" eaLnBrk="1" latinLnBrk="0" hangingPunct="1">
         <a:defRPr sz="1800" kern="1200">
           <a:solidFill>
             <a:schemeClr val="tx1"/>
@@ -3083,7 +3407,7 @@
           <a:cs typeface="+mn-cs"/>
         </a:defRPr>
       </a:lvl7pPr>
-      <a:lvl8pPr marL="3200400" algn="l" defTabSz="457200" rtl="0" eaLnBrk="1" latinLnBrk="0" hangingPunct="1">
+      <a:lvl8pPr marL="3200400" algn="l" defTabSz="914400" rtl="0" eaLnBrk="1" latinLnBrk="0" hangingPunct="1">
         <a:defRPr sz="1800" kern="1200">
           <a:solidFill>
             <a:schemeClr val="tx1"/>
@@ -3093,7 +3417,7 @@
           <a:cs typeface="+mn-cs"/>
         </a:defRPr>
       </a:lvl8pPr>
-      <a:lvl9pPr marL="3657600" algn="l" defTabSz="457200" rtl="0" eaLnBrk="1" latinLnBrk="0" hangingPunct="1">
+      <a:lvl9pPr marL="3657600" algn="l" defTabSz="914400" rtl="0" eaLnBrk="1" latinLnBrk="0" hangingPunct="1">
         <a:defRPr sz="1800" kern="1200">
           <a:solidFill>
             <a:schemeClr val="tx1"/>
@@ -3127,7 +3451,13 @@
       </p:grpSpPr>
       <p:sp>
         <p:nvSpPr>
-          <p:cNvPr id="2" name="Title 1"/>
+          <p:cNvPr id="2" name="Title 1">
+            <a:extLst>
+              <a:ext uri="{FF2B5EF4-FFF2-40B4-BE49-F238E27FC236}">
+                <a16:creationId xmlns:a16="http://schemas.microsoft.com/office/drawing/2014/main" id="{ADF8BC5D-79F0-4134-BAB8-9CDB86E9C819}"/>
+              </a:ext>
+            </a:extLst>
+          </p:cNvPr>
           <p:cNvSpPr>
             <a:spLocks noGrp="1"/>
           </p:cNvSpPr>
@@ -3137,8 +3467,8 @@
         </p:nvSpPr>
         <p:spPr>
           <a:xfrm>
-            <a:off x="685800" y="2130425"/>
-            <a:ext cx="7772400" cy="1470025"/>
+            <a:off x="261257" y="1041400"/>
+            <a:ext cx="11495314" cy="2387600"/>
           </a:xfrm>
         </p:spPr>
         <p:txBody>
@@ -3205,7 +3535,13 @@
       </p:sp>
       <p:sp>
         <p:nvSpPr>
-          <p:cNvPr id="3" name="Subtitle 2"/>
+          <p:cNvPr id="3" name="Subtitle 2">
+            <a:extLst>
+              <a:ext uri="{FF2B5EF4-FFF2-40B4-BE49-F238E27FC236}">
+                <a16:creationId xmlns:a16="http://schemas.microsoft.com/office/drawing/2014/main" id="{DEC5BA95-BEC6-453C-950E-BB68DDC672AE}"/>
+              </a:ext>
+            </a:extLst>
+          </p:cNvPr>
           <p:cNvSpPr>
             <a:spLocks noGrp="1"/>
           </p:cNvSpPr>
@@ -3215,8 +3551,8 @@
         </p:nvSpPr>
         <p:spPr>
           <a:xfrm>
-            <a:off x="1371600" y="3886200"/>
-            <a:ext cx="6400800" cy="1752600"/>
+            <a:off x="261257" y="3645581"/>
+            <a:ext cx="9144000" cy="1655762"/>
           </a:xfrm>
         </p:spPr>
         <p:txBody>
@@ -3245,7 +3581,13 @@
       </p:sp>
       <p:sp>
         <p:nvSpPr>
-          <p:cNvPr id="4" name="Date Placeholder 3"/>
+          <p:cNvPr id="4" name="Date Placeholder 3">
+            <a:extLst>
+              <a:ext uri="{FF2B5EF4-FFF2-40B4-BE49-F238E27FC236}">
+                <a16:creationId xmlns:a16="http://schemas.microsoft.com/office/drawing/2014/main" id="{1179C87F-56DB-40BE-8575-F9B18BF7C38C}"/>
+              </a:ext>
+            </a:extLst>
+          </p:cNvPr>
           <p:cNvSpPr>
             <a:spLocks noGrp="1"/>
           </p:cNvSpPr>
@@ -3253,7 +3595,12 @@
             <p:ph type="dt" sz="half" idx="10"/>
           </p:nvPr>
         </p:nvSpPr>
-        <p:spPr/>
+        <p:spPr>
+          <a:xfrm>
+            <a:off x="261257" y="413543"/>
+            <a:ext cx="2743200" cy="365125"/>
+          </a:xfrm>
+        </p:spPr>
         <p:txBody>
           <a:bodyPr/>
           <a:lstStyle/>
@@ -3263,7 +3610,23 @@
             </a:pPr>
             <a:r>
               <a:rPr/>
-              <a:t>9/22/2020</a:t>
+              <a:t>October</a:t>
+            </a:r>
+            <a:r>
+              <a:rPr/>
+              <a:t> </a:t>
+            </a:r>
+            <a:r>
+              <a:rPr/>
+              <a:t>21,</a:t>
+            </a:r>
+            <a:r>
+              <a:rPr/>
+              <a:t> </a:t>
+            </a:r>
+            <a:r>
+              <a:rPr/>
+              <a:t>2020</a:t>
             </a:r>
           </a:p>
         </p:txBody>
@@ -3292,7 +3655,13 @@
       </p:grpSpPr>
       <p:sp>
         <p:nvSpPr>
-          <p:cNvPr id="2" name="Title 1"/>
+          <p:cNvPr id="2" name="Title 1">
+            <a:extLst>
+              <a:ext uri="{FF2B5EF4-FFF2-40B4-BE49-F238E27FC236}">
+                <a16:creationId xmlns:a16="http://schemas.microsoft.com/office/drawing/2014/main" id="{0D064A50-2A97-421C-813D-6449089693A0}"/>
+              </a:ext>
+            </a:extLst>
+          </p:cNvPr>
           <p:cNvSpPr>
             <a:spLocks noGrp="1"/>
           </p:cNvSpPr>
@@ -3387,8 +3756,8 @@
         </p:blipFill>
         <p:spPr bwMode="auto">
           <a:xfrm>
-            <a:off x="457200" y="1803400"/>
-            <a:ext cx="8229600" cy="4114800"/>
+            <a:off x="1752600" y="1816100"/>
+            <a:ext cx="8686800" cy="4343400"/>
           </a:xfrm>
           <a:prstGeom prst="rect">
             <a:avLst/>
@@ -3425,7 +3794,13 @@
       </p:grpSpPr>
       <p:sp>
         <p:nvSpPr>
-          <p:cNvPr id="2" name="Title 1"/>
+          <p:cNvPr id="2" name="Title 1">
+            <a:extLst>
+              <a:ext uri="{FF2B5EF4-FFF2-40B4-BE49-F238E27FC236}">
+                <a16:creationId xmlns:a16="http://schemas.microsoft.com/office/drawing/2014/main" id="{0D064A50-2A97-421C-813D-6449089693A0}"/>
+              </a:ext>
+            </a:extLst>
+          </p:cNvPr>
           <p:cNvSpPr>
             <a:spLocks noGrp="1"/>
           </p:cNvSpPr>
@@ -3472,8 +3847,8 @@
         </p:blipFill>
         <p:spPr bwMode="auto">
           <a:xfrm>
-            <a:off x="457200" y="1803400"/>
-            <a:ext cx="8229600" cy="4114800"/>
+            <a:off x="1752600" y="1816100"/>
+            <a:ext cx="8686800" cy="4343400"/>
           </a:xfrm>
           <a:prstGeom prst="rect">
             <a:avLst/>
@@ -3510,7 +3885,13 @@
       </p:grpSpPr>
       <p:sp>
         <p:nvSpPr>
-          <p:cNvPr id="2" name="Title 1"/>
+          <p:cNvPr id="2" name="Title 1">
+            <a:extLst>
+              <a:ext uri="{FF2B5EF4-FFF2-40B4-BE49-F238E27FC236}">
+                <a16:creationId xmlns:a16="http://schemas.microsoft.com/office/drawing/2014/main" id="{0D064A50-2A97-421C-813D-6449089693A0}"/>
+              </a:ext>
+            </a:extLst>
+          </p:cNvPr>
           <p:cNvSpPr>
             <a:spLocks noGrp="1"/>
           </p:cNvSpPr>
@@ -3565,8 +3946,8 @@
         </p:blipFill>
         <p:spPr bwMode="auto">
           <a:xfrm>
-            <a:off x="457200" y="1803400"/>
-            <a:ext cx="8229600" cy="4114800"/>
+            <a:off x="1752600" y="1816100"/>
+            <a:ext cx="8686800" cy="4343400"/>
           </a:xfrm>
           <a:prstGeom prst="rect">
             <a:avLst/>
@@ -3617,8 +3998,8 @@
         </p:blipFill>
         <p:spPr bwMode="auto">
           <a:xfrm>
-            <a:off x="457200" y="1803400"/>
-            <a:ext cx="8229600" cy="4114800"/>
+            <a:off x="1752600" y="1816100"/>
+            <a:ext cx="8686800" cy="4343400"/>
           </a:xfrm>
           <a:prstGeom prst="rect">
             <a:avLst/>
@@ -3653,61 +4034,15 @@
           <a:chExt cx="0" cy="0"/>
         </a:xfrm>
       </p:grpSpPr>
-      <p:pic>
-        <p:nvPicPr>
-          <p:cNvPr descr="demographic_estimates_files/figure-pptx/unnamed-chunk-10-1.png" id="0" name="Picture 1"/>
-          <p:cNvPicPr>
-            <a:picLocks noGrp="1" noChangeAspect="1"/>
-          </p:cNvPicPr>
-          <p:nvPr/>
-        </p:nvPicPr>
-        <p:blipFill>
-          <a:blip r:embed="rId2"/>
-          <a:stretch>
-            <a:fillRect/>
-          </a:stretch>
-        </p:blipFill>
-        <p:spPr bwMode="auto">
-          <a:xfrm>
-            <a:off x="457200" y="1803400"/>
-            <a:ext cx="8229600" cy="4114800"/>
-          </a:xfrm>
-          <a:prstGeom prst="rect">
-            <a:avLst/>
-          </a:prstGeom>
-          <a:noFill/>
-          <a:ln w="9525">
-            <a:noFill/>
-            <a:headEnd/>
-            <a:tailEnd/>
-          </a:ln>
-        </p:spPr>
-      </p:pic>
-    </p:spTree>
-  </p:cSld>
-</p:sld>
-</file>
-
-<file path=ppt/slides/slide15.xml><?xml version="1.0" encoding="utf-8"?>
-<p:sld xmlns:a="http://schemas.openxmlformats.org/drawingml/2006/main" xmlns:r="http://schemas.openxmlformats.org/officeDocument/2006/relationships" xmlns:p="http://schemas.openxmlformats.org/presentationml/2006/main">
-  <p:cSld>
-    <p:spTree>
-      <p:nvGrpSpPr>
-        <p:cNvPr id="1" name=""/>
-        <p:cNvGrpSpPr/>
-        <p:nvPr/>
-      </p:nvGrpSpPr>
-      <p:grpSpPr>
-        <a:xfrm>
-          <a:off x="0" y="0"/>
-          <a:ext cx="0" cy="0"/>
-          <a:chOff x="0" y="0"/>
-          <a:chExt cx="0" cy="0"/>
-        </a:xfrm>
-      </p:grpSpPr>
-      <p:sp>
-        <p:nvSpPr>
-          <p:cNvPr id="2" name="Title 1"/>
+      <p:sp>
+        <p:nvSpPr>
+          <p:cNvPr id="2" name="Title 1">
+            <a:extLst>
+              <a:ext uri="{FF2B5EF4-FFF2-40B4-BE49-F238E27FC236}">
+                <a16:creationId xmlns:a16="http://schemas.microsoft.com/office/drawing/2014/main" id="{0D064A50-2A97-421C-813D-6449089693A0}"/>
+              </a:ext>
+            </a:extLst>
+          </p:cNvPr>
           <p:cNvSpPr>
             <a:spLocks noGrp="1"/>
           </p:cNvSpPr>
@@ -3742,6 +4077,46 @@
             <a:r>
               <a:rPr/>
               <a:t>PUMA</a:t>
+            </a:r>
+            <a:r>
+              <a:rPr/>
+              <a:t> </a:t>
+            </a:r>
+            <a:r>
+              <a:rPr/>
+              <a:t>with</a:t>
+            </a:r>
+            <a:r>
+              <a:rPr/>
+              <a:t> </a:t>
+            </a:r>
+            <a:r>
+              <a:rPr/>
+              <a:t>City</a:t>
+            </a:r>
+            <a:r>
+              <a:rPr/>
+              <a:t> </a:t>
+            </a:r>
+            <a:r>
+              <a:rPr/>
+              <a:t>of</a:t>
+            </a:r>
+            <a:r>
+              <a:rPr/>
+              <a:t> </a:t>
+            </a:r>
+            <a:r>
+              <a:rPr/>
+              <a:t>Chicago</a:t>
+            </a:r>
+            <a:r>
+              <a:rPr/>
+              <a:t> </a:t>
+            </a:r>
+            <a:r>
+              <a:rPr/>
+              <a:t>Overlay</a:t>
             </a:r>
           </a:p>
         </p:txBody>
@@ -3762,8 +4137,8 @@
         </p:blipFill>
         <p:spPr bwMode="auto">
           <a:xfrm>
-            <a:off x="457200" y="1803400"/>
-            <a:ext cx="8229600" cy="4114800"/>
+            <a:off x="1752600" y="1816100"/>
+            <a:ext cx="8686800" cy="4343400"/>
           </a:xfrm>
           <a:prstGeom prst="rect">
             <a:avLst/>
@@ -3800,7 +4175,13 @@
       </p:grpSpPr>
       <p:sp>
         <p:nvSpPr>
-          <p:cNvPr id="2" name="Title 1"/>
+          <p:cNvPr id="2" name="Title 1">
+            <a:extLst>
+              <a:ext uri="{FF2B5EF4-FFF2-40B4-BE49-F238E27FC236}">
+                <a16:creationId xmlns:a16="http://schemas.microsoft.com/office/drawing/2014/main" id="{0D064A50-2A97-421C-813D-6449089693A0}"/>
+              </a:ext>
+            </a:extLst>
+          </p:cNvPr>
           <p:cNvSpPr>
             <a:spLocks noGrp="1"/>
           </p:cNvSpPr>
@@ -3833,7 +4214,13 @@
       </p:sp>
       <p:sp>
         <p:nvSpPr>
-          <p:cNvPr id="3" name="Content Placeholder 2"/>
+          <p:cNvPr id="3" name="Content Placeholder 2">
+            <a:extLst>
+              <a:ext uri="{FF2B5EF4-FFF2-40B4-BE49-F238E27FC236}">
+                <a16:creationId xmlns:a16="http://schemas.microsoft.com/office/drawing/2014/main" id="{C0E34547-063B-468C-B841-DB8C0206424E}"/>
+              </a:ext>
+            </a:extLst>
+          </p:cNvPr>
           <p:cNvSpPr>
             <a:spLocks noGrp="1"/>
           </p:cNvSpPr>
@@ -3934,7 +4321,13 @@
       </p:grpSpPr>
       <p:sp>
         <p:nvSpPr>
-          <p:cNvPr id="2" name="Title 1"/>
+          <p:cNvPr id="2" name="Title 1">
+            <a:extLst>
+              <a:ext uri="{FF2B5EF4-FFF2-40B4-BE49-F238E27FC236}">
+                <a16:creationId xmlns:a16="http://schemas.microsoft.com/office/drawing/2014/main" id="{0D064A50-2A97-421C-813D-6449089693A0}"/>
+              </a:ext>
+            </a:extLst>
+          </p:cNvPr>
           <p:cNvSpPr>
             <a:spLocks noGrp="1"/>
           </p:cNvSpPr>
@@ -3959,7 +4352,13 @@
       </p:sp>
       <p:sp>
         <p:nvSpPr>
-          <p:cNvPr id="3" name="Content Placeholder 2"/>
+          <p:cNvPr id="3" name="Content Placeholder 2">
+            <a:extLst>
+              <a:ext uri="{FF2B5EF4-FFF2-40B4-BE49-F238E27FC236}">
+                <a16:creationId xmlns:a16="http://schemas.microsoft.com/office/drawing/2014/main" id="{C0E34547-063B-468C-B841-DB8C0206424E}"/>
+              </a:ext>
+            </a:extLst>
+          </p:cNvPr>
           <p:cNvSpPr>
             <a:spLocks noGrp="1"/>
           </p:cNvSpPr>
@@ -4039,7 +4438,13 @@
       </p:grpSpPr>
       <p:sp>
         <p:nvSpPr>
-          <p:cNvPr id="2" name="Title 1"/>
+          <p:cNvPr id="2" name="Title 1">
+            <a:extLst>
+              <a:ext uri="{FF2B5EF4-FFF2-40B4-BE49-F238E27FC236}">
+                <a16:creationId xmlns:a16="http://schemas.microsoft.com/office/drawing/2014/main" id="{0D064A50-2A97-421C-813D-6449089693A0}"/>
+              </a:ext>
+            </a:extLst>
+          </p:cNvPr>
           <p:cNvSpPr>
             <a:spLocks noGrp="1"/>
           </p:cNvSpPr>
@@ -4174,8 +4579,8 @@
         </p:blipFill>
         <p:spPr bwMode="auto">
           <a:xfrm>
-            <a:off x="457200" y="1803400"/>
-            <a:ext cx="8229600" cy="4114800"/>
+            <a:off x="1752600" y="1816100"/>
+            <a:ext cx="8686800" cy="4343400"/>
           </a:xfrm>
           <a:prstGeom prst="rect">
             <a:avLst/>
@@ -4212,7 +4617,13 @@
       </p:grpSpPr>
       <p:sp>
         <p:nvSpPr>
-          <p:cNvPr id="2" name="Title 1"/>
+          <p:cNvPr id="2" name="Title 1">
+            <a:extLst>
+              <a:ext uri="{FF2B5EF4-FFF2-40B4-BE49-F238E27FC236}">
+                <a16:creationId xmlns:a16="http://schemas.microsoft.com/office/drawing/2014/main" id="{0D064A50-2A97-421C-813D-6449089693A0}"/>
+              </a:ext>
+            </a:extLst>
+          </p:cNvPr>
           <p:cNvSpPr>
             <a:spLocks noGrp="1"/>
           </p:cNvSpPr>
@@ -4323,8 +4734,8 @@
         </p:blipFill>
         <p:spPr bwMode="auto">
           <a:xfrm>
-            <a:off x="457200" y="1803400"/>
-            <a:ext cx="8229600" cy="4114800"/>
+            <a:off x="1752600" y="1816100"/>
+            <a:ext cx="8686800" cy="4343400"/>
           </a:xfrm>
           <a:prstGeom prst="rect">
             <a:avLst/>
@@ -4361,7 +4772,13 @@
       </p:grpSpPr>
       <p:sp>
         <p:nvSpPr>
-          <p:cNvPr id="2" name="Title 1"/>
+          <p:cNvPr id="2" name="Title 1">
+            <a:extLst>
+              <a:ext uri="{FF2B5EF4-FFF2-40B4-BE49-F238E27FC236}">
+                <a16:creationId xmlns:a16="http://schemas.microsoft.com/office/drawing/2014/main" id="{0D064A50-2A97-421C-813D-6449089693A0}"/>
+              </a:ext>
+            </a:extLst>
+          </p:cNvPr>
           <p:cNvSpPr>
             <a:spLocks noGrp="1"/>
           </p:cNvSpPr>
@@ -4472,8 +4889,8 @@
         </p:blipFill>
         <p:spPr bwMode="auto">
           <a:xfrm>
-            <a:off x="457200" y="1803400"/>
-            <a:ext cx="8229600" cy="4114800"/>
+            <a:off x="1752600" y="1816100"/>
+            <a:ext cx="8686800" cy="4343400"/>
           </a:xfrm>
           <a:prstGeom prst="rect">
             <a:avLst/>
@@ -4510,7 +4927,13 @@
       </p:grpSpPr>
       <p:sp>
         <p:nvSpPr>
-          <p:cNvPr id="2" name="Title 1"/>
+          <p:cNvPr id="2" name="Title 1">
+            <a:extLst>
+              <a:ext uri="{FF2B5EF4-FFF2-40B4-BE49-F238E27FC236}">
+                <a16:creationId xmlns:a16="http://schemas.microsoft.com/office/drawing/2014/main" id="{0D064A50-2A97-421C-813D-6449089693A0}"/>
+              </a:ext>
+            </a:extLst>
+          </p:cNvPr>
           <p:cNvSpPr>
             <a:spLocks noGrp="1"/>
           </p:cNvSpPr>
@@ -4581,8 +5004,8 @@
         </p:blipFill>
         <p:spPr bwMode="auto">
           <a:xfrm>
-            <a:off x="457200" y="1803400"/>
-            <a:ext cx="8229600" cy="4114800"/>
+            <a:off x="1752600" y="1816100"/>
+            <a:ext cx="8686800" cy="4343400"/>
           </a:xfrm>
           <a:prstGeom prst="rect">
             <a:avLst/>
@@ -4619,7 +5042,13 @@
       </p:grpSpPr>
       <p:sp>
         <p:nvSpPr>
-          <p:cNvPr id="2" name="Title 1"/>
+          <p:cNvPr id="2" name="Title 1">
+            <a:extLst>
+              <a:ext uri="{FF2B5EF4-FFF2-40B4-BE49-F238E27FC236}">
+                <a16:creationId xmlns:a16="http://schemas.microsoft.com/office/drawing/2014/main" id="{0D064A50-2A97-421C-813D-6449089693A0}"/>
+              </a:ext>
+            </a:extLst>
+          </p:cNvPr>
           <p:cNvSpPr>
             <a:spLocks noGrp="1"/>
           </p:cNvSpPr>
@@ -4714,8 +5143,8 @@
         </p:blipFill>
         <p:spPr bwMode="auto">
           <a:xfrm>
-            <a:off x="457200" y="1803400"/>
-            <a:ext cx="8229600" cy="4114800"/>
+            <a:off x="1752600" y="1816100"/>
+            <a:ext cx="8686800" cy="4343400"/>
           </a:xfrm>
           <a:prstGeom prst="rect">
             <a:avLst/>
@@ -4766,8 +5195,8 @@
         </p:blipFill>
         <p:spPr bwMode="auto">
           <a:xfrm>
-            <a:off x="457200" y="1803400"/>
-            <a:ext cx="8229600" cy="4114800"/>
+            <a:off x="1752600" y="1816100"/>
+            <a:ext cx="8686800" cy="4343400"/>
           </a:xfrm>
           <a:prstGeom prst="rect">
             <a:avLst/>
@@ -4796,52 +5225,52 @@
         <a:sysClr val="window" lastClr="FFFFFF"/>
       </a:lt1>
       <a:dk2>
-        <a:srgbClr val="1F497D"/>
+        <a:srgbClr val="44546A"/>
       </a:dk2>
       <a:lt2>
-        <a:srgbClr val="EEECE1"/>
+        <a:srgbClr val="E7E6E6"/>
       </a:lt2>
       <a:accent1>
-        <a:srgbClr val="4F81BD"/>
+        <a:srgbClr val="4472C4"/>
       </a:accent1>
       <a:accent2>
-        <a:srgbClr val="C0504D"/>
+        <a:srgbClr val="ED7D31"/>
       </a:accent2>
       <a:accent3>
-        <a:srgbClr val="9BBB59"/>
+        <a:srgbClr val="A5A5A5"/>
       </a:accent3>
       <a:accent4>
-        <a:srgbClr val="8064A2"/>
+        <a:srgbClr val="FFC000"/>
       </a:accent4>
       <a:accent5>
-        <a:srgbClr val="4BACC6"/>
+        <a:srgbClr val="5B9BD5"/>
       </a:accent5>
       <a:accent6>
-        <a:srgbClr val="F79646"/>
+        <a:srgbClr val="70AD47"/>
       </a:accent6>
       <a:hlink>
-        <a:srgbClr val="0000FF"/>
+        <a:srgbClr val="0563C1"/>
       </a:hlink>
       <a:folHlink>
-        <a:srgbClr val="800080"/>
+        <a:srgbClr val="954F72"/>
       </a:folHlink>
     </a:clrScheme>
-    <a:fontScheme name="Office">
+    <a:fontScheme name="Arial">
       <a:majorFont>
-        <a:latin typeface="Calibri"/>
+        <a:latin typeface="Arial" panose="020B0604020202020204"/>
         <a:ea typeface=""/>
         <a:cs typeface=""/>
         <a:font script="Jpan" typeface="ＭＳ Ｐゴシック"/>
-        <a:font script="Hang" typeface="맑은 고딕"/>
-        <a:font script="Hans" typeface="宋体"/>
-        <a:font script="Hant" typeface="新細明體"/>
-        <a:font script="Arab" typeface="Times New Roman"/>
-        <a:font script="Hebr" typeface="Times New Roman"/>
-        <a:font script="Thai" typeface="Angsana New"/>
+        <a:font script="Hang" typeface="굴림"/>
+        <a:font script="Hans" typeface="黑体"/>
+        <a:font script="Hant" typeface="微軟正黑體"/>
+        <a:font script="Arab" typeface="Arial"/>
+        <a:font script="Hebr" typeface="Arial"/>
+        <a:font script="Thai" typeface="Cordia New"/>
         <a:font script="Ethi" typeface="Nyala"/>
         <a:font script="Beng" typeface="Vrinda"/>
         <a:font script="Gujr" typeface="Shruti"/>
-        <a:font script="Khmr" typeface="MoolBoran"/>
+        <a:font script="Khmr" typeface="DaunPenh"/>
         <a:font script="Knda" typeface="Tunga"/>
         <a:font script="Guru" typeface="Raavi"/>
         <a:font script="Cans" typeface="Euphemia"/>
@@ -4858,18 +5287,18 @@
         <a:font script="Laoo" typeface="DokChampa"/>
         <a:font script="Sinh" typeface="Iskoola Pota"/>
         <a:font script="Mong" typeface="Mongolian Baiti"/>
-        <a:font script="Viet" typeface="Times New Roman"/>
+        <a:font script="Viet" typeface="Arial"/>
         <a:font script="Uigh" typeface="Microsoft Uighur"/>
         <a:font script="Geor" typeface="Sylfaen"/>
       </a:majorFont>
       <a:minorFont>
-        <a:latin typeface="Calibri"/>
+        <a:latin typeface="Arial" panose="020B0604020202020204"/>
         <a:ea typeface=""/>
         <a:cs typeface=""/>
         <a:font script="Jpan" typeface="ＭＳ Ｐゴシック"/>
-        <a:font script="Hang" typeface="맑은 고딕"/>
-        <a:font script="Hans" typeface="宋体"/>
-        <a:font script="Hant" typeface="新細明體"/>
+        <a:font script="Hang" typeface="굴림"/>
+        <a:font script="Hans" typeface="黑体"/>
+        <a:font script="Hant" typeface="微軟正黑體"/>
         <a:font script="Arab" typeface="Arial"/>
         <a:font script="Hebr" typeface="Arial"/>
         <a:font script="Thai" typeface="Cordia New"/>
@@ -4907,200 +5336,141 @@
           <a:gsLst>
             <a:gs pos="0">
               <a:schemeClr val="phClr">
-                <a:tint val="50000"/>
-                <a:satMod val="300000"/>
+                <a:lumMod val="110000"/>
+                <a:satMod val="105000"/>
+                <a:tint val="67000"/>
               </a:schemeClr>
             </a:gs>
-            <a:gs pos="35000">
+            <a:gs pos="50000">
               <a:schemeClr val="phClr">
-                <a:tint val="37000"/>
-                <a:satMod val="300000"/>
+                <a:lumMod val="105000"/>
+                <a:satMod val="103000"/>
+                <a:tint val="73000"/>
               </a:schemeClr>
             </a:gs>
             <a:gs pos="100000">
               <a:schemeClr val="phClr">
-                <a:tint val="15000"/>
-                <a:satMod val="350000"/>
+                <a:lumMod val="105000"/>
+                <a:satMod val="109000"/>
+                <a:tint val="81000"/>
               </a:schemeClr>
             </a:gs>
           </a:gsLst>
-          <a:lin ang="16200000" scaled="1"/>
+          <a:lin ang="5400000" scaled="0"/>
         </a:gradFill>
         <a:gradFill rotWithShape="1">
           <a:gsLst>
             <a:gs pos="0">
               <a:schemeClr val="phClr">
-                <a:tint val="100000"/>
+                <a:satMod val="103000"/>
+                <a:lumMod val="102000"/>
+                <a:tint val="94000"/>
+              </a:schemeClr>
+            </a:gs>
+            <a:gs pos="50000">
+              <a:schemeClr val="phClr">
+                <a:satMod val="110000"/>
+                <a:lumMod val="100000"/>
                 <a:shade val="100000"/>
-                <a:satMod val="130000"/>
               </a:schemeClr>
             </a:gs>
             <a:gs pos="100000">
               <a:schemeClr val="phClr">
-                <a:tint val="50000"/>
-                <a:shade val="100000"/>
-                <a:satMod val="350000"/>
+                <a:lumMod val="99000"/>
+                <a:satMod val="120000"/>
+                <a:shade val="78000"/>
               </a:schemeClr>
             </a:gs>
           </a:gsLst>
-          <a:lin ang="16200000" scaled="0"/>
+          <a:lin ang="5400000" scaled="0"/>
         </a:gradFill>
       </a:fillStyleLst>
       <a:lnStyleLst>
-        <a:ln w="9525" cap="flat" cmpd="sng" algn="ctr">
-          <a:solidFill>
-            <a:schemeClr val="phClr">
-              <a:shade val="95000"/>
-              <a:satMod val="105000"/>
-            </a:schemeClr>
-          </a:solidFill>
-          <a:prstDash val="solid"/>
-        </a:ln>
-        <a:ln w="25400" cap="flat" cmpd="sng" algn="ctr">
+        <a:ln w="6350" cap="flat" cmpd="sng" algn="ctr">
           <a:solidFill>
             <a:schemeClr val="phClr"/>
           </a:solidFill>
           <a:prstDash val="solid"/>
+          <a:miter lim="800000"/>
         </a:ln>
-        <a:ln w="38100" cap="flat" cmpd="sng" algn="ctr">
+        <a:ln w="12700" cap="flat" cmpd="sng" algn="ctr">
           <a:solidFill>
             <a:schemeClr val="phClr"/>
           </a:solidFill>
           <a:prstDash val="solid"/>
+          <a:miter lim="800000"/>
+        </a:ln>
+        <a:ln w="19050" cap="flat" cmpd="sng" algn="ctr">
+          <a:solidFill>
+            <a:schemeClr val="phClr"/>
+          </a:solidFill>
+          <a:prstDash val="solid"/>
+          <a:miter lim="800000"/>
         </a:ln>
       </a:lnStyleLst>
       <a:effectStyleLst>
         <a:effectStyle>
+          <a:effectLst/>
+        </a:effectStyle>
+        <a:effectStyle>
+          <a:effectLst/>
+        </a:effectStyle>
+        <a:effectStyle>
           <a:effectLst>
-            <a:outerShdw blurRad="40000" dist="20000" dir="5400000" rotWithShape="0">
+            <a:outerShdw blurRad="57150" dist="19050" dir="5400000" algn="ctr" rotWithShape="0">
               <a:srgbClr val="000000">
-                <a:alpha val="38000"/>
+                <a:alpha val="63000"/>
               </a:srgbClr>
             </a:outerShdw>
           </a:effectLst>
-        </a:effectStyle>
-        <a:effectStyle>
-          <a:effectLst>
-            <a:outerShdw blurRad="40000" dist="23000" dir="5400000" rotWithShape="0">
-              <a:srgbClr val="000000">
-                <a:alpha val="35000"/>
-              </a:srgbClr>
-            </a:outerShdw>
-          </a:effectLst>
-        </a:effectStyle>
-        <a:effectStyle>
-          <a:effectLst>
-            <a:outerShdw blurRad="40000" dist="23000" dir="5400000" rotWithShape="0">
-              <a:srgbClr val="000000">
-                <a:alpha val="35000"/>
-              </a:srgbClr>
-            </a:outerShdw>
-          </a:effectLst>
-          <a:scene3d>
-            <a:camera prst="orthographicFront">
-              <a:rot lat="0" lon="0" rev="0"/>
-            </a:camera>
-            <a:lightRig rig="threePt" dir="t">
-              <a:rot lat="0" lon="0" rev="1200000"/>
-            </a:lightRig>
-          </a:scene3d>
-          <a:sp3d>
-            <a:bevelT w="63500" h="25400"/>
-          </a:sp3d>
         </a:effectStyle>
       </a:effectStyleLst>
       <a:bgFillStyleLst>
         <a:solidFill>
           <a:schemeClr val="phClr"/>
         </a:solidFill>
+        <a:solidFill>
+          <a:schemeClr val="phClr">
+            <a:tint val="95000"/>
+            <a:satMod val="170000"/>
+          </a:schemeClr>
+        </a:solidFill>
         <a:gradFill rotWithShape="1">
           <a:gsLst>
             <a:gs pos="0">
               <a:schemeClr val="phClr">
-                <a:tint val="40000"/>
-                <a:satMod val="350000"/>
+                <a:tint val="93000"/>
+                <a:satMod val="150000"/>
+                <a:shade val="98000"/>
+                <a:lumMod val="102000"/>
               </a:schemeClr>
             </a:gs>
-            <a:gs pos="40000">
+            <a:gs pos="50000">
               <a:schemeClr val="phClr">
-                <a:tint val="45000"/>
-                <a:shade val="99000"/>
-                <a:satMod val="350000"/>
+                <a:tint val="98000"/>
+                <a:satMod val="130000"/>
+                <a:shade val="90000"/>
+                <a:lumMod val="103000"/>
               </a:schemeClr>
             </a:gs>
             <a:gs pos="100000">
               <a:schemeClr val="phClr">
-                <a:shade val="20000"/>
-                <a:satMod val="255000"/>
+                <a:shade val="63000"/>
+                <a:satMod val="120000"/>
               </a:schemeClr>
             </a:gs>
           </a:gsLst>
-          <a:path path="circle">
-            <a:fillToRect l="50000" t="-80000" r="50000" b="180000"/>
-          </a:path>
-        </a:gradFill>
-        <a:gradFill rotWithShape="1">
-          <a:gsLst>
-            <a:gs pos="0">
-              <a:schemeClr val="phClr">
-                <a:tint val="80000"/>
-                <a:satMod val="300000"/>
-              </a:schemeClr>
-            </a:gs>
-            <a:gs pos="100000">
-              <a:schemeClr val="phClr">
-                <a:shade val="30000"/>
-                <a:satMod val="200000"/>
-              </a:schemeClr>
-            </a:gs>
-          </a:gsLst>
-          <a:path path="circle">
-            <a:fillToRect l="50000" t="50000" r="50000" b="50000"/>
-          </a:path>
+          <a:lin ang="5400000" scaled="0"/>
         </a:gradFill>
       </a:bgFillStyleLst>
     </a:fmtScheme>
   </a:themeElements>
-  <a:objectDefaults>
-    <a:spDef>
-      <a:spPr/>
-      <a:bodyPr/>
-      <a:lstStyle/>
-      <a:style>
-        <a:lnRef idx="1">
-          <a:schemeClr val="accent1"/>
-        </a:lnRef>
-        <a:fillRef idx="3">
-          <a:schemeClr val="accent1"/>
-        </a:fillRef>
-        <a:effectRef idx="2">
-          <a:schemeClr val="accent1"/>
-        </a:effectRef>
-        <a:fontRef idx="minor">
-          <a:schemeClr val="lt1"/>
-        </a:fontRef>
-      </a:style>
-    </a:spDef>
-    <a:lnDef>
-      <a:spPr/>
-      <a:bodyPr/>
-      <a:lstStyle/>
-      <a:style>
-        <a:lnRef idx="2">
-          <a:schemeClr val="accent1"/>
-        </a:lnRef>
-        <a:fillRef idx="0">
-          <a:schemeClr val="accent1"/>
-        </a:fillRef>
-        <a:effectRef idx="1">
-          <a:schemeClr val="accent1"/>
-        </a:effectRef>
-        <a:fontRef idx="minor">
-          <a:schemeClr val="tx1"/>
-        </a:fontRef>
-      </a:style>
-    </a:lnDef>
-  </a:objectDefaults>
+  <a:objectDefaults/>
   <a:extraClrSchemeLst/>
+  <a:extLst>
+    <a:ext uri="{05A4C25C-085E-4340-85A3-A5531E510DB2}">
+      <thm15:themeFamily xmlns:thm15="http://schemas.microsoft.com/office/thememl/2012/main" name="Office Theme" id="{62F939B6-93AF-4DB8-9C6B-D6C7DFDC589F}" vid="{4A3C46E8-61CC-4603-A589-7422A47A8E4A}"/>
+    </a:ext>
+  </a:extLst>
 </a:theme>
 </file>
</xml_diff>

<commit_message>
blah these household types are killing me
</commit_message>
<xml_diff>
--- a/create_powerpoint/demographic_estimates.pptx
+++ b/create_powerpoint/demographic_estimates.pptx
@@ -3927,12 +3927,68 @@
               <a:rPr/>
               <a:t>Gender</a:t>
             </a:r>
+            <a:r>
+              <a:rPr/>
+              <a:t> </a:t>
+            </a:r>
+            <a:r>
+              <a:rPr/>
+              <a:t>Distribution</a:t>
+            </a:r>
+            <a:r>
+              <a:rPr/>
+              <a:t> </a:t>
+            </a:r>
+            <a:r>
+              <a:rPr/>
+              <a:t>of</a:t>
+            </a:r>
+            <a:r>
+              <a:rPr/>
+              <a:t> </a:t>
+            </a:r>
+            <a:r>
+              <a:rPr/>
+              <a:t>Opportunity</a:t>
+            </a:r>
+            <a:r>
+              <a:rPr/>
+              <a:t> </a:t>
+            </a:r>
+            <a:r>
+              <a:rPr/>
+              <a:t>Youth</a:t>
+            </a:r>
+            <a:r>
+              <a:rPr/>
+              <a:t> </a:t>
+            </a:r>
+            <a:r>
+              <a:rPr/>
+              <a:t>and</a:t>
+            </a:r>
+            <a:r>
+              <a:rPr/>
+              <a:t> </a:t>
+            </a:r>
+            <a:r>
+              <a:rPr/>
+              <a:t>Connected</a:t>
+            </a:r>
+            <a:r>
+              <a:rPr/>
+              <a:t> </a:t>
+            </a:r>
+            <a:r>
+              <a:rPr/>
+              <a:t>Youth</a:t>
+            </a:r>
           </a:p>
         </p:txBody>
       </p:sp>
       <p:pic>
         <p:nvPicPr>
-          <p:cNvPr descr="demographic_estimates_files/figure-pptx/unnamed-chunk-8-1.png" id="0" name="Picture 1"/>
+          <p:cNvPr descr="demographic_estimates_files/figure-pptx/unnamed-chunk-7-1.png" id="0" name="Picture 1"/>
           <p:cNvPicPr>
             <a:picLocks noGrp="1" noChangeAspect="1"/>
           </p:cNvPicPr>
@@ -3984,7 +4040,7 @@
       </p:grpSpPr>
       <p:pic>
         <p:nvPicPr>
-          <p:cNvPr descr="demographic_estimates_files/figure-pptx/unnamed-chunk-9-1.png" id="0" name="Picture 1"/>
+          <p:cNvPr descr="demographic_estimates_files/figure-pptx/unnamed-chunk-8-1.png" id="0" name="Picture 1"/>
           <p:cNvPicPr>
             <a:picLocks noGrp="1" noChangeAspect="1"/>
           </p:cNvPicPr>
@@ -4123,7 +4179,7 @@
       </p:sp>
       <p:pic>
         <p:nvPicPr>
-          <p:cNvPr descr="demographic_estimates_files/figure-pptx/unnamed-chunk-11-1.png" id="0" name="Picture 1"/>
+          <p:cNvPr descr="demographic_estimates_files/figure-pptx/unnamed-chunk-10-1.png" id="0" name="Picture 1"/>
           <p:cNvPicPr>
             <a:picLocks noGrp="1" noChangeAspect="1"/>
           </p:cNvPicPr>

</xml_diff>

<commit_message>
modifications to the demographics markdown to change puma population to percentages of OY that live there instead of total population counts
</commit_message>
<xml_diff>
--- a/create_powerpoint/demographic_estimates.pptx
+++ b/create_powerpoint/demographic_estimates.pptx
@@ -18,7 +18,6 @@
     <p:sldId id="266" r:id="rId12"/>
     <p:sldId id="267" r:id="rId13"/>
     <p:sldId id="268" r:id="rId14"/>
-    <p:sldId id="269" r:id="rId15"/>
   </p:sldIdLst>
   <p:sldSz cx="12192000" cy="6858000"/>
   <p:notesSz cx="6858000" cy="9144000"/>
@@ -3818,15 +3817,71 @@
             </a:pPr>
             <a:r>
               <a:rPr/>
-              <a:t>Educational</a:t>
-            </a:r>
-            <a:r>
-              <a:rPr/>
-              <a:t> </a:t>
-            </a:r>
-            <a:r>
-              <a:rPr/>
-              <a:t>Attainment</a:t>
+              <a:t>Half</a:t>
+            </a:r>
+            <a:r>
+              <a:rPr/>
+              <a:t> </a:t>
+            </a:r>
+            <a:r>
+              <a:rPr/>
+              <a:t>of</a:t>
+            </a:r>
+            <a:r>
+              <a:rPr/>
+              <a:t> </a:t>
+            </a:r>
+            <a:r>
+              <a:rPr/>
+              <a:t>Opportunity</a:t>
+            </a:r>
+            <a:r>
+              <a:rPr/>
+              <a:t> </a:t>
+            </a:r>
+            <a:r>
+              <a:rPr/>
+              <a:t>Youth</a:t>
+            </a:r>
+            <a:r>
+              <a:rPr/>
+              <a:t> </a:t>
+            </a:r>
+            <a:r>
+              <a:rPr/>
+              <a:t>have</a:t>
+            </a:r>
+            <a:r>
+              <a:rPr/>
+              <a:t> </a:t>
+            </a:r>
+            <a:r>
+              <a:rPr/>
+              <a:t>graduated</a:t>
+            </a:r>
+            <a:r>
+              <a:rPr/>
+              <a:t> </a:t>
+            </a:r>
+            <a:r>
+              <a:rPr/>
+              <a:t>from</a:t>
+            </a:r>
+            <a:r>
+              <a:rPr/>
+              <a:t> </a:t>
+            </a:r>
+            <a:r>
+              <a:rPr/>
+              <a:t>high</a:t>
+            </a:r>
+            <a:r>
+              <a:rPr/>
+              <a:t> </a:t>
+            </a:r>
+            <a:r>
+              <a:rPr/>
+              <a:t>school</a:t>
             </a:r>
           </a:p>
         </p:txBody>
@@ -3909,39 +3964,7 @@
             </a:pPr>
             <a:r>
               <a:rPr/>
-              <a:t>Race</a:t>
-            </a:r>
-            <a:r>
-              <a:rPr/>
-              <a:t> </a:t>
-            </a:r>
-            <a:r>
-              <a:rPr/>
-              <a:t>&amp;</a:t>
-            </a:r>
-            <a:r>
-              <a:rPr/>
-              <a:t> </a:t>
-            </a:r>
-            <a:r>
-              <a:rPr/>
-              <a:t>Gender</a:t>
-            </a:r>
-            <a:r>
-              <a:rPr/>
-              <a:t> </a:t>
-            </a:r>
-            <a:r>
-              <a:rPr/>
-              <a:t>Distribution</a:t>
-            </a:r>
-            <a:r>
-              <a:rPr/>
-              <a:t> </a:t>
-            </a:r>
-            <a:r>
-              <a:rPr/>
-              <a:t>of</a:t>
+              <a:t>Most</a:t>
             </a:r>
             <a:r>
               <a:rPr/>
@@ -3965,23 +3988,55 @@
             </a:r>
             <a:r>
               <a:rPr/>
-              <a:t>and</a:t>
-            </a:r>
-            <a:r>
-              <a:rPr/>
-              <a:t> </a:t>
-            </a:r>
-            <a:r>
-              <a:rPr/>
-              <a:t>Connected</a:t>
-            </a:r>
-            <a:r>
-              <a:rPr/>
-              <a:t> </a:t>
-            </a:r>
-            <a:r>
-              <a:rPr/>
-              <a:t>Youth</a:t>
+              <a:t>across</a:t>
+            </a:r>
+            <a:r>
+              <a:rPr/>
+              <a:t> </a:t>
+            </a:r>
+            <a:r>
+              <a:rPr/>
+              <a:t>nearly</a:t>
+            </a:r>
+            <a:r>
+              <a:rPr/>
+              <a:t> </a:t>
+            </a:r>
+            <a:r>
+              <a:rPr/>
+              <a:t>all</a:t>
+            </a:r>
+            <a:r>
+              <a:rPr/>
+              <a:t> </a:t>
+            </a:r>
+            <a:r>
+              <a:rPr/>
+              <a:t>races</a:t>
+            </a:r>
+            <a:r>
+              <a:rPr/>
+              <a:t> </a:t>
+            </a:r>
+            <a:r>
+              <a:rPr/>
+              <a:t>identify</a:t>
+            </a:r>
+            <a:r>
+              <a:rPr/>
+              <a:t> </a:t>
+            </a:r>
+            <a:r>
+              <a:rPr/>
+              <a:t>as</a:t>
+            </a:r>
+            <a:r>
+              <a:rPr/>
+              <a:t> </a:t>
+            </a:r>
+            <a:r>
+              <a:rPr/>
+              <a:t>male</a:t>
             </a:r>
           </a:p>
         </p:txBody>
@@ -4038,148 +4093,120 @@
           <a:chExt cx="0" cy="0"/>
         </a:xfrm>
       </p:grpSpPr>
+      <p:sp>
+        <p:nvSpPr>
+          <p:cNvPr id="2" name="Title 1">
+            <a:extLst>
+              <a:ext uri="{FF2B5EF4-FFF2-40B4-BE49-F238E27FC236}">
+                <a16:creationId xmlns:a16="http://schemas.microsoft.com/office/drawing/2014/main" id="{0D064A50-2A97-421C-813D-6449089693A0}"/>
+              </a:ext>
+            </a:extLst>
+          </p:cNvPr>
+          <p:cNvSpPr>
+            <a:spLocks noGrp="1"/>
+          </p:cNvSpPr>
+          <p:nvPr>
+            <p:ph type="title"/>
+          </p:nvPr>
+        </p:nvSpPr>
+        <p:spPr/>
+        <p:txBody>
+          <a:bodyPr/>
+          <a:lstStyle/>
+          <a:p>
+            <a:pPr lvl="0" marL="0" indent="0">
+              <a:buNone/>
+            </a:pPr>
+            <a:r>
+              <a:rPr/>
+              <a:t>Opportunity</a:t>
+            </a:r>
+            <a:r>
+              <a:rPr/>
+              <a:t> </a:t>
+            </a:r>
+            <a:r>
+              <a:rPr/>
+              <a:t>Youth</a:t>
+            </a:r>
+            <a:r>
+              <a:rPr/>
+              <a:t> </a:t>
+            </a:r>
+            <a:r>
+              <a:rPr/>
+              <a:t>are</a:t>
+            </a:r>
+            <a:r>
+              <a:rPr/>
+              <a:t> </a:t>
+            </a:r>
+            <a:r>
+              <a:rPr/>
+              <a:t>concentrated</a:t>
+            </a:r>
+            <a:r>
+              <a:rPr/>
+              <a:t> </a:t>
+            </a:r>
+            <a:r>
+              <a:rPr/>
+              <a:t>on</a:t>
+            </a:r>
+            <a:r>
+              <a:rPr/>
+              <a:t> </a:t>
+            </a:r>
+            <a:r>
+              <a:rPr/>
+              <a:t>South</a:t>
+            </a:r>
+            <a:r>
+              <a:rPr/>
+              <a:t> </a:t>
+            </a:r>
+            <a:r>
+              <a:rPr/>
+              <a:t>Side</a:t>
+            </a:r>
+            <a:r>
+              <a:rPr/>
+              <a:t> </a:t>
+            </a:r>
+            <a:r>
+              <a:rPr/>
+              <a:t>and</a:t>
+            </a:r>
+            <a:r>
+              <a:rPr/>
+              <a:t> </a:t>
+            </a:r>
+            <a:r>
+              <a:rPr/>
+              <a:t>West</a:t>
+            </a:r>
+            <a:r>
+              <a:rPr/>
+              <a:t> </a:t>
+            </a:r>
+            <a:r>
+              <a:rPr/>
+              <a:t>Side</a:t>
+            </a:r>
+            <a:r>
+              <a:rPr/>
+              <a:t> </a:t>
+            </a:r>
+            <a:r>
+              <a:rPr/>
+              <a:t>Chicago</a:t>
+            </a:r>
+          </a:p>
+        </p:txBody>
+      </p:sp>
       <p:pic>
         <p:nvPicPr>
-          <p:cNvPr descr="demographic_estimates_files/figure-pptx/unnamed-chunk-8-1.png" id="0" name="Picture 1"/>
-          <p:cNvPicPr>
-            <a:picLocks noGrp="1" noChangeAspect="1"/>
-          </p:cNvPicPr>
-          <p:nvPr/>
-        </p:nvPicPr>
-        <p:blipFill>
-          <a:blip r:embed="rId2"/>
-          <a:stretch>
-            <a:fillRect/>
-          </a:stretch>
-        </p:blipFill>
-        <p:spPr bwMode="auto">
-          <a:xfrm>
-            <a:off x="1752600" y="1816100"/>
-            <a:ext cx="8686800" cy="4343400"/>
-          </a:xfrm>
-          <a:prstGeom prst="rect">
-            <a:avLst/>
-          </a:prstGeom>
-          <a:noFill/>
-          <a:ln w="9525">
-            <a:noFill/>
-            <a:headEnd/>
-            <a:tailEnd/>
-          </a:ln>
-        </p:spPr>
-      </p:pic>
-    </p:spTree>
-  </p:cSld>
-</p:sld>
-</file>
-
-<file path=ppt/slides/slide14.xml><?xml version="1.0" encoding="utf-8"?>
-<p:sld xmlns:a="http://schemas.openxmlformats.org/drawingml/2006/main" xmlns:r="http://schemas.openxmlformats.org/officeDocument/2006/relationships" xmlns:p="http://schemas.openxmlformats.org/presentationml/2006/main">
-  <p:cSld>
-    <p:spTree>
-      <p:nvGrpSpPr>
-        <p:cNvPr id="1" name=""/>
-        <p:cNvGrpSpPr/>
-        <p:nvPr/>
-      </p:nvGrpSpPr>
-      <p:grpSpPr>
-        <a:xfrm>
-          <a:off x="0" y="0"/>
-          <a:ext cx="0" cy="0"/>
-          <a:chOff x="0" y="0"/>
-          <a:chExt cx="0" cy="0"/>
-        </a:xfrm>
-      </p:grpSpPr>
-      <p:sp>
-        <p:nvSpPr>
-          <p:cNvPr id="2" name="Title 1">
-            <a:extLst>
-              <a:ext uri="{FF2B5EF4-FFF2-40B4-BE49-F238E27FC236}">
-                <a16:creationId xmlns:a16="http://schemas.microsoft.com/office/drawing/2014/main" id="{0D064A50-2A97-421C-813D-6449089693A0}"/>
-              </a:ext>
-            </a:extLst>
-          </p:cNvPr>
-          <p:cNvSpPr>
-            <a:spLocks noGrp="1"/>
-          </p:cNvSpPr>
-          <p:nvPr>
-            <p:ph type="title"/>
-          </p:nvPr>
-        </p:nvSpPr>
-        <p:spPr/>
-        <p:txBody>
-          <a:bodyPr/>
-          <a:lstStyle/>
-          <a:p>
-            <a:pPr lvl="0" marL="0" indent="0">
-              <a:buNone/>
-            </a:pPr>
-            <a:r>
-              <a:rPr/>
-              <a:t>Population</a:t>
-            </a:r>
-            <a:r>
-              <a:rPr/>
-              <a:t> </a:t>
-            </a:r>
-            <a:r>
-              <a:rPr/>
-              <a:t>by</a:t>
-            </a:r>
-            <a:r>
-              <a:rPr/>
-              <a:t> </a:t>
-            </a:r>
-            <a:r>
-              <a:rPr/>
-              <a:t>PUMA</a:t>
-            </a:r>
-            <a:r>
-              <a:rPr/>
-              <a:t> </a:t>
-            </a:r>
-            <a:r>
-              <a:rPr/>
-              <a:t>with</a:t>
-            </a:r>
-            <a:r>
-              <a:rPr/>
-              <a:t> </a:t>
-            </a:r>
-            <a:r>
-              <a:rPr/>
-              <a:t>City</a:t>
-            </a:r>
-            <a:r>
-              <a:rPr/>
-              <a:t> </a:t>
-            </a:r>
-            <a:r>
-              <a:rPr/>
-              <a:t>of</a:t>
-            </a:r>
-            <a:r>
-              <a:rPr/>
-              <a:t> </a:t>
-            </a:r>
-            <a:r>
-              <a:rPr/>
-              <a:t>Chicago</a:t>
-            </a:r>
-            <a:r>
-              <a:rPr/>
-              <a:t> </a:t>
-            </a:r>
-            <a:r>
-              <a:rPr/>
-              <a:t>Overlay</a:t>
-            </a:r>
-          </a:p>
-        </p:txBody>
-      </p:sp>
-      <p:pic>
-        <p:nvPicPr>
-          <p:cNvPr descr="demographic_estimates_files/figure-pptx/unnamed-chunk-10-1.png" id="0" name="Picture 1"/>
+          <p:cNvPr descr="demographic_estimates_files/figure-pptx/unnamed-chunk-9-1.png" id="0" name="Picture 1"/>
           <p:cNvPicPr>
             <a:picLocks noGrp="1" noChangeAspect="1"/>
           </p:cNvPicPr>
@@ -5235,6 +5262,101 @@
           <a:chExt cx="0" cy="0"/>
         </a:xfrm>
       </p:grpSpPr>
+      <p:sp>
+        <p:nvSpPr>
+          <p:cNvPr id="2" name="Title 1">
+            <a:extLst>
+              <a:ext uri="{FF2B5EF4-FFF2-40B4-BE49-F238E27FC236}">
+                <a16:creationId xmlns:a16="http://schemas.microsoft.com/office/drawing/2014/main" id="{0D064A50-2A97-421C-813D-6449089693A0}"/>
+              </a:ext>
+            </a:extLst>
+          </p:cNvPr>
+          <p:cNvSpPr>
+            <a:spLocks noGrp="1"/>
+          </p:cNvSpPr>
+          <p:nvPr>
+            <p:ph type="title"/>
+          </p:nvPr>
+        </p:nvSpPr>
+        <p:spPr/>
+        <p:txBody>
+          <a:bodyPr/>
+          <a:lstStyle/>
+          <a:p>
+            <a:pPr lvl="0" marL="0" indent="0">
+              <a:buNone/>
+            </a:pPr>
+            <a:r>
+              <a:rPr/>
+              <a:t>Nearly</a:t>
+            </a:r>
+            <a:r>
+              <a:rPr/>
+              <a:t> </a:t>
+            </a:r>
+            <a:r>
+              <a:rPr/>
+              <a:t>13%</a:t>
+            </a:r>
+            <a:r>
+              <a:rPr/>
+              <a:t> </a:t>
+            </a:r>
+            <a:r>
+              <a:rPr/>
+              <a:t>of</a:t>
+            </a:r>
+            <a:r>
+              <a:rPr/>
+              <a:t> </a:t>
+            </a:r>
+            <a:r>
+              <a:rPr/>
+              <a:t>Opportunity</a:t>
+            </a:r>
+            <a:r>
+              <a:rPr/>
+              <a:t> </a:t>
+            </a:r>
+            <a:r>
+              <a:rPr/>
+              <a:t>Youth</a:t>
+            </a:r>
+            <a:r>
+              <a:rPr/>
+              <a:t> </a:t>
+            </a:r>
+            <a:r>
+              <a:rPr/>
+              <a:t>report</a:t>
+            </a:r>
+            <a:r>
+              <a:rPr/>
+              <a:t> </a:t>
+            </a:r>
+            <a:r>
+              <a:rPr/>
+              <a:t>having</a:t>
+            </a:r>
+            <a:r>
+              <a:rPr/>
+              <a:t> </a:t>
+            </a:r>
+            <a:r>
+              <a:rPr/>
+              <a:t>a</a:t>
+            </a:r>
+            <a:r>
+              <a:rPr/>
+              <a:t> </a:t>
+            </a:r>
+            <a:r>
+              <a:rPr/>
+              <a:t>disability</a:t>
+            </a:r>
+          </a:p>
+        </p:txBody>
+      </p:sp>
       <p:pic>
         <p:nvPicPr>
           <p:cNvPr descr="demographic_estimates_files/figure-pptx/disability-1.png" id="0" name="Picture 1"/>

</xml_diff>

<commit_message>
creating regions from PUMAs
</commit_message>
<xml_diff>
--- a/create_powerpoint/demographic_estimates.pptx
+++ b/create_powerpoint/demographic_estimates.pptx
@@ -3609,15 +3609,15 @@
             </a:pPr>
             <a:r>
               <a:rPr/>
-              <a:t>October</a:t>
-            </a:r>
-            <a:r>
-              <a:rPr/>
-              <a:t> </a:t>
-            </a:r>
-            <a:r>
-              <a:rPr/>
-              <a:t>23,</a:t>
+              <a:t>November</a:t>
+            </a:r>
+            <a:r>
+              <a:rPr/>
+              <a:t> </a:t>
+            </a:r>
+            <a:r>
+              <a:rPr/>
+              <a:t>06,</a:t>
             </a:r>
             <a:r>
               <a:rPr/>

</xml_diff>

<commit_message>
updated graphs and stuff
</commit_message>
<xml_diff>
--- a/create_powerpoint/demographic_estimates.pptx
+++ b/create_powerpoint/demographic_estimates.pptx
@@ -18,6 +18,9 @@
     <p:sldId id="266" r:id="rId12"/>
     <p:sldId id="267" r:id="rId13"/>
     <p:sldId id="268" r:id="rId14"/>
+    <p:sldId id="269" r:id="rId15"/>
+    <p:sldId id="270" r:id="rId16"/>
+    <p:sldId id="271" r:id="rId17"/>
   </p:sldIdLst>
   <p:sldSz cx="12192000" cy="6858000"/>
   <p:notesSz cx="6858000" cy="9144000"/>
@@ -3617,7 +3620,7 @@
             </a:r>
             <a:r>
               <a:rPr/>
-              <a:t>06,</a:t>
+              <a:t>13,</a:t>
             </a:r>
             <a:r>
               <a:rPr/>
@@ -4207,6 +4210,351 @@
       <p:pic>
         <p:nvPicPr>
           <p:cNvPr descr="demographic_estimates_files/figure-pptx/unnamed-chunk-9-1.png" id="0" name="Picture 1"/>
+          <p:cNvPicPr>
+            <a:picLocks noGrp="1" noChangeAspect="1"/>
+          </p:cNvPicPr>
+          <p:nvPr/>
+        </p:nvPicPr>
+        <p:blipFill>
+          <a:blip r:embed="rId2"/>
+          <a:stretch>
+            <a:fillRect/>
+          </a:stretch>
+        </p:blipFill>
+        <p:spPr bwMode="auto">
+          <a:xfrm>
+            <a:off x="1752600" y="1816100"/>
+            <a:ext cx="8686800" cy="4343400"/>
+          </a:xfrm>
+          <a:prstGeom prst="rect">
+            <a:avLst/>
+          </a:prstGeom>
+          <a:noFill/>
+          <a:ln w="9525">
+            <a:noFill/>
+            <a:headEnd/>
+            <a:tailEnd/>
+          </a:ln>
+        </p:spPr>
+      </p:pic>
+    </p:spTree>
+  </p:cSld>
+</p:sld>
+</file>
+
+<file path=ppt/slides/slide14.xml><?xml version="1.0" encoding="utf-8"?>
+<p:sld xmlns:a="http://schemas.openxmlformats.org/drawingml/2006/main" xmlns:r="http://schemas.openxmlformats.org/officeDocument/2006/relationships" xmlns:p="http://schemas.openxmlformats.org/presentationml/2006/main">
+  <p:cSld>
+    <p:spTree>
+      <p:nvGrpSpPr>
+        <p:cNvPr id="1" name=""/>
+        <p:cNvGrpSpPr/>
+        <p:nvPr/>
+      </p:nvGrpSpPr>
+      <p:grpSpPr>
+        <a:xfrm>
+          <a:off x="0" y="0"/>
+          <a:ext cx="0" cy="0"/>
+          <a:chOff x="0" y="0"/>
+          <a:chExt cx="0" cy="0"/>
+        </a:xfrm>
+      </p:grpSpPr>
+      <p:sp>
+        <p:nvSpPr>
+          <p:cNvPr id="2" name="Title 1">
+            <a:extLst>
+              <a:ext uri="{FF2B5EF4-FFF2-40B4-BE49-F238E27FC236}">
+                <a16:creationId xmlns:a16="http://schemas.microsoft.com/office/drawing/2014/main" id="{0D064A50-2A97-421C-813D-6449089693A0}"/>
+              </a:ext>
+            </a:extLst>
+          </p:cNvPr>
+          <p:cNvSpPr>
+            <a:spLocks noGrp="1"/>
+          </p:cNvSpPr>
+          <p:nvPr>
+            <p:ph type="title"/>
+          </p:nvPr>
+        </p:nvSpPr>
+        <p:spPr/>
+        <p:txBody>
+          <a:bodyPr/>
+          <a:lstStyle/>
+          <a:p>
+            <a:pPr lvl="0" marL="0" indent="0">
+              <a:buNone/>
+            </a:pPr>
+            <a:r>
+              <a:rPr/>
+              <a:t>OY</a:t>
+            </a:r>
+            <a:r>
+              <a:rPr/>
+              <a:t> </a:t>
+            </a:r>
+            <a:r>
+              <a:rPr/>
+              <a:t>by</a:t>
+            </a:r>
+            <a:r>
+              <a:rPr/>
+              <a:t> </a:t>
+            </a:r>
+            <a:r>
+              <a:rPr/>
+              <a:t>PUMA</a:t>
+            </a:r>
+          </a:p>
+        </p:txBody>
+      </p:sp>
+      <p:pic>
+        <p:nvPicPr>
+          <p:cNvPr descr="demographic_estimates_files/figure-pptx/unnamed-chunk-10-1.png" id="0" name="Picture 1"/>
+          <p:cNvPicPr>
+            <a:picLocks noGrp="1" noChangeAspect="1"/>
+          </p:cNvPicPr>
+          <p:nvPr/>
+        </p:nvPicPr>
+        <p:blipFill>
+          <a:blip r:embed="rId2"/>
+          <a:stretch>
+            <a:fillRect/>
+          </a:stretch>
+        </p:blipFill>
+        <p:spPr bwMode="auto">
+          <a:xfrm>
+            <a:off x="1752600" y="1816100"/>
+            <a:ext cx="8686800" cy="4343400"/>
+          </a:xfrm>
+          <a:prstGeom prst="rect">
+            <a:avLst/>
+          </a:prstGeom>
+          <a:noFill/>
+          <a:ln w="9525">
+            <a:noFill/>
+            <a:headEnd/>
+            <a:tailEnd/>
+          </a:ln>
+        </p:spPr>
+      </p:pic>
+    </p:spTree>
+  </p:cSld>
+</p:sld>
+</file>
+
+<file path=ppt/slides/slide15.xml><?xml version="1.0" encoding="utf-8"?>
+<p:sld xmlns:a="http://schemas.openxmlformats.org/drawingml/2006/main" xmlns:r="http://schemas.openxmlformats.org/officeDocument/2006/relationships" xmlns:p="http://schemas.openxmlformats.org/presentationml/2006/main">
+  <p:cSld>
+    <p:spTree>
+      <p:nvGrpSpPr>
+        <p:cNvPr id="1" name=""/>
+        <p:cNvGrpSpPr/>
+        <p:nvPr/>
+      </p:nvGrpSpPr>
+      <p:grpSpPr>
+        <a:xfrm>
+          <a:off x="0" y="0"/>
+          <a:ext cx="0" cy="0"/>
+          <a:chOff x="0" y="0"/>
+          <a:chExt cx="0" cy="0"/>
+        </a:xfrm>
+      </p:grpSpPr>
+      <p:sp>
+        <p:nvSpPr>
+          <p:cNvPr id="2" name="Title 1">
+            <a:extLst>
+              <a:ext uri="{FF2B5EF4-FFF2-40B4-BE49-F238E27FC236}">
+                <a16:creationId xmlns:a16="http://schemas.microsoft.com/office/drawing/2014/main" id="{0D064A50-2A97-421C-813D-6449089693A0}"/>
+              </a:ext>
+            </a:extLst>
+          </p:cNvPr>
+          <p:cNvSpPr>
+            <a:spLocks noGrp="1"/>
+          </p:cNvSpPr>
+          <p:nvPr>
+            <p:ph type="title"/>
+          </p:nvPr>
+        </p:nvSpPr>
+        <p:spPr/>
+        <p:txBody>
+          <a:bodyPr/>
+          <a:lstStyle/>
+          <a:p>
+            <a:pPr lvl="0" marL="0" indent="0">
+              <a:buNone/>
+            </a:pPr>
+            <a:r>
+              <a:rPr/>
+              <a:t>Employment</a:t>
+            </a:r>
+            <a:r>
+              <a:rPr/>
+              <a:t> </a:t>
+            </a:r>
+            <a:r>
+              <a:rPr/>
+              <a:t>by</a:t>
+            </a:r>
+            <a:r>
+              <a:rPr/>
+              <a:t> </a:t>
+            </a:r>
+            <a:r>
+              <a:rPr/>
+              <a:t>PUMA:</a:t>
+            </a:r>
+            <a:r>
+              <a:rPr/>
+              <a:t> </a:t>
+            </a:r>
+            <a:r>
+              <a:rPr/>
+              <a:t>Connected</a:t>
+            </a:r>
+            <a:r>
+              <a:rPr/>
+              <a:t> </a:t>
+            </a:r>
+            <a:r>
+              <a:rPr/>
+              <a:t>Youth</a:t>
+            </a:r>
+          </a:p>
+        </p:txBody>
+      </p:sp>
+      <p:pic>
+        <p:nvPicPr>
+          <p:cNvPr descr="demographic_estimates_files/figure-pptx/unnamed-chunk-11-1.png" id="0" name="Picture 1"/>
+          <p:cNvPicPr>
+            <a:picLocks noGrp="1" noChangeAspect="1"/>
+          </p:cNvPicPr>
+          <p:nvPr/>
+        </p:nvPicPr>
+        <p:blipFill>
+          <a:blip r:embed="rId2"/>
+          <a:stretch>
+            <a:fillRect/>
+          </a:stretch>
+        </p:blipFill>
+        <p:spPr bwMode="auto">
+          <a:xfrm>
+            <a:off x="1752600" y="1816100"/>
+            <a:ext cx="8686800" cy="4343400"/>
+          </a:xfrm>
+          <a:prstGeom prst="rect">
+            <a:avLst/>
+          </a:prstGeom>
+          <a:noFill/>
+          <a:ln w="9525">
+            <a:noFill/>
+            <a:headEnd/>
+            <a:tailEnd/>
+          </a:ln>
+        </p:spPr>
+      </p:pic>
+    </p:spTree>
+  </p:cSld>
+</p:sld>
+</file>
+
+<file path=ppt/slides/slide16.xml><?xml version="1.0" encoding="utf-8"?>
+<p:sld xmlns:a="http://schemas.openxmlformats.org/drawingml/2006/main" xmlns:r="http://schemas.openxmlformats.org/officeDocument/2006/relationships" xmlns:p="http://schemas.openxmlformats.org/presentationml/2006/main">
+  <p:cSld>
+    <p:spTree>
+      <p:nvGrpSpPr>
+        <p:cNvPr id="1" name=""/>
+        <p:cNvGrpSpPr/>
+        <p:nvPr/>
+      </p:nvGrpSpPr>
+      <p:grpSpPr>
+        <a:xfrm>
+          <a:off x="0" y="0"/>
+          <a:ext cx="0" cy="0"/>
+          <a:chOff x="0" y="0"/>
+          <a:chExt cx="0" cy="0"/>
+        </a:xfrm>
+      </p:grpSpPr>
+      <p:sp>
+        <p:nvSpPr>
+          <p:cNvPr id="2" name="Title 1">
+            <a:extLst>
+              <a:ext uri="{FF2B5EF4-FFF2-40B4-BE49-F238E27FC236}">
+                <a16:creationId xmlns:a16="http://schemas.microsoft.com/office/drawing/2014/main" id="{0D064A50-2A97-421C-813D-6449089693A0}"/>
+              </a:ext>
+            </a:extLst>
+          </p:cNvPr>
+          <p:cNvSpPr>
+            <a:spLocks noGrp="1"/>
+          </p:cNvSpPr>
+          <p:nvPr>
+            <p:ph type="title"/>
+          </p:nvPr>
+        </p:nvSpPr>
+        <p:spPr/>
+        <p:txBody>
+          <a:bodyPr/>
+          <a:lstStyle/>
+          <a:p>
+            <a:pPr lvl="0" marL="0" indent="0">
+              <a:buNone/>
+            </a:pPr>
+            <a:r>
+              <a:rPr/>
+              <a:t>School</a:t>
+            </a:r>
+            <a:r>
+              <a:rPr/>
+              <a:t> </a:t>
+            </a:r>
+            <a:r>
+              <a:rPr/>
+              <a:t>Attendance</a:t>
+            </a:r>
+            <a:r>
+              <a:rPr/>
+              <a:t> </a:t>
+            </a:r>
+            <a:r>
+              <a:rPr/>
+              <a:t>for</a:t>
+            </a:r>
+            <a:r>
+              <a:rPr/>
+              <a:t> </a:t>
+            </a:r>
+            <a:r>
+              <a:rPr/>
+              <a:t>Connected</a:t>
+            </a:r>
+            <a:r>
+              <a:rPr/>
+              <a:t> </a:t>
+            </a:r>
+            <a:r>
+              <a:rPr/>
+              <a:t>Youth</a:t>
+            </a:r>
+            <a:r>
+              <a:rPr/>
+              <a:t> </a:t>
+            </a:r>
+            <a:r>
+              <a:rPr/>
+              <a:t>by</a:t>
+            </a:r>
+            <a:r>
+              <a:rPr/>
+              <a:t> </a:t>
+            </a:r>
+            <a:r>
+              <a:rPr/>
+              <a:t>PUMA</a:t>
+            </a:r>
+          </a:p>
+        </p:txBody>
+      </p:sp>
+      <p:pic>
+        <p:nvPicPr>
+          <p:cNvPr descr="demographic_estimates_files/figure-pptx/unnamed-chunk-12-1.png" id="0" name="Picture 1"/>
           <p:cNvPicPr>
             <a:picLocks noGrp="1" noChangeAspect="1"/>
           </p:cNvPicPr>

</xml_diff>

<commit_message>
added some estimates for internet access and updated figures
</commit_message>
<xml_diff>
--- a/create_powerpoint/demographic_estimates.pptx
+++ b/create_powerpoint/demographic_estimates.pptx
@@ -3620,7 +3620,7 @@
             </a:r>
             <a:r>
               <a:rPr/>
-              <a:t>13,</a:t>
+              <a:t>17,</a:t>
             </a:r>
             <a:r>
               <a:rPr/>
@@ -4308,7 +4308,7 @@
       </p:sp>
       <p:pic>
         <p:nvPicPr>
-          <p:cNvPr descr="demographic_estimates_files/figure-pptx/unnamed-chunk-10-1.png" id="0" name="Picture 1"/>
+          <p:cNvPr descr="demographic_estimates_files/figure-pptx/unnamed-chunk-11-1.png" id="0" name="Picture 1"/>
           <p:cNvPicPr>
             <a:picLocks noGrp="1" noChangeAspect="1"/>
           </p:cNvPicPr>
@@ -4384,46 +4384,78 @@
             </a:pPr>
             <a:r>
               <a:rPr/>
-              <a:t>Employment</a:t>
-            </a:r>
-            <a:r>
-              <a:rPr/>
-              <a:t> </a:t>
-            </a:r>
-            <a:r>
-              <a:rPr/>
-              <a:t>by</a:t>
-            </a:r>
-            <a:r>
-              <a:rPr/>
-              <a:t> </a:t>
-            </a:r>
-            <a:r>
-              <a:rPr/>
-              <a:t>PUMA:</a:t>
-            </a:r>
-            <a:r>
-              <a:rPr/>
-              <a:t> </a:t>
-            </a:r>
-            <a:r>
-              <a:rPr/>
-              <a:t>Connected</a:t>
-            </a:r>
-            <a:r>
-              <a:rPr/>
-              <a:t> </a:t>
-            </a:r>
-            <a:r>
-              <a:rPr/>
-              <a:t>Youth</a:t>
+              <a:t>Southside</a:t>
+            </a:r>
+            <a:r>
+              <a:rPr/>
+              <a:t> </a:t>
+            </a:r>
+            <a:r>
+              <a:rPr/>
+              <a:t>connected</a:t>
+            </a:r>
+            <a:r>
+              <a:rPr/>
+              <a:t> </a:t>
+            </a:r>
+            <a:r>
+              <a:rPr/>
+              <a:t>youth</a:t>
+            </a:r>
+            <a:r>
+              <a:rPr/>
+              <a:t> </a:t>
+            </a:r>
+            <a:r>
+              <a:rPr/>
+              <a:t>are</a:t>
+            </a:r>
+            <a:r>
+              <a:rPr/>
+              <a:t> </a:t>
+            </a:r>
+            <a:r>
+              <a:rPr/>
+              <a:t>less</a:t>
+            </a:r>
+            <a:r>
+              <a:rPr/>
+              <a:t> </a:t>
+            </a:r>
+            <a:r>
+              <a:rPr/>
+              <a:t>likely</a:t>
+            </a:r>
+            <a:r>
+              <a:rPr/>
+              <a:t> </a:t>
+            </a:r>
+            <a:r>
+              <a:rPr/>
+              <a:t>to</a:t>
+            </a:r>
+            <a:r>
+              <a:rPr/>
+              <a:t> </a:t>
+            </a:r>
+            <a:r>
+              <a:rPr/>
+              <a:t>be</a:t>
+            </a:r>
+            <a:r>
+              <a:rPr/>
+              <a:t> </a:t>
+            </a:r>
+            <a:r>
+              <a:rPr/>
+              <a:t>employed</a:t>
             </a:r>
           </a:p>
         </p:txBody>
       </p:sp>
       <p:pic>
         <p:nvPicPr>
-          <p:cNvPr descr="demographic_estimates_files/figure-pptx/unnamed-chunk-11-1.png" id="0" name="Picture 1"/>
+          <p:cNvPr descr="demographic_estimates_files/figure-pptx/unnamed-chunk-12-1.png" id="0" name="Picture 1"/>
           <p:cNvPicPr>
             <a:picLocks noGrp="1" noChangeAspect="1"/>
           </p:cNvPicPr>
@@ -4499,62 +4531,94 @@
             </a:pPr>
             <a:r>
               <a:rPr/>
-              <a:t>School</a:t>
-            </a:r>
-            <a:r>
-              <a:rPr/>
-              <a:t> </a:t>
-            </a:r>
-            <a:r>
-              <a:rPr/>
-              <a:t>Attendance</a:t>
-            </a:r>
-            <a:r>
-              <a:rPr/>
-              <a:t> </a:t>
-            </a:r>
-            <a:r>
-              <a:rPr/>
-              <a:t>for</a:t>
-            </a:r>
-            <a:r>
-              <a:rPr/>
-              <a:t> </a:t>
-            </a:r>
-            <a:r>
-              <a:rPr/>
-              <a:t>Connected</a:t>
-            </a:r>
-            <a:r>
-              <a:rPr/>
-              <a:t> </a:t>
-            </a:r>
-            <a:r>
-              <a:rPr/>
-              <a:t>Youth</a:t>
-            </a:r>
-            <a:r>
-              <a:rPr/>
-              <a:t> </a:t>
-            </a:r>
-            <a:r>
-              <a:rPr/>
-              <a:t>by</a:t>
-            </a:r>
-            <a:r>
-              <a:rPr/>
-              <a:t> </a:t>
-            </a:r>
-            <a:r>
-              <a:rPr/>
-              <a:t>PUMA</a:t>
+              <a:t>Westside</a:t>
+            </a:r>
+            <a:r>
+              <a:rPr/>
+              <a:t> </a:t>
+            </a:r>
+            <a:r>
+              <a:rPr/>
+              <a:t>connected</a:t>
+            </a:r>
+            <a:r>
+              <a:rPr/>
+              <a:t> </a:t>
+            </a:r>
+            <a:r>
+              <a:rPr/>
+              <a:t>youth</a:t>
+            </a:r>
+            <a:r>
+              <a:rPr/>
+              <a:t> </a:t>
+            </a:r>
+            <a:r>
+              <a:rPr/>
+              <a:t>are</a:t>
+            </a:r>
+            <a:r>
+              <a:rPr/>
+              <a:t> </a:t>
+            </a:r>
+            <a:r>
+              <a:rPr/>
+              <a:t>less</a:t>
+            </a:r>
+            <a:r>
+              <a:rPr/>
+              <a:t> </a:t>
+            </a:r>
+            <a:r>
+              <a:rPr/>
+              <a:t>likely</a:t>
+            </a:r>
+            <a:r>
+              <a:rPr/>
+              <a:t> </a:t>
+            </a:r>
+            <a:r>
+              <a:rPr/>
+              <a:t>to</a:t>
+            </a:r>
+            <a:r>
+              <a:rPr/>
+              <a:t> </a:t>
+            </a:r>
+            <a:r>
+              <a:rPr/>
+              <a:t>be</a:t>
+            </a:r>
+            <a:r>
+              <a:rPr/>
+              <a:t> </a:t>
+            </a:r>
+            <a:r>
+              <a:rPr/>
+              <a:t>enrolled</a:t>
+            </a:r>
+            <a:r>
+              <a:rPr/>
+              <a:t> </a:t>
+            </a:r>
+            <a:r>
+              <a:rPr/>
+              <a:t>in</a:t>
+            </a:r>
+            <a:r>
+              <a:rPr/>
+              <a:t> </a:t>
+            </a:r>
+            <a:r>
+              <a:rPr/>
+              <a:t>school</a:t>
             </a:r>
           </a:p>
         </p:txBody>
       </p:sp>
       <p:pic>
         <p:nvPicPr>
-          <p:cNvPr descr="demographic_estimates_files/figure-pptx/unnamed-chunk-12-1.png" id="0" name="Picture 1"/>
+          <p:cNvPr descr="demographic_estimates_files/figure-pptx/unnamed-chunk-13-1.png" id="0" name="Picture 1"/>
           <p:cNvPicPr>
             <a:picLocks noGrp="1" noChangeAspect="1"/>
           </p:cNvPicPr>

</xml_diff>

<commit_message>
updates to visuals and population estimates
</commit_message>
<xml_diff>
--- a/create_powerpoint/demographic_estimates.pptx
+++ b/create_powerpoint/demographic_estimates.pptx
@@ -19,7 +19,6 @@
     <p:sldId id="267" r:id="rId13"/>
     <p:sldId id="268" r:id="rId14"/>
     <p:sldId id="269" r:id="rId15"/>
-    <p:sldId id="270" r:id="rId16"/>
   </p:sldIdLst>
   <p:sldSz cx="12192000" cy="6858000"/>
   <p:notesSz cx="6858000" cy="9144000"/>
@@ -3765,8 +3764,8 @@
         </p:blipFill>
         <p:spPr bwMode="auto">
           <a:xfrm>
-            <a:off x="1752600" y="1816100"/>
-            <a:ext cx="8686800" cy="4343400"/>
+            <a:off x="3200400" y="1816100"/>
+            <a:ext cx="5791200" cy="4343400"/>
           </a:xfrm>
           <a:prstGeom prst="rect">
             <a:avLst/>
@@ -3920,8 +3919,8 @@
         </p:blipFill>
         <p:spPr bwMode="auto">
           <a:xfrm>
-            <a:off x="1752600" y="1816100"/>
-            <a:ext cx="8686800" cy="4343400"/>
+            <a:off x="3200400" y="1816100"/>
+            <a:ext cx="5791200" cy="4343400"/>
           </a:xfrm>
           <a:prstGeom prst="rect">
             <a:avLst/>
@@ -4022,6 +4021,14 @@
             </a:r>
             <a:r>
               <a:rPr/>
+              <a:t>Chicago’s</a:t>
+            </a:r>
+            <a:r>
+              <a:rPr/>
+              <a:t> </a:t>
+            </a:r>
+            <a:r>
+              <a:rPr/>
               <a:t>South</a:t>
             </a:r>
             <a:r>
@@ -4030,14 +4037,6 @@
             </a:r>
             <a:r>
               <a:rPr/>
-              <a:t>Side</a:t>
-            </a:r>
-            <a:r>
-              <a:rPr/>
-              <a:t> </a:t>
-            </a:r>
-            <a:r>
-              <a:rPr/>
               <a:t>and</a:t>
             </a:r>
             <a:r>
@@ -4054,15 +4053,7 @@
             </a:r>
             <a:r>
               <a:rPr/>
-              <a:t>Side</a:t>
-            </a:r>
-            <a:r>
-              <a:rPr/>
-              <a:t> </a:t>
-            </a:r>
-            <a:r>
-              <a:rPr/>
-              <a:t>Chicago</a:t>
+              <a:t>Sides</a:t>
             </a:r>
           </a:p>
         </p:txBody>
@@ -4083,8 +4074,8 @@
         </p:blipFill>
         <p:spPr bwMode="auto">
           <a:xfrm>
-            <a:off x="1752600" y="1816100"/>
-            <a:ext cx="8686800" cy="4343400"/>
+            <a:off x="3200400" y="1816100"/>
+            <a:ext cx="5791200" cy="4343400"/>
           </a:xfrm>
           <a:prstGeom prst="rect">
             <a:avLst/>
@@ -4145,30 +4136,126 @@
             </a:pPr>
             <a:r>
               <a:rPr/>
-              <a:t>OY</a:t>
-            </a:r>
-            <a:r>
-              <a:rPr/>
-              <a:t> </a:t>
-            </a:r>
-            <a:r>
-              <a:rPr/>
-              <a:t>by</a:t>
-            </a:r>
-            <a:r>
-              <a:rPr/>
-              <a:t> </a:t>
-            </a:r>
-            <a:r>
-              <a:rPr/>
-              <a:t>PUMA</a:t>
+              <a:t>Among</a:t>
+            </a:r>
+            <a:r>
+              <a:rPr/>
+              <a:t> </a:t>
+            </a:r>
+            <a:r>
+              <a:rPr/>
+              <a:t>all</a:t>
+            </a:r>
+            <a:r>
+              <a:rPr/>
+              <a:t> </a:t>
+            </a:r>
+            <a:r>
+              <a:rPr/>
+              <a:t>connected</a:t>
+            </a:r>
+            <a:r>
+              <a:rPr/>
+              <a:t> </a:t>
+            </a:r>
+            <a:r>
+              <a:rPr/>
+              <a:t>youth,</a:t>
+            </a:r>
+            <a:r>
+              <a:rPr/>
+              <a:t> </a:t>
+            </a:r>
+            <a:r>
+              <a:rPr/>
+              <a:t>those</a:t>
+            </a:r>
+            <a:r>
+              <a:rPr/>
+              <a:t> </a:t>
+            </a:r>
+            <a:r>
+              <a:rPr/>
+              <a:t>on</a:t>
+            </a:r>
+            <a:r>
+              <a:rPr/>
+              <a:t> </a:t>
+            </a:r>
+            <a:r>
+              <a:rPr/>
+              <a:t>the</a:t>
+            </a:r>
+            <a:r>
+              <a:rPr/>
+              <a:t> </a:t>
+            </a:r>
+            <a:r>
+              <a:rPr/>
+              <a:t>South</a:t>
+            </a:r>
+            <a:r>
+              <a:rPr/>
+              <a:t> </a:t>
+            </a:r>
+            <a:r>
+              <a:rPr/>
+              <a:t>Side</a:t>
+            </a:r>
+            <a:r>
+              <a:rPr/>
+              <a:t> </a:t>
+            </a:r>
+            <a:r>
+              <a:rPr/>
+              <a:t>are</a:t>
+            </a:r>
+            <a:r>
+              <a:rPr/>
+              <a:t> </a:t>
+            </a:r>
+            <a:r>
+              <a:rPr/>
+              <a:t>less</a:t>
+            </a:r>
+            <a:r>
+              <a:rPr/>
+              <a:t> </a:t>
+            </a:r>
+            <a:r>
+              <a:rPr/>
+              <a:t>likely</a:t>
+            </a:r>
+            <a:r>
+              <a:rPr/>
+              <a:t> </a:t>
+            </a:r>
+            <a:r>
+              <a:rPr/>
+              <a:t>to</a:t>
+            </a:r>
+            <a:r>
+              <a:rPr/>
+              <a:t> </a:t>
+            </a:r>
+            <a:r>
+              <a:rPr/>
+              <a:t>be</a:t>
+            </a:r>
+            <a:r>
+              <a:rPr/>
+              <a:t> </a:t>
+            </a:r>
+            <a:r>
+              <a:rPr/>
+              <a:t>employed</a:t>
             </a:r>
           </a:p>
         </p:txBody>
       </p:sp>
       <p:pic>
         <p:nvPicPr>
-          <p:cNvPr descr="demographic_estimates_files/figure-pptx/unnamed-chunk-12-1.png" id="0" name="Picture 1"/>
+          <p:cNvPr descr="demographic_estimates_files/figure-pptx/unnamed-chunk-13-1.png" id="0" name="Picture 1"/>
           <p:cNvPicPr>
             <a:picLocks noGrp="1" noChangeAspect="1"/>
           </p:cNvPicPr>
@@ -4244,170 +4331,63 @@
             </a:pPr>
             <a:r>
               <a:rPr/>
-              <a:t>Southside</a:t>
-            </a:r>
-            <a:r>
-              <a:rPr/>
-              <a:t> </a:t>
-            </a:r>
-            <a:r>
-              <a:rPr/>
-              <a:t>connected</a:t>
-            </a:r>
-            <a:r>
-              <a:rPr/>
-              <a:t> </a:t>
-            </a:r>
-            <a:r>
-              <a:rPr/>
-              <a:t>youth</a:t>
-            </a:r>
-            <a:r>
-              <a:rPr/>
-              <a:t> </a:t>
-            </a:r>
-            <a:r>
-              <a:rPr/>
-              <a:t>are</a:t>
-            </a:r>
-            <a:r>
-              <a:rPr/>
-              <a:t> </a:t>
-            </a:r>
-            <a:r>
-              <a:rPr/>
-              <a:t>less</a:t>
-            </a:r>
-            <a:r>
-              <a:rPr/>
-              <a:t> </a:t>
-            </a:r>
-            <a:r>
-              <a:rPr/>
-              <a:t>likely</a:t>
-            </a:r>
-            <a:r>
-              <a:rPr/>
-              <a:t> </a:t>
-            </a:r>
-            <a:r>
-              <a:rPr/>
-              <a:t>to</a:t>
-            </a:r>
-            <a:r>
-              <a:rPr/>
-              <a:t> </a:t>
-            </a:r>
-            <a:r>
-              <a:rPr/>
-              <a:t>be</a:t>
-            </a:r>
-            <a:r>
-              <a:rPr/>
-              <a:t> </a:t>
-            </a:r>
-            <a:r>
-              <a:rPr/>
-              <a:t>employed</a:t>
-            </a:r>
-          </a:p>
-        </p:txBody>
-      </p:sp>
-      <p:pic>
-        <p:nvPicPr>
-          <p:cNvPr descr="demographic_estimates_files/figure-pptx/unnamed-chunk-13-1.png" id="0" name="Picture 1"/>
-          <p:cNvPicPr>
-            <a:picLocks noGrp="1" noChangeAspect="1"/>
-          </p:cNvPicPr>
-          <p:nvPr/>
-        </p:nvPicPr>
-        <p:blipFill>
-          <a:blip r:embed="rId2"/>
-          <a:stretch>
-            <a:fillRect/>
-          </a:stretch>
-        </p:blipFill>
-        <p:spPr bwMode="auto">
-          <a:xfrm>
-            <a:off x="1752600" y="1816100"/>
-            <a:ext cx="8686800" cy="4343400"/>
-          </a:xfrm>
-          <a:prstGeom prst="rect">
-            <a:avLst/>
-          </a:prstGeom>
-          <a:noFill/>
-          <a:ln w="9525">
-            <a:noFill/>
-            <a:headEnd/>
-            <a:tailEnd/>
-          </a:ln>
-        </p:spPr>
-      </p:pic>
-    </p:spTree>
-  </p:cSld>
-</p:sld>
-</file>
-
-<file path=ppt/slides/slide15.xml><?xml version="1.0" encoding="utf-8"?>
-<p:sld xmlns:a="http://schemas.openxmlformats.org/drawingml/2006/main" xmlns:r="http://schemas.openxmlformats.org/officeDocument/2006/relationships" xmlns:p="http://schemas.openxmlformats.org/presentationml/2006/main">
-  <p:cSld>
-    <p:spTree>
-      <p:nvGrpSpPr>
-        <p:cNvPr id="1" name=""/>
-        <p:cNvGrpSpPr/>
-        <p:nvPr/>
-      </p:nvGrpSpPr>
-      <p:grpSpPr>
-        <a:xfrm>
-          <a:off x="0" y="0"/>
-          <a:ext cx="0" cy="0"/>
-          <a:chOff x="0" y="0"/>
-          <a:chExt cx="0" cy="0"/>
-        </a:xfrm>
-      </p:grpSpPr>
-      <p:sp>
-        <p:nvSpPr>
-          <p:cNvPr id="2" name="Title 1">
-            <a:extLst>
-              <a:ext uri="{FF2B5EF4-FFF2-40B4-BE49-F238E27FC236}">
-                <a16:creationId xmlns:a16="http://schemas.microsoft.com/office/drawing/2014/main" id="{0D064A50-2A97-421C-813D-6449089693A0}"/>
-              </a:ext>
-            </a:extLst>
-          </p:cNvPr>
-          <p:cNvSpPr>
-            <a:spLocks noGrp="1"/>
-          </p:cNvSpPr>
-          <p:nvPr>
-            <p:ph type="title"/>
-          </p:nvPr>
-        </p:nvSpPr>
-        <p:spPr/>
-        <p:txBody>
-          <a:bodyPr/>
-          <a:lstStyle/>
-          <a:p>
-            <a:pPr lvl="0" marL="0" indent="0">
-              <a:buNone/>
-            </a:pPr>
-            <a:r>
-              <a:rPr/>
-              <a:t>Westside</a:t>
-            </a:r>
-            <a:r>
-              <a:rPr/>
-              <a:t> </a:t>
-            </a:r>
-            <a:r>
-              <a:rPr/>
-              <a:t>connected</a:t>
-            </a:r>
-            <a:r>
-              <a:rPr/>
-              <a:t> </a:t>
-            </a:r>
-            <a:r>
-              <a:rPr/>
-              <a:t>youth</a:t>
+              <a:t>Among</a:t>
+            </a:r>
+            <a:r>
+              <a:rPr/>
+              <a:t> </a:t>
+            </a:r>
+            <a:r>
+              <a:rPr/>
+              <a:t>all</a:t>
+            </a:r>
+            <a:r>
+              <a:rPr/>
+              <a:t> </a:t>
+            </a:r>
+            <a:r>
+              <a:rPr/>
+              <a:t>Connected</a:t>
+            </a:r>
+            <a:r>
+              <a:rPr/>
+              <a:t> </a:t>
+            </a:r>
+            <a:r>
+              <a:rPr/>
+              <a:t>Youth,</a:t>
+            </a:r>
+            <a:r>
+              <a:rPr/>
+              <a:t> </a:t>
+            </a:r>
+            <a:r>
+              <a:rPr/>
+              <a:t>those</a:t>
+            </a:r>
+            <a:r>
+              <a:rPr/>
+              <a:t> </a:t>
+            </a:r>
+            <a:r>
+              <a:rPr/>
+              <a:t>on</a:t>
+            </a:r>
+            <a:r>
+              <a:rPr/>
+              <a:t> </a:t>
+            </a:r>
+            <a:r>
+              <a:rPr/>
+              <a:t>the</a:t>
+            </a:r>
+            <a:r>
+              <a:rPr/>
+              <a:t> </a:t>
+            </a:r>
+            <a:r>
+              <a:rPr/>
+              <a:t>Wesetside</a:t>
             </a:r>
             <a:r>
               <a:rPr/>
@@ -4934,8 +4914,8 @@
         </p:blipFill>
         <p:spPr bwMode="auto">
           <a:xfrm>
-            <a:off x="1752600" y="1816100"/>
-            <a:ext cx="8686800" cy="4343400"/>
+            <a:off x="3200400" y="1816100"/>
+            <a:ext cx="5791200" cy="4343400"/>
           </a:xfrm>
           <a:prstGeom prst="rect">
             <a:avLst/>
@@ -5089,8 +5069,8 @@
         </p:blipFill>
         <p:spPr bwMode="auto">
           <a:xfrm>
-            <a:off x="1752600" y="1816100"/>
-            <a:ext cx="8686800" cy="4343400"/>
+            <a:off x="3200400" y="1816100"/>
+            <a:ext cx="5791200" cy="4343400"/>
           </a:xfrm>
           <a:prstGeom prst="rect">
             <a:avLst/>
@@ -5244,8 +5224,8 @@
         </p:blipFill>
         <p:spPr bwMode="auto">
           <a:xfrm>
-            <a:off x="1752600" y="1816100"/>
-            <a:ext cx="8686800" cy="4343400"/>
+            <a:off x="3200400" y="1816100"/>
+            <a:ext cx="5791200" cy="4343400"/>
           </a:xfrm>
           <a:prstGeom prst="rect">
             <a:avLst/>
@@ -5383,8 +5363,8 @@
         </p:blipFill>
         <p:spPr bwMode="auto">
           <a:xfrm>
-            <a:off x="1752600" y="1816100"/>
-            <a:ext cx="8686800" cy="4343400"/>
+            <a:off x="3200400" y="1816100"/>
+            <a:ext cx="5791200" cy="4343400"/>
           </a:xfrm>
           <a:prstGeom prst="rect">
             <a:avLst/>
@@ -5530,8 +5510,8 @@
         </p:blipFill>
         <p:spPr bwMode="auto">
           <a:xfrm>
-            <a:off x="1752600" y="1816100"/>
-            <a:ext cx="8686800" cy="4343400"/>
+            <a:off x="3200400" y="1816100"/>
+            <a:ext cx="5791200" cy="4343400"/>
           </a:xfrm>
           <a:prstGeom prst="rect">
             <a:avLst/>
@@ -5669,8 +5649,8 @@
         </p:blipFill>
         <p:spPr bwMode="auto">
           <a:xfrm>
-            <a:off x="1752600" y="1816100"/>
-            <a:ext cx="8686800" cy="4343400"/>
+            <a:off x="3200400" y="1816100"/>
+            <a:ext cx="5791200" cy="4343400"/>
           </a:xfrm>
           <a:prstGeom prst="rect">
             <a:avLst/>

</xml_diff>

<commit_message>
updated demographics to show map of youth population by puma
</commit_message>
<xml_diff>
--- a/create_powerpoint/demographic_estimates.pptx
+++ b/create_powerpoint/demographic_estimates.pptx
@@ -4068,7 +4068,7 @@
       </p:sp>
       <p:pic>
         <p:nvPicPr>
-          <p:cNvPr descr="demographic_estimates_files/figure-pptx/unnamed-chunk-9-1.png" id="0" name="Picture 1"/>
+          <p:cNvPr descr="demographic_estimates_files/figure-pptx/unnamed-chunk-10-1.png" id="0" name="Picture 1"/>
           <p:cNvPicPr>
             <a:picLocks noGrp="1" noChangeAspect="1"/>
           </p:cNvPicPr>
@@ -4082,8 +4082,8 @@
         </p:blipFill>
         <p:spPr bwMode="auto">
           <a:xfrm>
-            <a:off x="3200400" y="1816100"/>
-            <a:ext cx="5791200" cy="4343400"/>
+            <a:off x="2476500" y="1816100"/>
+            <a:ext cx="7239000" cy="4343400"/>
           </a:xfrm>
           <a:prstGeom prst="rect">
             <a:avLst/>
@@ -4263,7 +4263,7 @@
       </p:sp>
       <p:pic>
         <p:nvPicPr>
-          <p:cNvPr descr="demographic_estimates_files/figure-pptx/unnamed-chunk-13-1.png" id="0" name="Picture 1"/>
+          <p:cNvPr descr="demographic_estimates_files/figure-pptx/unnamed-chunk-14-1.png" id="0" name="Picture 1"/>
           <p:cNvPicPr>
             <a:picLocks noGrp="1" noChangeAspect="1"/>
           </p:cNvPicPr>
@@ -4466,7 +4466,7 @@
       </p:sp>
       <p:pic>
         <p:nvPicPr>
-          <p:cNvPr descr="demographic_estimates_files/figure-pptx/unnamed-chunk-14-1.png" id="0" name="Picture 1"/>
+          <p:cNvPr descr="demographic_estimates_files/figure-pptx/unnamed-chunk-15-1.png" id="0" name="Picture 1"/>
           <p:cNvPicPr>
             <a:picLocks noGrp="1" noChangeAspect="1"/>
           </p:cNvPicPr>

</xml_diff>

<commit_message>
updates to visuals to collapse employment and school enrollment by chicago region rather than by PUMA
</commit_message>
<xml_diff>
--- a/create_powerpoint/demographic_estimates.pptx
+++ b/create_powerpoint/demographic_estimates.pptx
@@ -3610,15 +3610,15 @@
             </a:pPr>
             <a:r>
               <a:rPr/>
-              <a:t>November</a:t>
-            </a:r>
-            <a:r>
-              <a:rPr/>
-              <a:t> </a:t>
-            </a:r>
-            <a:r>
-              <a:rPr/>
-              <a:t>20,</a:t>
+              <a:t>December</a:t>
+            </a:r>
+            <a:r>
+              <a:rPr/>
+              <a:t> </a:t>
+            </a:r>
+            <a:r>
+              <a:rPr/>
+              <a:t>18,</a:t>
             </a:r>
             <a:r>
               <a:rPr/>

</xml_diff>